<commit_message>
RLB-00 Added Login and Home controller
</commit_message>
<xml_diff>
--- a/rlb.pptx
+++ b/rlb.pptx
@@ -10,16 +10,9 @@
     <p:sldId id="258" r:id="rId4"/>
     <p:sldId id="259" r:id="rId5"/>
     <p:sldId id="257" r:id="rId6"/>
-    <p:sldId id="263" r:id="rId7"/>
-    <p:sldId id="262" r:id="rId8"/>
-    <p:sldId id="260" r:id="rId9"/>
-    <p:sldId id="264" r:id="rId10"/>
-    <p:sldId id="270" r:id="rId11"/>
-    <p:sldId id="265" r:id="rId12"/>
-    <p:sldId id="266" r:id="rId13"/>
-    <p:sldId id="267" r:id="rId14"/>
-    <p:sldId id="268" r:id="rId15"/>
-    <p:sldId id="269" r:id="rId16"/>
+    <p:sldId id="262" r:id="rId7"/>
+    <p:sldId id="260" r:id="rId8"/>
+    <p:sldId id="270" r:id="rId9"/>
   </p:sldIdLst>
   <p:sldSz cx="9144000" cy="6858000" type="screen4x3"/>
   <p:notesSz cx="6858000" cy="9144000"/>
@@ -340,7 +333,7 @@
           <a:p>
             <a:fld id="{F7E8EBE4-5C21-4152-BE9D-D2B5A8E29458}" type="datetimeFigureOut">
               <a:rPr lang="en-IN" smtClean="0"/>
-              <a:t>03-02-2025</a:t>
+              <a:t>07-02-2025</a:t>
             </a:fld>
             <a:endParaRPr lang="en-IN"/>
           </a:p>
@@ -527,7 +520,7 @@
           <a:p>
             <a:fld id="{F7E8EBE4-5C21-4152-BE9D-D2B5A8E29458}" type="datetimeFigureOut">
               <a:rPr lang="en-IN" smtClean="0"/>
-              <a:t>03-02-2025</a:t>
+              <a:t>07-02-2025</a:t>
             </a:fld>
             <a:endParaRPr lang="en-IN"/>
           </a:p>
@@ -702,7 +695,7 @@
           <a:p>
             <a:fld id="{F7E8EBE4-5C21-4152-BE9D-D2B5A8E29458}" type="datetimeFigureOut">
               <a:rPr lang="en-IN" smtClean="0"/>
-              <a:t>03-02-2025</a:t>
+              <a:t>07-02-2025</a:t>
             </a:fld>
             <a:endParaRPr lang="en-IN"/>
           </a:p>
@@ -882,7 +875,7 @@
           <a:p>
             <a:fld id="{F7E8EBE4-5C21-4152-BE9D-D2B5A8E29458}" type="datetimeFigureOut">
               <a:rPr lang="en-IN" smtClean="0"/>
-              <a:t>03-02-2025</a:t>
+              <a:t>07-02-2025</a:t>
             </a:fld>
             <a:endParaRPr lang="en-IN"/>
           </a:p>
@@ -1129,7 +1122,7 @@
           <a:p>
             <a:fld id="{F7E8EBE4-5C21-4152-BE9D-D2B5A8E29458}" type="datetimeFigureOut">
               <a:rPr lang="en-IN" smtClean="0"/>
-              <a:t>03-02-2025</a:t>
+              <a:t>07-02-2025</a:t>
             </a:fld>
             <a:endParaRPr lang="en-IN"/>
           </a:p>
@@ -1603,7 +1596,7 @@
           <a:p>
             <a:fld id="{F7E8EBE4-5C21-4152-BE9D-D2B5A8E29458}" type="datetimeFigureOut">
               <a:rPr lang="en-IN" smtClean="0"/>
-              <a:t>03-02-2025</a:t>
+              <a:t>07-02-2025</a:t>
             </a:fld>
             <a:endParaRPr lang="en-IN"/>
           </a:p>
@@ -2018,7 +2011,7 @@
           <a:p>
             <a:fld id="{F7E8EBE4-5C21-4152-BE9D-D2B5A8E29458}" type="datetimeFigureOut">
               <a:rPr lang="en-IN" smtClean="0"/>
-              <a:t>03-02-2025</a:t>
+              <a:t>07-02-2025</a:t>
             </a:fld>
             <a:endParaRPr lang="en-IN"/>
           </a:p>
@@ -2149,7 +2142,7 @@
           <a:p>
             <a:fld id="{F7E8EBE4-5C21-4152-BE9D-D2B5A8E29458}" type="datetimeFigureOut">
               <a:rPr lang="en-IN" smtClean="0"/>
-              <a:t>03-02-2025</a:t>
+              <a:t>07-02-2025</a:t>
             </a:fld>
             <a:endParaRPr lang="en-IN"/>
           </a:p>
@@ -2244,7 +2237,7 @@
           <a:p>
             <a:fld id="{F7E8EBE4-5C21-4152-BE9D-D2B5A8E29458}" type="datetimeFigureOut">
               <a:rPr lang="en-IN" smtClean="0"/>
-              <a:t>03-02-2025</a:t>
+              <a:t>07-02-2025</a:t>
             </a:fld>
             <a:endParaRPr lang="en-IN"/>
           </a:p>
@@ -2522,7 +2515,7 @@
           <a:p>
             <a:fld id="{F7E8EBE4-5C21-4152-BE9D-D2B5A8E29458}" type="datetimeFigureOut">
               <a:rPr lang="en-IN" smtClean="0"/>
-              <a:t>03-02-2025</a:t>
+              <a:t>07-02-2025</a:t>
             </a:fld>
             <a:endParaRPr lang="en-IN"/>
           </a:p>
@@ -2774,7 +2767,7 @@
           <a:p>
             <a:fld id="{F7E8EBE4-5C21-4152-BE9D-D2B5A8E29458}" type="datetimeFigureOut">
               <a:rPr lang="en-IN" smtClean="0"/>
-              <a:t>03-02-2025</a:t>
+              <a:t>07-02-2025</a:t>
             </a:fld>
             <a:endParaRPr lang="en-IN"/>
           </a:p>
@@ -3146,7 +3139,7 @@
           <a:p>
             <a:fld id="{F7E8EBE4-5C21-4152-BE9D-D2B5A8E29458}" type="datetimeFigureOut">
               <a:rPr lang="en-IN" smtClean="0"/>
-              <a:t>03-02-2025</a:t>
+              <a:t>07-02-2025</a:t>
             </a:fld>
             <a:endParaRPr lang="en-IN"/>
           </a:p>
@@ -3684,1741 +3677,6 @@
 </p:sld>
 </file>
 
-<file path=ppt/slides/slide10.xml><?xml version="1.0" encoding="utf-8"?>
-<p:sld xmlns:a="http://schemas.openxmlformats.org/drawingml/2006/main" xmlns:r="http://schemas.openxmlformats.org/officeDocument/2006/relationships" xmlns:p="http://schemas.openxmlformats.org/presentationml/2006/main">
-  <p:cSld>
-    <p:spTree>
-      <p:nvGrpSpPr>
-        <p:cNvPr id="1" name=""/>
-        <p:cNvGrpSpPr/>
-        <p:nvPr/>
-      </p:nvGrpSpPr>
-      <p:grpSpPr>
-        <a:xfrm>
-          <a:off x="0" y="0"/>
-          <a:ext cx="0" cy="0"/>
-          <a:chOff x="0" y="0"/>
-          <a:chExt cx="0" cy="0"/>
-        </a:xfrm>
-      </p:grpSpPr>
-      <p:sp>
-        <p:nvSpPr>
-          <p:cNvPr id="2" name="Title 1"/>
-          <p:cNvSpPr>
-            <a:spLocks noGrp="1"/>
-          </p:cNvSpPr>
-          <p:nvPr>
-            <p:ph type="title"/>
-          </p:nvPr>
-        </p:nvSpPr>
-        <p:spPr/>
-        <p:txBody>
-          <a:bodyPr/>
-          <a:lstStyle/>
-          <a:p>
-            <a:r>
-              <a:rPr lang="en-US" dirty="0" smtClean="0"/>
-              <a:t>***********END*********</a:t>
-            </a:r>
-            <a:endParaRPr lang="en-IN" dirty="0"/>
-          </a:p>
-        </p:txBody>
-      </p:sp>
-      <p:sp>
-        <p:nvSpPr>
-          <p:cNvPr id="3" name="Content Placeholder 2"/>
-          <p:cNvSpPr>
-            <a:spLocks noGrp="1"/>
-          </p:cNvSpPr>
-          <p:nvPr>
-            <p:ph idx="1"/>
-          </p:nvPr>
-        </p:nvSpPr>
-        <p:spPr/>
-        <p:txBody>
-          <a:bodyPr/>
-          <a:lstStyle/>
-          <a:p>
-            <a:pPr marL="64008" indent="0">
-              <a:buNone/>
-            </a:pPr>
-            <a:endParaRPr lang="en-IN" dirty="0"/>
-          </a:p>
-        </p:txBody>
-      </p:sp>
-    </p:spTree>
-    <p:extLst>
-      <p:ext uri="{BB962C8B-B14F-4D97-AF65-F5344CB8AC3E}">
-        <p14:creationId xmlns:p14="http://schemas.microsoft.com/office/powerpoint/2010/main" val="3348350733"/>
-      </p:ext>
-    </p:extLst>
-  </p:cSld>
-  <p:clrMapOvr>
-    <a:masterClrMapping/>
-  </p:clrMapOvr>
-</p:sld>
-</file>
-
-<file path=ppt/slides/slide11.xml><?xml version="1.0" encoding="utf-8"?>
-<p:sld xmlns:a="http://schemas.openxmlformats.org/drawingml/2006/main" xmlns:r="http://schemas.openxmlformats.org/officeDocument/2006/relationships" xmlns:p="http://schemas.openxmlformats.org/presentationml/2006/main">
-  <p:cSld>
-    <p:spTree>
-      <p:nvGrpSpPr>
-        <p:cNvPr id="1" name=""/>
-        <p:cNvGrpSpPr/>
-        <p:nvPr/>
-      </p:nvGrpSpPr>
-      <p:grpSpPr>
-        <a:xfrm>
-          <a:off x="0" y="0"/>
-          <a:ext cx="0" cy="0"/>
-          <a:chOff x="0" y="0"/>
-          <a:chExt cx="0" cy="0"/>
-        </a:xfrm>
-      </p:grpSpPr>
-      <p:sp>
-        <p:nvSpPr>
-          <p:cNvPr id="2" name="Title 1"/>
-          <p:cNvSpPr>
-            <a:spLocks noGrp="1"/>
-          </p:cNvSpPr>
-          <p:nvPr>
-            <p:ph type="title"/>
-          </p:nvPr>
-        </p:nvSpPr>
-        <p:spPr/>
-        <p:txBody>
-          <a:bodyPr/>
-          <a:lstStyle/>
-          <a:p>
-            <a:endParaRPr lang="en-IN"/>
-          </a:p>
-        </p:txBody>
-      </p:sp>
-      <p:pic>
-        <p:nvPicPr>
-          <p:cNvPr id="1026" name="Picture 2"/>
-          <p:cNvPicPr>
-            <a:picLocks noGrp="1" noChangeAspect="1" noChangeArrowheads="1"/>
-          </p:cNvPicPr>
-          <p:nvPr>
-            <p:ph idx="1"/>
-          </p:nvPr>
-        </p:nvPicPr>
-        <p:blipFill>
-          <a:blip r:embed="rId2">
-            <a:extLst>
-              <a:ext uri="{28A0092B-C50C-407E-A947-70E740481C1C}">
-                <a14:useLocalDpi xmlns:a14="http://schemas.microsoft.com/office/drawing/2010/main" val="0"/>
-              </a:ext>
-            </a:extLst>
-          </a:blip>
-          <a:srcRect/>
-          <a:stretch>
-            <a:fillRect/>
-          </a:stretch>
-        </p:blipFill>
-        <p:spPr bwMode="auto">
-          <a:xfrm>
-            <a:off x="179512" y="188640"/>
-            <a:ext cx="8693668" cy="1440160"/>
-          </a:xfrm>
-          <a:prstGeom prst="rect">
-            <a:avLst/>
-          </a:prstGeom>
-          <a:noFill/>
-          <a:ln>
-            <a:noFill/>
-          </a:ln>
-          <a:effectLst/>
-          <a:extLst>
-            <a:ext uri="{909E8E84-426E-40DD-AFC4-6F175D3DCCD1}">
-              <a14:hiddenFill xmlns:a14="http://schemas.microsoft.com/office/drawing/2010/main">
-                <a:solidFill>
-                  <a:schemeClr val="accent1"/>
-                </a:solidFill>
-              </a14:hiddenFill>
-            </a:ext>
-            <a:ext uri="{91240B29-F687-4F45-9708-019B960494DF}">
-              <a14:hiddenLine xmlns:a14="http://schemas.microsoft.com/office/drawing/2010/main" w="9525">
-                <a:solidFill>
-                  <a:schemeClr val="tx1"/>
-                </a:solidFill>
-                <a:miter lim="800000"/>
-                <a:headEnd/>
-                <a:tailEnd/>
-              </a14:hiddenLine>
-            </a:ext>
-            <a:ext uri="{AF507438-7753-43E0-B8FC-AC1667EBCBE1}">
-              <a14:hiddenEffects xmlns:a14="http://schemas.microsoft.com/office/drawing/2010/main">
-                <a:effectLst>
-                  <a:outerShdw dist="35921" dir="2700000" algn="ctr" rotWithShape="0">
-                    <a:schemeClr val="bg2"/>
-                  </a:outerShdw>
-                </a:effectLst>
-              </a14:hiddenEffects>
-            </a:ext>
-          </a:extLst>
-        </p:spPr>
-      </p:pic>
-      <p:pic>
-        <p:nvPicPr>
-          <p:cNvPr id="3" name="Picture 2"/>
-          <p:cNvPicPr>
-            <a:picLocks noChangeAspect="1" noChangeArrowheads="1"/>
-          </p:cNvPicPr>
-          <p:nvPr/>
-        </p:nvPicPr>
-        <p:blipFill>
-          <a:blip r:embed="rId3">
-            <a:extLst>
-              <a:ext uri="{28A0092B-C50C-407E-A947-70E740481C1C}">
-                <a14:useLocalDpi xmlns:a14="http://schemas.microsoft.com/office/drawing/2010/main" val="0"/>
-              </a:ext>
-            </a:extLst>
-          </a:blip>
-          <a:srcRect/>
-          <a:stretch>
-            <a:fillRect/>
-          </a:stretch>
-        </p:blipFill>
-        <p:spPr bwMode="auto">
-          <a:xfrm>
-            <a:off x="395536" y="1844824"/>
-            <a:ext cx="8537401" cy="4532097"/>
-          </a:xfrm>
-          <a:prstGeom prst="rect">
-            <a:avLst/>
-          </a:prstGeom>
-          <a:noFill/>
-          <a:ln>
-            <a:noFill/>
-          </a:ln>
-          <a:effectLst/>
-          <a:extLst>
-            <a:ext uri="{909E8E84-426E-40DD-AFC4-6F175D3DCCD1}">
-              <a14:hiddenFill xmlns:a14="http://schemas.microsoft.com/office/drawing/2010/main">
-                <a:solidFill>
-                  <a:schemeClr val="accent1"/>
-                </a:solidFill>
-              </a14:hiddenFill>
-            </a:ext>
-            <a:ext uri="{91240B29-F687-4F45-9708-019B960494DF}">
-              <a14:hiddenLine xmlns:a14="http://schemas.microsoft.com/office/drawing/2010/main" w="9525">
-                <a:solidFill>
-                  <a:schemeClr val="tx1"/>
-                </a:solidFill>
-                <a:miter lim="800000"/>
-                <a:headEnd/>
-                <a:tailEnd/>
-              </a14:hiddenLine>
-            </a:ext>
-            <a:ext uri="{AF507438-7753-43E0-B8FC-AC1667EBCBE1}">
-              <a14:hiddenEffects xmlns:a14="http://schemas.microsoft.com/office/drawing/2010/main">
-                <a:effectLst>
-                  <a:outerShdw dist="35921" dir="2700000" algn="ctr" rotWithShape="0">
-                    <a:schemeClr val="bg2"/>
-                  </a:outerShdw>
-                </a:effectLst>
-              </a14:hiddenEffects>
-            </a:ext>
-          </a:extLst>
-        </p:spPr>
-      </p:pic>
-    </p:spTree>
-    <p:extLst>
-      <p:ext uri="{BB962C8B-B14F-4D97-AF65-F5344CB8AC3E}">
-        <p14:creationId xmlns:p14="http://schemas.microsoft.com/office/powerpoint/2010/main" val="1081606036"/>
-      </p:ext>
-    </p:extLst>
-  </p:cSld>
-  <p:clrMapOvr>
-    <a:masterClrMapping/>
-  </p:clrMapOvr>
-  <p:timing>
-    <p:tnLst>
-      <p:par>
-        <p:cTn id="1" dur="indefinite" restart="never" nodeType="tmRoot"/>
-      </p:par>
-    </p:tnLst>
-  </p:timing>
-</p:sld>
-</file>
-
-<file path=ppt/slides/slide12.xml><?xml version="1.0" encoding="utf-8"?>
-<p:sld xmlns:a="http://schemas.openxmlformats.org/drawingml/2006/main" xmlns:r="http://schemas.openxmlformats.org/officeDocument/2006/relationships" xmlns:p="http://schemas.openxmlformats.org/presentationml/2006/main">
-  <p:cSld>
-    <p:spTree>
-      <p:nvGrpSpPr>
-        <p:cNvPr id="1" name=""/>
-        <p:cNvGrpSpPr/>
-        <p:nvPr/>
-      </p:nvGrpSpPr>
-      <p:grpSpPr>
-        <a:xfrm>
-          <a:off x="0" y="0"/>
-          <a:ext cx="0" cy="0"/>
-          <a:chOff x="0" y="0"/>
-          <a:chExt cx="0" cy="0"/>
-        </a:xfrm>
-      </p:grpSpPr>
-      <p:sp>
-        <p:nvSpPr>
-          <p:cNvPr id="2" name="Title 1"/>
-          <p:cNvSpPr>
-            <a:spLocks noGrp="1"/>
-          </p:cNvSpPr>
-          <p:nvPr>
-            <p:ph type="title"/>
-          </p:nvPr>
-        </p:nvSpPr>
-        <p:spPr/>
-        <p:txBody>
-          <a:bodyPr/>
-          <a:lstStyle/>
-          <a:p>
-            <a:r>
-              <a:rPr lang="en-IN" b="1" dirty="0" err="1" smtClean="0">
-                <a:effectLst/>
-              </a:rPr>
-              <a:t>FilterChains</a:t>
-            </a:r>
-            <a:endParaRPr lang="en-IN" dirty="0"/>
-          </a:p>
-        </p:txBody>
-      </p:sp>
-      <p:sp>
-        <p:nvSpPr>
-          <p:cNvPr id="3" name="Content Placeholder 2"/>
-          <p:cNvSpPr>
-            <a:spLocks noGrp="1"/>
-          </p:cNvSpPr>
-          <p:nvPr>
-            <p:ph idx="1"/>
-          </p:nvPr>
-        </p:nvSpPr>
-        <p:spPr/>
-        <p:txBody>
-          <a:bodyPr>
-            <a:normAutofit/>
-          </a:bodyPr>
-          <a:lstStyle/>
-          <a:p>
-            <a:pPr marL="64008" indent="0">
-              <a:buNone/>
-            </a:pPr>
-            <a:r>
-              <a:rPr lang="en-US" sz="1600" dirty="0"/>
-              <a:t>In the real-world, however, you would split this one filter up into </a:t>
-            </a:r>
-            <a:r>
-              <a:rPr lang="en-US" sz="1600" i="1" dirty="0"/>
-              <a:t>multiple</a:t>
-            </a:r>
-            <a:r>
-              <a:rPr lang="en-US" sz="1600" dirty="0"/>
-              <a:t> filters, that you then </a:t>
-            </a:r>
-            <a:r>
-              <a:rPr lang="en-US" sz="1600" i="1" dirty="0"/>
-              <a:t>chain</a:t>
-            </a:r>
-            <a:r>
-              <a:rPr lang="en-US" sz="1600" dirty="0"/>
-              <a:t> </a:t>
-            </a:r>
-            <a:r>
-              <a:rPr lang="en-US" sz="1600" dirty="0" smtClean="0"/>
-              <a:t>together</a:t>
-            </a:r>
-          </a:p>
-          <a:p>
-            <a:pPr marL="64008" indent="0">
-              <a:buNone/>
-            </a:pPr>
-            <a:r>
-              <a:rPr lang="en-US" sz="1600" dirty="0"/>
-              <a:t>For example, an incoming HTTP request would…​</a:t>
-            </a:r>
-          </a:p>
-          <a:p>
-            <a:r>
-              <a:rPr lang="en-US" sz="1600" dirty="0"/>
-              <a:t>First, go through a </a:t>
-            </a:r>
-            <a:r>
-              <a:rPr lang="en-US" sz="1600" dirty="0" err="1"/>
-              <a:t>LoginMethodFilter</a:t>
-            </a:r>
-            <a:r>
-              <a:rPr lang="en-US" sz="1600" dirty="0"/>
-              <a:t>…​</a:t>
-            </a:r>
-          </a:p>
-          <a:p>
-            <a:r>
-              <a:rPr lang="en-US" sz="1600" dirty="0"/>
-              <a:t>Then, go through an </a:t>
-            </a:r>
-            <a:r>
-              <a:rPr lang="en-US" sz="1600" dirty="0" err="1"/>
-              <a:t>AuthenticationFilter</a:t>
-            </a:r>
-            <a:r>
-              <a:rPr lang="en-US" sz="1600" dirty="0"/>
-              <a:t>…​</a:t>
-            </a:r>
-          </a:p>
-          <a:p>
-            <a:r>
-              <a:rPr lang="en-US" sz="1600" dirty="0"/>
-              <a:t>Then, go through an </a:t>
-            </a:r>
-            <a:r>
-              <a:rPr lang="en-US" sz="1600" dirty="0" err="1"/>
-              <a:t>AuthorizationFilter</a:t>
-            </a:r>
-            <a:r>
-              <a:rPr lang="en-US" sz="1600" dirty="0"/>
-              <a:t>…​</a:t>
-            </a:r>
-          </a:p>
-          <a:p>
-            <a:r>
-              <a:rPr lang="en-US" sz="1600" dirty="0"/>
-              <a:t>Finally, hit your servlet.</a:t>
-            </a:r>
-          </a:p>
-          <a:p>
-            <a:pPr marL="64008" indent="0">
-              <a:buNone/>
-            </a:pPr>
-            <a:endParaRPr lang="en-US" sz="1600" dirty="0" smtClean="0"/>
-          </a:p>
-          <a:p>
-            <a:pPr marL="64008" indent="0">
-              <a:buNone/>
-            </a:pPr>
-            <a:r>
-              <a:rPr lang="en-US" sz="1600" dirty="0" smtClean="0"/>
-              <a:t>Add bellow dependency in </a:t>
-            </a:r>
-            <a:r>
-              <a:rPr lang="en-US" sz="1600" smtClean="0"/>
-              <a:t>your pom.xml</a:t>
-            </a:r>
-            <a:endParaRPr lang="en-US" sz="1600" dirty="0" smtClean="0"/>
-          </a:p>
-          <a:p>
-            <a:pPr marL="64008" indent="0">
-              <a:buNone/>
-            </a:pPr>
-            <a:endParaRPr lang="en-US" sz="1600" dirty="0" smtClean="0"/>
-          </a:p>
-          <a:p>
-            <a:pPr marL="64008" indent="0" fontAlgn="base">
-              <a:buNone/>
-            </a:pPr>
-            <a:r>
-              <a:rPr lang="en-IN" sz="1600" b="1" dirty="0"/>
-              <a:t>&lt;dependency&gt;</a:t>
-            </a:r>
-          </a:p>
-          <a:p>
-            <a:pPr marL="64008" indent="0" fontAlgn="base">
-              <a:buNone/>
-            </a:pPr>
-            <a:r>
-              <a:rPr lang="en-IN" sz="1600" b="1" dirty="0"/>
-              <a:t>            &lt;</a:t>
-            </a:r>
-            <a:r>
-              <a:rPr lang="en-IN" sz="1600" b="1" dirty="0" err="1"/>
-              <a:t>groupId</a:t>
-            </a:r>
-            <a:r>
-              <a:rPr lang="en-IN" sz="1600" b="1" dirty="0"/>
-              <a:t>&gt;</a:t>
-            </a:r>
-            <a:r>
-              <a:rPr lang="en-IN" sz="1600" b="1" dirty="0" err="1"/>
-              <a:t>org.springframework.boot</a:t>
-            </a:r>
-            <a:r>
-              <a:rPr lang="en-IN" sz="1600" b="1" dirty="0"/>
-              <a:t>&lt;/</a:t>
-            </a:r>
-            <a:r>
-              <a:rPr lang="en-IN" sz="1600" b="1" dirty="0" err="1"/>
-              <a:t>groupId</a:t>
-            </a:r>
-            <a:r>
-              <a:rPr lang="en-IN" sz="1600" b="1" dirty="0"/>
-              <a:t>&gt;</a:t>
-            </a:r>
-          </a:p>
-          <a:p>
-            <a:pPr marL="64008" indent="0" fontAlgn="base">
-              <a:buNone/>
-            </a:pPr>
-            <a:r>
-              <a:rPr lang="en-IN" sz="1600" b="1" dirty="0"/>
-              <a:t>            &lt;</a:t>
-            </a:r>
-            <a:r>
-              <a:rPr lang="en-IN" sz="1600" b="1" dirty="0" err="1"/>
-              <a:t>artifactId</a:t>
-            </a:r>
-            <a:r>
-              <a:rPr lang="en-IN" sz="1600" b="1" dirty="0"/>
-              <a:t>&gt;spring-boot-starter-security&lt;/</a:t>
-            </a:r>
-            <a:r>
-              <a:rPr lang="en-IN" sz="1600" b="1" dirty="0" err="1"/>
-              <a:t>artifactId</a:t>
-            </a:r>
-            <a:r>
-              <a:rPr lang="en-IN" sz="1600" b="1" dirty="0"/>
-              <a:t>&gt;</a:t>
-            </a:r>
-          </a:p>
-          <a:p>
-            <a:pPr marL="64008" indent="0" fontAlgn="base">
-              <a:buNone/>
-            </a:pPr>
-            <a:r>
-              <a:rPr lang="en-IN" sz="1600" b="1" dirty="0" smtClean="0"/>
-              <a:t>&lt;/</a:t>
-            </a:r>
-            <a:r>
-              <a:rPr lang="en-IN" sz="1600" b="1" dirty="0"/>
-              <a:t>dependency&gt;</a:t>
-            </a:r>
-          </a:p>
-          <a:p>
-            <a:pPr marL="64008" indent="0">
-              <a:buNone/>
-            </a:pPr>
-            <a:endParaRPr lang="en-IN" sz="1600" dirty="0"/>
-          </a:p>
-        </p:txBody>
-      </p:sp>
-    </p:spTree>
-    <p:extLst>
-      <p:ext uri="{BB962C8B-B14F-4D97-AF65-F5344CB8AC3E}">
-        <p14:creationId xmlns:p14="http://schemas.microsoft.com/office/powerpoint/2010/main" val="2625773185"/>
-      </p:ext>
-    </p:extLst>
-  </p:cSld>
-  <p:clrMapOvr>
-    <a:masterClrMapping/>
-  </p:clrMapOvr>
-</p:sld>
-</file>
-
-<file path=ppt/slides/slide13.xml><?xml version="1.0" encoding="utf-8"?>
-<p:sld xmlns:a="http://schemas.openxmlformats.org/drawingml/2006/main" xmlns:r="http://schemas.openxmlformats.org/officeDocument/2006/relationships" xmlns:p="http://schemas.openxmlformats.org/presentationml/2006/main">
-  <p:cSld>
-    <p:spTree>
-      <p:nvGrpSpPr>
-        <p:cNvPr id="1" name=""/>
-        <p:cNvGrpSpPr/>
-        <p:nvPr/>
-      </p:nvGrpSpPr>
-      <p:grpSpPr>
-        <a:xfrm>
-          <a:off x="0" y="0"/>
-          <a:ext cx="0" cy="0"/>
-          <a:chOff x="0" y="0"/>
-          <a:chExt cx="0" cy="0"/>
-        </a:xfrm>
-      </p:grpSpPr>
-      <p:sp>
-        <p:nvSpPr>
-          <p:cNvPr id="2" name="Title 1"/>
-          <p:cNvSpPr>
-            <a:spLocks noGrp="1"/>
-          </p:cNvSpPr>
-          <p:nvPr>
-            <p:ph type="title"/>
-          </p:nvPr>
-        </p:nvSpPr>
-        <p:spPr>
-          <a:xfrm>
-            <a:off x="457200" y="267494"/>
-            <a:ext cx="8507288" cy="1399032"/>
-          </a:xfrm>
-        </p:spPr>
-        <p:txBody>
-          <a:bodyPr>
-            <a:normAutofit fontScale="90000"/>
-          </a:bodyPr>
-          <a:lstStyle/>
-          <a:p>
-            <a:r>
-              <a:rPr lang="en-IN" b="1" dirty="0" err="1" smtClean="0">
-                <a:effectLst/>
-              </a:rPr>
-              <a:t>Spring’sDefaultSecurityFilterChain</a:t>
-            </a:r>
-            <a:r>
-              <a:rPr lang="en-IN" b="1" dirty="0">
-                <a:effectLst/>
-              </a:rPr>
-              <a:t/>
-            </a:r>
-            <a:br>
-              <a:rPr lang="en-IN" b="1" dirty="0">
-                <a:effectLst/>
-              </a:rPr>
-            </a:br>
-            <a:endParaRPr lang="en-IN" dirty="0"/>
-          </a:p>
-        </p:txBody>
-      </p:sp>
-      <p:sp>
-        <p:nvSpPr>
-          <p:cNvPr id="3" name="Content Placeholder 2"/>
-          <p:cNvSpPr>
-            <a:spLocks noGrp="1"/>
-          </p:cNvSpPr>
-          <p:nvPr>
-            <p:ph idx="1"/>
-          </p:nvPr>
-        </p:nvSpPr>
-        <p:spPr/>
-        <p:txBody>
-          <a:bodyPr/>
-          <a:lstStyle/>
-          <a:p>
-            <a:r>
-              <a:rPr lang="en-US" sz="1600" dirty="0" smtClean="0"/>
-              <a:t>Enable spring debug log</a:t>
-            </a:r>
-          </a:p>
-          <a:p>
-            <a:r>
-              <a:rPr lang="en-IN" sz="1600" dirty="0" err="1" smtClean="0"/>
-              <a:t>logging.level.org.springframework.security</a:t>
-            </a:r>
-            <a:r>
-              <a:rPr lang="en-IN" sz="1600" dirty="0" smtClean="0"/>
-              <a:t>=DEBUG</a:t>
-            </a:r>
-          </a:p>
-          <a:p>
-            <a:r>
-              <a:rPr lang="en-IN" sz="1600" b="1" dirty="0"/>
-              <a:t>2025-02-03T15:37:14.598+05:30 DEBUG 16060 --- [barbershop] [  </a:t>
-            </a:r>
-            <a:r>
-              <a:rPr lang="en-IN" sz="1600" b="1" dirty="0" err="1"/>
-              <a:t>restartedMain</a:t>
-            </a:r>
-            <a:r>
-              <a:rPr lang="en-IN" sz="1600" b="1" dirty="0"/>
-              <a:t>] </a:t>
-            </a:r>
-            <a:r>
-              <a:rPr lang="en-IN" sz="1600" b="1" dirty="0" err="1"/>
-              <a:t>o.s.s.web.DefaultSecurityFilterChain</a:t>
-            </a:r>
-            <a:r>
-              <a:rPr lang="en-IN" sz="1600" b="1" dirty="0"/>
-              <a:t>     : Will secure any request with filters: </a:t>
-            </a:r>
-            <a:r>
-              <a:rPr lang="en-IN" sz="1600" b="1" dirty="0" err="1"/>
-              <a:t>DisableEncodeUrlFilter</a:t>
-            </a:r>
-            <a:r>
-              <a:rPr lang="en-IN" sz="1600" b="1" dirty="0"/>
-              <a:t>, </a:t>
-            </a:r>
-            <a:r>
-              <a:rPr lang="en-IN" sz="1600" b="1" dirty="0" err="1"/>
-              <a:t>WebAsyncManagerIntegrationFilter</a:t>
-            </a:r>
-            <a:r>
-              <a:rPr lang="en-IN" sz="1600" b="1" dirty="0"/>
-              <a:t>, </a:t>
-            </a:r>
-            <a:r>
-              <a:rPr lang="en-IN" sz="1600" b="1" dirty="0" err="1"/>
-              <a:t>SecurityContextHolderFilter</a:t>
-            </a:r>
-            <a:r>
-              <a:rPr lang="en-IN" sz="1600" b="1" dirty="0"/>
-              <a:t>, </a:t>
-            </a:r>
-            <a:r>
-              <a:rPr lang="en-IN" sz="1600" b="1" dirty="0" err="1"/>
-              <a:t>HeaderWriterFilter</a:t>
-            </a:r>
-            <a:r>
-              <a:rPr lang="en-IN" sz="1600" b="1" dirty="0"/>
-              <a:t>, </a:t>
-            </a:r>
-            <a:r>
-              <a:rPr lang="en-IN" sz="1600" b="1" dirty="0" err="1"/>
-              <a:t>CsrfFilter</a:t>
-            </a:r>
-            <a:r>
-              <a:rPr lang="en-IN" sz="1600" b="1" dirty="0"/>
-              <a:t>, </a:t>
-            </a:r>
-            <a:r>
-              <a:rPr lang="en-IN" sz="1600" b="1" dirty="0" err="1"/>
-              <a:t>LogoutFilter</a:t>
-            </a:r>
-            <a:r>
-              <a:rPr lang="en-IN" sz="1600" b="1" dirty="0"/>
-              <a:t>, </a:t>
-            </a:r>
-            <a:r>
-              <a:rPr lang="en-IN" sz="1600" b="1" dirty="0" err="1"/>
-              <a:t>UsernamePasswordAuthenticationFilter</a:t>
-            </a:r>
-            <a:r>
-              <a:rPr lang="en-IN" sz="1600" b="1" dirty="0"/>
-              <a:t>, </a:t>
-            </a:r>
-            <a:r>
-              <a:rPr lang="en-IN" sz="1600" b="1" dirty="0" err="1"/>
-              <a:t>DefaultResourcesFilter</a:t>
-            </a:r>
-            <a:r>
-              <a:rPr lang="en-IN" sz="1600" b="1" dirty="0"/>
-              <a:t>, </a:t>
-            </a:r>
-            <a:r>
-              <a:rPr lang="en-IN" sz="1600" b="1" dirty="0" err="1"/>
-              <a:t>DefaultLoginPageGeneratingFilter</a:t>
-            </a:r>
-            <a:r>
-              <a:rPr lang="en-IN" sz="1600" b="1" dirty="0"/>
-              <a:t>, </a:t>
-            </a:r>
-            <a:r>
-              <a:rPr lang="en-IN" sz="1600" b="1" dirty="0" err="1"/>
-              <a:t>DefaultLogoutPageGeneratingFilter</a:t>
-            </a:r>
-            <a:r>
-              <a:rPr lang="en-IN" sz="1600" b="1" dirty="0"/>
-              <a:t>, </a:t>
-            </a:r>
-            <a:r>
-              <a:rPr lang="en-IN" sz="1600" b="1" dirty="0" err="1"/>
-              <a:t>BasicAuthenticationFilter</a:t>
-            </a:r>
-            <a:r>
-              <a:rPr lang="en-IN" sz="1600" b="1" dirty="0"/>
-              <a:t>, </a:t>
-            </a:r>
-            <a:r>
-              <a:rPr lang="en-IN" sz="1600" b="1" dirty="0" err="1"/>
-              <a:t>RequestCacheAwareFilter</a:t>
-            </a:r>
-            <a:r>
-              <a:rPr lang="en-IN" sz="1600" b="1" dirty="0"/>
-              <a:t>, </a:t>
-            </a:r>
-            <a:r>
-              <a:rPr lang="en-IN" sz="1600" b="1" dirty="0" err="1"/>
-              <a:t>SecurityContextHolderAwareRequestFilter</a:t>
-            </a:r>
-            <a:r>
-              <a:rPr lang="en-IN" sz="1600" b="1" dirty="0"/>
-              <a:t>, </a:t>
-            </a:r>
-            <a:r>
-              <a:rPr lang="en-IN" sz="1600" b="1" dirty="0" err="1"/>
-              <a:t>AnonymousAuthenticationFilter</a:t>
-            </a:r>
-            <a:r>
-              <a:rPr lang="en-IN" sz="1600" b="1" dirty="0"/>
-              <a:t>, </a:t>
-            </a:r>
-            <a:r>
-              <a:rPr lang="en-IN" sz="1600" b="1" dirty="0" err="1"/>
-              <a:t>ExceptionTranslationFilter</a:t>
-            </a:r>
-            <a:r>
-              <a:rPr lang="en-IN" sz="1600" b="1" dirty="0"/>
-              <a:t>, </a:t>
-            </a:r>
-            <a:r>
-              <a:rPr lang="en-IN" sz="1600" b="1" dirty="0" err="1"/>
-              <a:t>AuthorizationFilter</a:t>
-            </a:r>
-            <a:endParaRPr lang="en-IN" sz="1600" b="1" dirty="0"/>
-          </a:p>
-          <a:p>
-            <a:endParaRPr lang="en-IN" sz="1600" dirty="0"/>
-          </a:p>
-          <a:p>
-            <a:endParaRPr lang="en-IN" dirty="0"/>
-          </a:p>
-        </p:txBody>
-      </p:sp>
-    </p:spTree>
-    <p:extLst>
-      <p:ext uri="{BB962C8B-B14F-4D97-AF65-F5344CB8AC3E}">
-        <p14:creationId xmlns:p14="http://schemas.microsoft.com/office/powerpoint/2010/main" val="2252157703"/>
-      </p:ext>
-    </p:extLst>
-  </p:cSld>
-  <p:clrMapOvr>
-    <a:masterClrMapping/>
-  </p:clrMapOvr>
-</p:sld>
-</file>
-
-<file path=ppt/slides/slide14.xml><?xml version="1.0" encoding="utf-8"?>
-<p:sld xmlns:a="http://schemas.openxmlformats.org/drawingml/2006/main" xmlns:r="http://schemas.openxmlformats.org/officeDocument/2006/relationships" xmlns:p="http://schemas.openxmlformats.org/presentationml/2006/main">
-  <p:cSld>
-    <p:spTree>
-      <p:nvGrpSpPr>
-        <p:cNvPr id="1" name=""/>
-        <p:cNvGrpSpPr/>
-        <p:nvPr/>
-      </p:nvGrpSpPr>
-      <p:grpSpPr>
-        <a:xfrm>
-          <a:off x="0" y="0"/>
-          <a:ext cx="0" cy="0"/>
-          <a:chOff x="0" y="0"/>
-          <a:chExt cx="0" cy="0"/>
-        </a:xfrm>
-      </p:grpSpPr>
-      <p:sp>
-        <p:nvSpPr>
-          <p:cNvPr id="2" name="Title 1"/>
-          <p:cNvSpPr>
-            <a:spLocks noGrp="1"/>
-          </p:cNvSpPr>
-          <p:nvPr>
-            <p:ph type="title"/>
-          </p:nvPr>
-        </p:nvSpPr>
-        <p:spPr/>
-        <p:txBody>
-          <a:bodyPr>
-            <a:normAutofit fontScale="90000"/>
-          </a:bodyPr>
-          <a:lstStyle/>
-          <a:p>
-            <a:r>
-              <a:rPr lang="en-IN" b="1" dirty="0" err="1">
-                <a:effectLst/>
-              </a:rPr>
-              <a:t>Analyzing</a:t>
-            </a:r>
-            <a:r>
-              <a:rPr lang="en-IN" b="1" dirty="0">
-                <a:effectLst/>
-              </a:rPr>
-              <a:t> Spring’s </a:t>
-            </a:r>
-            <a:r>
-              <a:rPr lang="en-IN" b="1" dirty="0" err="1">
-                <a:effectLst/>
-              </a:rPr>
-              <a:t>FilterChain</a:t>
-            </a:r>
-            <a:r>
-              <a:rPr lang="en-IN" b="1" dirty="0">
-                <a:effectLst/>
-              </a:rPr>
-              <a:t/>
-            </a:r>
-            <a:br>
-              <a:rPr lang="en-IN" b="1" dirty="0">
-                <a:effectLst/>
-              </a:rPr>
-            </a:br>
-            <a:endParaRPr lang="en-IN" dirty="0"/>
-          </a:p>
-        </p:txBody>
-      </p:sp>
-      <p:sp>
-        <p:nvSpPr>
-          <p:cNvPr id="3" name="Content Placeholder 2"/>
-          <p:cNvSpPr>
-            <a:spLocks noGrp="1"/>
-          </p:cNvSpPr>
-          <p:nvPr>
-            <p:ph idx="1"/>
-          </p:nvPr>
-        </p:nvSpPr>
-        <p:spPr/>
-        <p:txBody>
-          <a:bodyPr>
-            <a:normAutofit/>
-          </a:bodyPr>
-          <a:lstStyle/>
-          <a:p>
-            <a:r>
-              <a:rPr lang="en-US" sz="1600" b="1" dirty="0" err="1"/>
-              <a:t>BasicAuthenticationFilter</a:t>
-            </a:r>
-            <a:r>
-              <a:rPr lang="en-US" sz="1600" dirty="0"/>
-              <a:t>: Tries to find a Basic </a:t>
-            </a:r>
-            <a:r>
-              <a:rPr lang="en-US" sz="1600" dirty="0" err="1"/>
-              <a:t>Auth</a:t>
-            </a:r>
-            <a:r>
-              <a:rPr lang="en-US" sz="1600" dirty="0"/>
-              <a:t> HTTP Header on the request and if found, tries to authenticate the user with the header’s username and password.</a:t>
-            </a:r>
-          </a:p>
-          <a:p>
-            <a:r>
-              <a:rPr lang="en-US" sz="1600" b="1" dirty="0" err="1"/>
-              <a:t>UsernamePasswordAuthenticationFilter</a:t>
-            </a:r>
-            <a:r>
-              <a:rPr lang="en-US" sz="1600" dirty="0"/>
-              <a:t>: Tries to find a username/password request parameter/POST body and if found, tries to authenticate the user with those values.</a:t>
-            </a:r>
-          </a:p>
-          <a:p>
-            <a:r>
-              <a:rPr lang="en-US" sz="1600" b="1" dirty="0" err="1"/>
-              <a:t>DefaultLoginPageGeneratingFilter</a:t>
-            </a:r>
-            <a:r>
-              <a:rPr lang="en-US" sz="1600" dirty="0"/>
-              <a:t>: Generates a login page for you, if you don’t explicitly disable that feature. THIS filter is why you get a default login page when enabling Spring Security.</a:t>
-            </a:r>
-          </a:p>
-          <a:p>
-            <a:r>
-              <a:rPr lang="en-US" sz="1600" b="1" dirty="0" err="1"/>
-              <a:t>DefaultLogoutPageGeneratingFilter</a:t>
-            </a:r>
-            <a:r>
-              <a:rPr lang="en-US" sz="1600" dirty="0"/>
-              <a:t>: Generates a logout page for you, if you don’t explicitly disable that feature.</a:t>
-            </a:r>
-          </a:p>
-          <a:p>
-            <a:r>
-              <a:rPr lang="en-US" sz="1600" b="1" dirty="0" err="1"/>
-              <a:t>FilterSecurityInterceptor</a:t>
-            </a:r>
-            <a:r>
-              <a:rPr lang="en-US" sz="1600" dirty="0"/>
-              <a:t>: Does your authorization.</a:t>
-            </a:r>
-          </a:p>
-          <a:p>
-            <a:endParaRPr lang="en-IN" dirty="0"/>
-          </a:p>
-        </p:txBody>
-      </p:sp>
-    </p:spTree>
-    <p:extLst>
-      <p:ext uri="{BB962C8B-B14F-4D97-AF65-F5344CB8AC3E}">
-        <p14:creationId xmlns:p14="http://schemas.microsoft.com/office/powerpoint/2010/main" val="87343960"/>
-      </p:ext>
-    </p:extLst>
-  </p:cSld>
-  <p:clrMapOvr>
-    <a:masterClrMapping/>
-  </p:clrMapOvr>
-</p:sld>
-</file>
-
-<file path=ppt/slides/slide15.xml><?xml version="1.0" encoding="utf-8"?>
-<p:sld xmlns:a="http://schemas.openxmlformats.org/drawingml/2006/main" xmlns:r="http://schemas.openxmlformats.org/officeDocument/2006/relationships" xmlns:p="http://schemas.openxmlformats.org/presentationml/2006/main">
-  <p:cSld>
-    <p:spTree>
-      <p:nvGrpSpPr>
-        <p:cNvPr id="1" name=""/>
-        <p:cNvGrpSpPr/>
-        <p:nvPr/>
-      </p:nvGrpSpPr>
-      <p:grpSpPr>
-        <a:xfrm>
-          <a:off x="0" y="0"/>
-          <a:ext cx="0" cy="0"/>
-          <a:chOff x="0" y="0"/>
-          <a:chExt cx="0" cy="0"/>
-        </a:xfrm>
-      </p:grpSpPr>
-      <p:sp>
-        <p:nvSpPr>
-          <p:cNvPr id="2" name="Title 1"/>
-          <p:cNvSpPr>
-            <a:spLocks noGrp="1"/>
-          </p:cNvSpPr>
-          <p:nvPr>
-            <p:ph type="title"/>
-          </p:nvPr>
-        </p:nvSpPr>
-        <p:spPr/>
-        <p:txBody>
-          <a:bodyPr>
-            <a:normAutofit/>
-          </a:bodyPr>
-          <a:lstStyle/>
-          <a:p>
-            <a:r>
-              <a:rPr lang="en-IN" dirty="0" err="1"/>
-              <a:t>SecurityFilterChain</a:t>
-            </a:r>
-            <a:r>
-              <a:rPr lang="en-IN" dirty="0"/>
-              <a:t> </a:t>
-            </a:r>
-            <a:r>
-              <a:rPr lang="en-IN" b="1" dirty="0">
-                <a:effectLst/>
-              </a:rPr>
-              <a:t/>
-            </a:r>
-            <a:br>
-              <a:rPr lang="en-IN" b="1" dirty="0">
-                <a:effectLst/>
-              </a:rPr>
-            </a:br>
-            <a:endParaRPr lang="en-IN" dirty="0"/>
-          </a:p>
-        </p:txBody>
-      </p:sp>
-      <p:sp>
-        <p:nvSpPr>
-          <p:cNvPr id="3" name="Content Placeholder 2"/>
-          <p:cNvSpPr>
-            <a:spLocks noGrp="1"/>
-          </p:cNvSpPr>
-          <p:nvPr>
-            <p:ph idx="1"/>
-          </p:nvPr>
-        </p:nvSpPr>
-        <p:spPr>
-          <a:xfrm>
-            <a:off x="467544" y="1124744"/>
-            <a:ext cx="8229600" cy="4572000"/>
-          </a:xfrm>
-        </p:spPr>
-        <p:txBody>
-          <a:bodyPr>
-            <a:normAutofit/>
-          </a:bodyPr>
-          <a:lstStyle/>
-          <a:p>
-            <a:r>
-              <a:rPr lang="en-US" sz="1600" dirty="0"/>
-              <a:t>With the latest Spring Security and/or Spring Boot versions, the way to configure Spring Security is by having a class </a:t>
-            </a:r>
-            <a:r>
-              <a:rPr lang="en-US" sz="1600" dirty="0" smtClean="0"/>
-              <a:t>that </a:t>
-            </a:r>
-            <a:r>
-              <a:rPr lang="en-IN" sz="1600" dirty="0"/>
-              <a:t>Is annotated with @</a:t>
-            </a:r>
-            <a:r>
-              <a:rPr lang="en-IN" sz="1600" dirty="0" err="1" smtClean="0"/>
-              <a:t>EnableWebSecurity</a:t>
-            </a:r>
-            <a:r>
-              <a:rPr lang="en-IN" sz="1600" dirty="0" smtClean="0"/>
-              <a:t> and  define </a:t>
-            </a:r>
-            <a:r>
-              <a:rPr lang="en-US" sz="1600" dirty="0"/>
-              <a:t>define your own </a:t>
-            </a:r>
-            <a:r>
-              <a:rPr lang="en-US" sz="1600" b="1" dirty="0" err="1"/>
-              <a:t>SecurityFilterChain</a:t>
-            </a:r>
-            <a:r>
-              <a:rPr lang="en-US" sz="1600" dirty="0"/>
-              <a:t> </a:t>
-            </a:r>
-            <a:r>
-              <a:rPr lang="en-US" sz="1600" dirty="0" smtClean="0"/>
-              <a:t>bean which </a:t>
-            </a:r>
-            <a:r>
-              <a:rPr lang="en-US" sz="1600" dirty="0"/>
-              <a:t>basically offers you a configuration </a:t>
-            </a:r>
-            <a:r>
-              <a:rPr lang="en-US" sz="1600" dirty="0" smtClean="0"/>
-              <a:t>methods</a:t>
-            </a:r>
-            <a:r>
-              <a:rPr lang="en-US" sz="1600" dirty="0"/>
-              <a:t>. With those methods, you can specify what URIs in your application to protect or what exploit protections to </a:t>
-            </a:r>
-            <a:r>
-              <a:rPr lang="en-US" sz="1600" dirty="0" smtClean="0"/>
-              <a:t>enable/disable</a:t>
-            </a:r>
-          </a:p>
-          <a:p>
-            <a:r>
-              <a:rPr lang="en-US" sz="1600" dirty="0"/>
-              <a:t>By default, if no custom </a:t>
-            </a:r>
-            <a:r>
-              <a:rPr lang="en-US" sz="1600" dirty="0" err="1"/>
-              <a:t>SecurityFilterChain</a:t>
-            </a:r>
-            <a:r>
-              <a:rPr lang="en-US" sz="1600" dirty="0"/>
-              <a:t> bean is defined, Spring Security applies a default configuration that secures all </a:t>
-            </a:r>
-            <a:r>
-              <a:rPr lang="en-US" sz="1600" dirty="0" smtClean="0"/>
-              <a:t>endpoints</a:t>
-            </a:r>
-          </a:p>
-          <a:p>
-            <a:pPr marL="64008" indent="0">
-              <a:buNone/>
-            </a:pPr>
-            <a:endParaRPr lang="en-IN" sz="1600" dirty="0"/>
-          </a:p>
-        </p:txBody>
-      </p:sp>
-      <p:graphicFrame>
-        <p:nvGraphicFramePr>
-          <p:cNvPr id="4" name="Table 3"/>
-          <p:cNvGraphicFramePr>
-            <a:graphicFrameLocks noGrp="1"/>
-          </p:cNvGraphicFramePr>
-          <p:nvPr>
-            <p:extLst>
-              <p:ext uri="{D42A27DB-BD31-4B8C-83A1-F6EECF244321}">
-                <p14:modId xmlns:p14="http://schemas.microsoft.com/office/powerpoint/2010/main" val="3479213363"/>
-              </p:ext>
-            </p:extLst>
-          </p:nvPr>
-        </p:nvGraphicFramePr>
-        <p:xfrm>
-          <a:off x="755576" y="3284984"/>
-          <a:ext cx="8136904" cy="3363848"/>
-        </p:xfrm>
-        <a:graphic>
-          <a:graphicData uri="http://schemas.openxmlformats.org/drawingml/2006/table">
-            <a:tbl>
-              <a:tblPr firstRow="1" bandRow="1">
-                <a:tableStyleId>{5C22544A-7EE6-4342-B048-85BDC9FD1C3A}</a:tableStyleId>
-              </a:tblPr>
-              <a:tblGrid>
-                <a:gridCol w="8136904"/>
-              </a:tblGrid>
-              <a:tr h="3363848">
-                <a:tc>
-                  <a:txBody>
-                    <a:bodyPr/>
-                    <a:lstStyle/>
-                    <a:p>
-                      <a:pPr marL="0" marR="0" indent="0" algn="l" defTabSz="914400" rtl="0" eaLnBrk="1" fontAlgn="auto" latinLnBrk="0" hangingPunct="1">
-                        <a:lnSpc>
-                          <a:spcPct val="100000"/>
-                        </a:lnSpc>
-                        <a:spcBef>
-                          <a:spcPts val="0"/>
-                        </a:spcBef>
-                        <a:spcAft>
-                          <a:spcPts val="0"/>
-                        </a:spcAft>
-                        <a:buClrTx/>
-                        <a:buSzTx/>
-                        <a:buFontTx/>
-                        <a:buNone/>
-                        <a:tabLst/>
-                        <a:defRPr/>
-                      </a:pPr>
-                      <a:r>
-                        <a:rPr kumimoji="0" lang="en-IN" sz="1600" b="1" kern="1200" dirty="0" smtClean="0">
-                          <a:solidFill>
-                            <a:schemeClr val="lt1"/>
-                          </a:solidFill>
-                          <a:effectLst/>
-                          <a:latin typeface="+mn-lt"/>
-                          <a:ea typeface="+mn-ea"/>
-                          <a:cs typeface="+mn-cs"/>
-                        </a:rPr>
-                        <a:t>@Configuration</a:t>
-                      </a:r>
-                      <a:br>
-                        <a:rPr kumimoji="0" lang="en-IN" sz="1600" b="1" kern="1200" dirty="0" smtClean="0">
-                          <a:solidFill>
-                            <a:schemeClr val="lt1"/>
-                          </a:solidFill>
-                          <a:effectLst/>
-                          <a:latin typeface="+mn-lt"/>
-                          <a:ea typeface="+mn-ea"/>
-                          <a:cs typeface="+mn-cs"/>
-                        </a:rPr>
-                      </a:br>
-                      <a:r>
-                        <a:rPr kumimoji="0" lang="en-IN" sz="1600" b="1" kern="1200" dirty="0" smtClean="0">
-                          <a:solidFill>
-                            <a:schemeClr val="lt1"/>
-                          </a:solidFill>
-                          <a:effectLst/>
-                          <a:latin typeface="+mn-lt"/>
-                          <a:ea typeface="+mn-ea"/>
-                          <a:cs typeface="+mn-cs"/>
-                        </a:rPr>
-                        <a:t>@</a:t>
-                      </a:r>
-                      <a:r>
-                        <a:rPr kumimoji="0" lang="en-IN" sz="1600" b="1" kern="1200" dirty="0" err="1" smtClean="0">
-                          <a:solidFill>
-                            <a:schemeClr val="lt1"/>
-                          </a:solidFill>
-                          <a:effectLst/>
-                          <a:latin typeface="+mn-lt"/>
-                          <a:ea typeface="+mn-ea"/>
-                          <a:cs typeface="+mn-cs"/>
-                        </a:rPr>
-                        <a:t>EnableWebSecurity</a:t>
-                      </a:r>
-                      <a:r>
-                        <a:rPr kumimoji="0" lang="en-IN" sz="1600" b="1" kern="1200" dirty="0" smtClean="0">
-                          <a:solidFill>
-                            <a:schemeClr val="lt1"/>
-                          </a:solidFill>
-                          <a:effectLst/>
-                          <a:latin typeface="+mn-lt"/>
-                          <a:ea typeface="+mn-ea"/>
-                          <a:cs typeface="+mn-cs"/>
-                        </a:rPr>
-                        <a:t/>
-                      </a:r>
-                      <a:br>
-                        <a:rPr kumimoji="0" lang="en-IN" sz="1600" b="1" kern="1200" dirty="0" smtClean="0">
-                          <a:solidFill>
-                            <a:schemeClr val="lt1"/>
-                          </a:solidFill>
-                          <a:effectLst/>
-                          <a:latin typeface="+mn-lt"/>
-                          <a:ea typeface="+mn-ea"/>
-                          <a:cs typeface="+mn-cs"/>
-                        </a:rPr>
-                      </a:br>
-                      <a:r>
-                        <a:rPr kumimoji="0" lang="en-IN" sz="1600" b="1" kern="1200" dirty="0" smtClean="0">
-                          <a:solidFill>
-                            <a:schemeClr val="lt1"/>
-                          </a:solidFill>
-                          <a:effectLst/>
-                          <a:latin typeface="+mn-lt"/>
-                          <a:ea typeface="+mn-ea"/>
-                          <a:cs typeface="+mn-cs"/>
-                        </a:rPr>
-                        <a:t>public class </a:t>
-                      </a:r>
-                      <a:r>
-                        <a:rPr kumimoji="0" lang="en-IN" sz="1600" b="1" kern="1200" dirty="0" err="1" smtClean="0">
-                          <a:solidFill>
-                            <a:schemeClr val="lt1"/>
-                          </a:solidFill>
-                          <a:effectLst/>
-                          <a:latin typeface="+mn-lt"/>
-                          <a:ea typeface="+mn-ea"/>
-                          <a:cs typeface="+mn-cs"/>
-                        </a:rPr>
-                        <a:t>WebSecurityConfig</a:t>
-                      </a:r>
-                      <a:r>
-                        <a:rPr kumimoji="0" lang="en-IN" sz="1600" b="1" kern="1200" dirty="0" smtClean="0">
-                          <a:solidFill>
-                            <a:schemeClr val="lt1"/>
-                          </a:solidFill>
-                          <a:effectLst/>
-                          <a:latin typeface="+mn-lt"/>
-                          <a:ea typeface="+mn-ea"/>
-                          <a:cs typeface="+mn-cs"/>
-                        </a:rPr>
-                        <a:t> {</a:t>
-                      </a:r>
-                      <a:br>
-                        <a:rPr kumimoji="0" lang="en-IN" sz="1600" b="1" kern="1200" dirty="0" smtClean="0">
-                          <a:solidFill>
-                            <a:schemeClr val="lt1"/>
-                          </a:solidFill>
-                          <a:effectLst/>
-                          <a:latin typeface="+mn-lt"/>
-                          <a:ea typeface="+mn-ea"/>
-                          <a:cs typeface="+mn-cs"/>
-                        </a:rPr>
-                      </a:br>
-                      <a:r>
-                        <a:rPr kumimoji="0" lang="en-IN" sz="1600" b="1" kern="1200" dirty="0" smtClean="0">
-                          <a:solidFill>
-                            <a:schemeClr val="lt1"/>
-                          </a:solidFill>
-                          <a:effectLst/>
-                          <a:latin typeface="+mn-lt"/>
-                          <a:ea typeface="+mn-ea"/>
-                          <a:cs typeface="+mn-cs"/>
-                        </a:rPr>
-                        <a:t>    @Bean</a:t>
-                      </a:r>
-                      <a:br>
-                        <a:rPr kumimoji="0" lang="en-IN" sz="1600" b="1" kern="1200" dirty="0" smtClean="0">
-                          <a:solidFill>
-                            <a:schemeClr val="lt1"/>
-                          </a:solidFill>
-                          <a:effectLst/>
-                          <a:latin typeface="+mn-lt"/>
-                          <a:ea typeface="+mn-ea"/>
-                          <a:cs typeface="+mn-cs"/>
-                        </a:rPr>
-                      </a:br>
-                      <a:r>
-                        <a:rPr kumimoji="0" lang="en-IN" sz="1600" b="1" kern="1200" dirty="0" smtClean="0">
-                          <a:solidFill>
-                            <a:schemeClr val="lt1"/>
-                          </a:solidFill>
-                          <a:effectLst/>
-                          <a:latin typeface="+mn-lt"/>
-                          <a:ea typeface="+mn-ea"/>
-                          <a:cs typeface="+mn-cs"/>
-                        </a:rPr>
-                        <a:t>    public </a:t>
-                      </a:r>
-                      <a:r>
-                        <a:rPr kumimoji="0" lang="en-IN" sz="1600" b="1" kern="1200" dirty="0" err="1" smtClean="0">
-                          <a:solidFill>
-                            <a:schemeClr val="lt1"/>
-                          </a:solidFill>
-                          <a:effectLst/>
-                          <a:latin typeface="+mn-lt"/>
-                          <a:ea typeface="+mn-ea"/>
-                          <a:cs typeface="+mn-cs"/>
-                        </a:rPr>
-                        <a:t>SecurityFilterChain</a:t>
-                      </a:r>
-                      <a:r>
-                        <a:rPr kumimoji="0" lang="en-IN" sz="1600" b="1" kern="1200" dirty="0" smtClean="0">
-                          <a:solidFill>
-                            <a:schemeClr val="lt1"/>
-                          </a:solidFill>
-                          <a:effectLst/>
-                          <a:latin typeface="+mn-lt"/>
-                          <a:ea typeface="+mn-ea"/>
-                          <a:cs typeface="+mn-cs"/>
-                        </a:rPr>
-                        <a:t> </a:t>
-                      </a:r>
-                      <a:r>
-                        <a:rPr kumimoji="0" lang="en-IN" sz="1600" b="1" kern="1200" dirty="0" err="1" smtClean="0">
-                          <a:solidFill>
-                            <a:schemeClr val="lt1"/>
-                          </a:solidFill>
-                          <a:effectLst/>
-                          <a:latin typeface="+mn-lt"/>
-                          <a:ea typeface="+mn-ea"/>
-                          <a:cs typeface="+mn-cs"/>
-                        </a:rPr>
-                        <a:t>filterChain</a:t>
-                      </a:r>
-                      <a:r>
-                        <a:rPr kumimoji="0" lang="en-IN" sz="1600" b="1" kern="1200" dirty="0" smtClean="0">
-                          <a:solidFill>
-                            <a:schemeClr val="lt1"/>
-                          </a:solidFill>
-                          <a:effectLst/>
-                          <a:latin typeface="+mn-lt"/>
-                          <a:ea typeface="+mn-ea"/>
-                          <a:cs typeface="+mn-cs"/>
-                        </a:rPr>
-                        <a:t>(</a:t>
-                      </a:r>
-                      <a:r>
-                        <a:rPr kumimoji="0" lang="en-IN" sz="1600" b="1" kern="1200" dirty="0" err="1" smtClean="0">
-                          <a:solidFill>
-                            <a:schemeClr val="lt1"/>
-                          </a:solidFill>
-                          <a:effectLst/>
-                          <a:latin typeface="+mn-lt"/>
-                          <a:ea typeface="+mn-ea"/>
-                          <a:cs typeface="+mn-cs"/>
-                        </a:rPr>
-                        <a:t>HttpSecurity</a:t>
-                      </a:r>
-                      <a:r>
-                        <a:rPr kumimoji="0" lang="en-IN" sz="1600" b="1" kern="1200" dirty="0" smtClean="0">
-                          <a:solidFill>
-                            <a:schemeClr val="lt1"/>
-                          </a:solidFill>
-                          <a:effectLst/>
-                          <a:latin typeface="+mn-lt"/>
-                          <a:ea typeface="+mn-ea"/>
-                          <a:cs typeface="+mn-cs"/>
-                        </a:rPr>
-                        <a:t> http) throws Exception {</a:t>
-                      </a:r>
-                      <a:br>
-                        <a:rPr kumimoji="0" lang="en-IN" sz="1600" b="1" kern="1200" dirty="0" smtClean="0">
-                          <a:solidFill>
-                            <a:schemeClr val="lt1"/>
-                          </a:solidFill>
-                          <a:effectLst/>
-                          <a:latin typeface="+mn-lt"/>
-                          <a:ea typeface="+mn-ea"/>
-                          <a:cs typeface="+mn-cs"/>
-                        </a:rPr>
-                      </a:br>
-                      <a:r>
-                        <a:rPr kumimoji="0" lang="en-IN" sz="1600" b="1" kern="1200" dirty="0" smtClean="0">
-                          <a:solidFill>
-                            <a:schemeClr val="lt1"/>
-                          </a:solidFill>
-                          <a:effectLst/>
-                          <a:latin typeface="+mn-lt"/>
-                          <a:ea typeface="+mn-ea"/>
-                          <a:cs typeface="+mn-cs"/>
-                        </a:rPr>
-                        <a:t>        </a:t>
-                      </a:r>
-                      <a:r>
-                        <a:rPr kumimoji="0" lang="en-IN" sz="1600" b="1" kern="1200" dirty="0" err="1" smtClean="0">
-                          <a:solidFill>
-                            <a:schemeClr val="lt1"/>
-                          </a:solidFill>
-                          <a:effectLst/>
-                          <a:latin typeface="+mn-lt"/>
-                          <a:ea typeface="+mn-ea"/>
-                          <a:cs typeface="+mn-cs"/>
-                        </a:rPr>
-                        <a:t>http.authorizeHttpRequests</a:t>
-                      </a:r>
-                      <a:r>
-                        <a:rPr kumimoji="0" lang="en-IN" sz="1600" b="1" kern="1200" dirty="0" smtClean="0">
-                          <a:solidFill>
-                            <a:schemeClr val="lt1"/>
-                          </a:solidFill>
-                          <a:effectLst/>
-                          <a:latin typeface="+mn-lt"/>
-                          <a:ea typeface="+mn-ea"/>
-                          <a:cs typeface="+mn-cs"/>
-                        </a:rPr>
-                        <a:t>((authorize) -&gt; {</a:t>
-                      </a:r>
-                      <a:br>
-                        <a:rPr kumimoji="0" lang="en-IN" sz="1600" b="1" kern="1200" dirty="0" smtClean="0">
-                          <a:solidFill>
-                            <a:schemeClr val="lt1"/>
-                          </a:solidFill>
-                          <a:effectLst/>
-                          <a:latin typeface="+mn-lt"/>
-                          <a:ea typeface="+mn-ea"/>
-                          <a:cs typeface="+mn-cs"/>
-                        </a:rPr>
-                      </a:br>
-                      <a:r>
-                        <a:rPr kumimoji="0" lang="en-IN" sz="1600" b="1" kern="1200" dirty="0" smtClean="0">
-                          <a:solidFill>
-                            <a:schemeClr val="lt1"/>
-                          </a:solidFill>
-                          <a:effectLst/>
-                          <a:latin typeface="+mn-lt"/>
-                          <a:ea typeface="+mn-ea"/>
-                          <a:cs typeface="+mn-cs"/>
-                        </a:rPr>
-                        <a:t>            </a:t>
-                      </a:r>
-                      <a:r>
-                        <a:rPr kumimoji="0" lang="en-IN" sz="1600" b="1" kern="1200" dirty="0" err="1" smtClean="0">
-                          <a:solidFill>
-                            <a:schemeClr val="lt1"/>
-                          </a:solidFill>
-                          <a:effectLst/>
-                          <a:latin typeface="+mn-lt"/>
-                          <a:ea typeface="+mn-ea"/>
-                          <a:cs typeface="+mn-cs"/>
-                        </a:rPr>
-                        <a:t>authorize.requestMatchers</a:t>
-                      </a:r>
-                      <a:r>
-                        <a:rPr kumimoji="0" lang="en-IN" sz="1600" b="1" kern="1200" dirty="0" smtClean="0">
-                          <a:solidFill>
-                            <a:schemeClr val="lt1"/>
-                          </a:solidFill>
-                          <a:effectLst/>
-                          <a:latin typeface="+mn-lt"/>
-                          <a:ea typeface="+mn-ea"/>
-                          <a:cs typeface="+mn-cs"/>
-                        </a:rPr>
-                        <a:t>("/home").</a:t>
-                      </a:r>
-                      <a:r>
-                        <a:rPr kumimoji="0" lang="en-IN" sz="1600" b="1" kern="1200" dirty="0" err="1" smtClean="0">
-                          <a:solidFill>
-                            <a:schemeClr val="lt1"/>
-                          </a:solidFill>
-                          <a:effectLst/>
-                          <a:latin typeface="+mn-lt"/>
-                          <a:ea typeface="+mn-ea"/>
-                          <a:cs typeface="+mn-cs"/>
-                        </a:rPr>
-                        <a:t>permitAll</a:t>
-                      </a:r>
-                      <a:r>
-                        <a:rPr kumimoji="0" lang="en-IN" sz="1600" b="1" kern="1200" dirty="0" smtClean="0">
-                          <a:solidFill>
-                            <a:schemeClr val="lt1"/>
-                          </a:solidFill>
-                          <a:effectLst/>
-                          <a:latin typeface="+mn-lt"/>
-                          <a:ea typeface="+mn-ea"/>
-                          <a:cs typeface="+mn-cs"/>
-                        </a:rPr>
-                        <a:t>();</a:t>
-                      </a:r>
-                      <a:br>
-                        <a:rPr kumimoji="0" lang="en-IN" sz="1600" b="1" kern="1200" dirty="0" smtClean="0">
-                          <a:solidFill>
-                            <a:schemeClr val="lt1"/>
-                          </a:solidFill>
-                          <a:effectLst/>
-                          <a:latin typeface="+mn-lt"/>
-                          <a:ea typeface="+mn-ea"/>
-                          <a:cs typeface="+mn-cs"/>
-                        </a:rPr>
-                      </a:br>
-                      <a:r>
-                        <a:rPr kumimoji="0" lang="en-IN" sz="1600" b="1" kern="1200" dirty="0" smtClean="0">
-                          <a:solidFill>
-                            <a:schemeClr val="lt1"/>
-                          </a:solidFill>
-                          <a:effectLst/>
-                          <a:latin typeface="+mn-lt"/>
-                          <a:ea typeface="+mn-ea"/>
-                          <a:cs typeface="+mn-cs"/>
-                        </a:rPr>
-                        <a:t>            </a:t>
-                      </a:r>
-                      <a:r>
-                        <a:rPr kumimoji="0" lang="en-IN" sz="1600" b="1" kern="1200" dirty="0" err="1" smtClean="0">
-                          <a:solidFill>
-                            <a:schemeClr val="lt1"/>
-                          </a:solidFill>
-                          <a:effectLst/>
-                          <a:latin typeface="+mn-lt"/>
-                          <a:ea typeface="+mn-ea"/>
-                          <a:cs typeface="+mn-cs"/>
-                        </a:rPr>
-                        <a:t>authorize.anyRequest</a:t>
-                      </a:r>
-                      <a:r>
-                        <a:rPr kumimoji="0" lang="en-IN" sz="1600" b="1" kern="1200" dirty="0" smtClean="0">
-                          <a:solidFill>
-                            <a:schemeClr val="lt1"/>
-                          </a:solidFill>
-                          <a:effectLst/>
-                          <a:latin typeface="+mn-lt"/>
-                          <a:ea typeface="+mn-ea"/>
-                          <a:cs typeface="+mn-cs"/>
-                        </a:rPr>
-                        <a:t>().authenticated();</a:t>
-                      </a:r>
-                      <a:br>
-                        <a:rPr kumimoji="0" lang="en-IN" sz="1600" b="1" kern="1200" dirty="0" smtClean="0">
-                          <a:solidFill>
-                            <a:schemeClr val="lt1"/>
-                          </a:solidFill>
-                          <a:effectLst/>
-                          <a:latin typeface="+mn-lt"/>
-                          <a:ea typeface="+mn-ea"/>
-                          <a:cs typeface="+mn-cs"/>
-                        </a:rPr>
-                      </a:br>
-                      <a:r>
-                        <a:rPr kumimoji="0" lang="en-IN" sz="1600" b="1" kern="1200" dirty="0" smtClean="0">
-                          <a:solidFill>
-                            <a:schemeClr val="lt1"/>
-                          </a:solidFill>
-                          <a:effectLst/>
-                          <a:latin typeface="+mn-lt"/>
-                          <a:ea typeface="+mn-ea"/>
-                          <a:cs typeface="+mn-cs"/>
-                        </a:rPr>
-                        <a:t>        }).</a:t>
-                      </a:r>
-                      <a:r>
-                        <a:rPr kumimoji="0" lang="en-IN" sz="1600" b="1" kern="1200" dirty="0" err="1" smtClean="0">
-                          <a:solidFill>
-                            <a:schemeClr val="lt1"/>
-                          </a:solidFill>
-                          <a:effectLst/>
-                          <a:latin typeface="+mn-lt"/>
-                          <a:ea typeface="+mn-ea"/>
-                          <a:cs typeface="+mn-cs"/>
-                        </a:rPr>
-                        <a:t>httpBasic</a:t>
-                      </a:r>
-                      <a:r>
-                        <a:rPr kumimoji="0" lang="en-IN" sz="1600" b="1" kern="1200" dirty="0" smtClean="0">
-                          <a:solidFill>
-                            <a:schemeClr val="lt1"/>
-                          </a:solidFill>
-                          <a:effectLst/>
-                          <a:latin typeface="+mn-lt"/>
-                          <a:ea typeface="+mn-ea"/>
-                          <a:cs typeface="+mn-cs"/>
-                        </a:rPr>
-                        <a:t>(</a:t>
-                      </a:r>
-                      <a:r>
-                        <a:rPr kumimoji="0" lang="en-IN" sz="1600" b="1" kern="1200" dirty="0" err="1" smtClean="0">
-                          <a:solidFill>
-                            <a:schemeClr val="lt1"/>
-                          </a:solidFill>
-                          <a:effectLst/>
-                          <a:latin typeface="+mn-lt"/>
-                          <a:ea typeface="+mn-ea"/>
-                          <a:cs typeface="+mn-cs"/>
-                        </a:rPr>
-                        <a:t>AbstractHttpConfigurer</a:t>
-                      </a:r>
-                      <a:r>
-                        <a:rPr kumimoji="0" lang="en-IN" sz="1600" b="1" kern="1200" dirty="0" smtClean="0">
-                          <a:solidFill>
-                            <a:schemeClr val="lt1"/>
-                          </a:solidFill>
-                          <a:effectLst/>
-                          <a:latin typeface="+mn-lt"/>
-                          <a:ea typeface="+mn-ea"/>
-                          <a:cs typeface="+mn-cs"/>
-                        </a:rPr>
-                        <a:t>::disable);</a:t>
-                      </a:r>
-                      <a:br>
-                        <a:rPr kumimoji="0" lang="en-IN" sz="1600" b="1" kern="1200" dirty="0" smtClean="0">
-                          <a:solidFill>
-                            <a:schemeClr val="lt1"/>
-                          </a:solidFill>
-                          <a:effectLst/>
-                          <a:latin typeface="+mn-lt"/>
-                          <a:ea typeface="+mn-ea"/>
-                          <a:cs typeface="+mn-cs"/>
-                        </a:rPr>
-                      </a:br>
-                      <a:r>
-                        <a:rPr kumimoji="0" lang="en-IN" sz="1600" b="1" kern="1200" dirty="0" smtClean="0">
-                          <a:solidFill>
-                            <a:schemeClr val="lt1"/>
-                          </a:solidFill>
-                          <a:effectLst/>
-                          <a:latin typeface="+mn-lt"/>
-                          <a:ea typeface="+mn-ea"/>
-                          <a:cs typeface="+mn-cs"/>
-                        </a:rPr>
-                        <a:t>        return </a:t>
-                      </a:r>
-                      <a:r>
-                        <a:rPr kumimoji="0" lang="en-IN" sz="1600" b="1" kern="1200" dirty="0" err="1" smtClean="0">
-                          <a:solidFill>
-                            <a:schemeClr val="lt1"/>
-                          </a:solidFill>
-                          <a:effectLst/>
-                          <a:latin typeface="+mn-lt"/>
-                          <a:ea typeface="+mn-ea"/>
-                          <a:cs typeface="+mn-cs"/>
-                        </a:rPr>
-                        <a:t>http.build</a:t>
-                      </a:r>
-                      <a:r>
-                        <a:rPr kumimoji="0" lang="en-IN" sz="1600" b="1" kern="1200" dirty="0" smtClean="0">
-                          <a:solidFill>
-                            <a:schemeClr val="lt1"/>
-                          </a:solidFill>
-                          <a:effectLst/>
-                          <a:latin typeface="+mn-lt"/>
-                          <a:ea typeface="+mn-ea"/>
-                          <a:cs typeface="+mn-cs"/>
-                        </a:rPr>
-                        <a:t>();</a:t>
-                      </a:r>
-                      <a:br>
-                        <a:rPr kumimoji="0" lang="en-IN" sz="1600" b="1" kern="1200" dirty="0" smtClean="0">
-                          <a:solidFill>
-                            <a:schemeClr val="lt1"/>
-                          </a:solidFill>
-                          <a:effectLst/>
-                          <a:latin typeface="+mn-lt"/>
-                          <a:ea typeface="+mn-ea"/>
-                          <a:cs typeface="+mn-cs"/>
-                        </a:rPr>
-                      </a:br>
-                      <a:r>
-                        <a:rPr kumimoji="0" lang="en-IN" sz="1600" b="1" kern="1200" dirty="0" smtClean="0">
-                          <a:solidFill>
-                            <a:schemeClr val="lt1"/>
-                          </a:solidFill>
-                          <a:effectLst/>
-                          <a:latin typeface="+mn-lt"/>
-                          <a:ea typeface="+mn-ea"/>
-                          <a:cs typeface="+mn-cs"/>
-                        </a:rPr>
-                        <a:t>    }</a:t>
-                      </a:r>
-                      <a:br>
-                        <a:rPr kumimoji="0" lang="en-IN" sz="1600" b="1" kern="1200" dirty="0" smtClean="0">
-                          <a:solidFill>
-                            <a:schemeClr val="lt1"/>
-                          </a:solidFill>
-                          <a:effectLst/>
-                          <a:latin typeface="+mn-lt"/>
-                          <a:ea typeface="+mn-ea"/>
-                          <a:cs typeface="+mn-cs"/>
-                        </a:rPr>
-                      </a:br>
-                      <a:r>
-                        <a:rPr kumimoji="0" lang="en-IN" sz="1600" b="1" kern="1200" dirty="0" smtClean="0">
-                          <a:solidFill>
-                            <a:schemeClr val="lt1"/>
-                          </a:solidFill>
-                          <a:effectLst/>
-                          <a:latin typeface="+mn-lt"/>
-                          <a:ea typeface="+mn-ea"/>
-                          <a:cs typeface="+mn-cs"/>
-                        </a:rPr>
-                        <a:t>}</a:t>
-                      </a:r>
-                    </a:p>
-                    <a:p>
-                      <a:endParaRPr lang="en-IN" dirty="0"/>
-                    </a:p>
-                  </a:txBody>
-                  <a:tcPr/>
-                </a:tc>
-              </a:tr>
-            </a:tbl>
-          </a:graphicData>
-        </a:graphic>
-      </p:graphicFrame>
-    </p:spTree>
-    <p:extLst>
-      <p:ext uri="{BB962C8B-B14F-4D97-AF65-F5344CB8AC3E}">
-        <p14:creationId xmlns:p14="http://schemas.microsoft.com/office/powerpoint/2010/main" val="1583170581"/>
-      </p:ext>
-    </p:extLst>
-  </p:cSld>
-  <p:clrMapOvr>
-    <a:masterClrMapping/>
-  </p:clrMapOvr>
-</p:sld>
-</file>
-
 <file path=ppt/slides/slide2.xml><?xml version="1.0" encoding="utf-8"?>
 <p:sld xmlns:a="http://schemas.openxmlformats.org/drawingml/2006/main" xmlns:r="http://schemas.openxmlformats.org/officeDocument/2006/relationships" xmlns:p="http://schemas.openxmlformats.org/presentationml/2006/main">
   <p:cSld>
@@ -6884,7 +5142,11 @@
           <a:p>
             <a:r>
               <a:rPr lang="en-US" dirty="0" smtClean="0"/>
-              <a:t>Create Table</a:t>
+              <a:t>Spring </a:t>
+            </a:r>
+            <a:r>
+              <a:rPr lang="en-US" dirty="0" smtClean="0"/>
+              <a:t>MVC Design Pattern</a:t>
             </a:r>
             <a:endParaRPr lang="en-IN" dirty="0"/>
           </a:p>
@@ -6905,14 +5167,90 @@
           <a:bodyPr/>
           <a:lstStyle/>
           <a:p>
-            <a:endParaRPr lang="en-IN"/>
-          </a:p>
-        </p:txBody>
-      </p:sp>
+            <a:r>
+              <a:rPr lang="en-IN" sz="2000" dirty="0">
+                <a:hlinkClick r:id="rId2"/>
+              </a:rPr>
+              <a:t>https://www.geeksforgeeks.org/spring-mvc-framework</a:t>
+            </a:r>
+            <a:r>
+              <a:rPr lang="en-IN" sz="2000" dirty="0" smtClean="0">
+                <a:hlinkClick r:id="rId2"/>
+              </a:rPr>
+              <a:t>/</a:t>
+            </a:r>
+            <a:endParaRPr lang="en-IN" sz="2000" dirty="0" smtClean="0"/>
+          </a:p>
+        </p:txBody>
+      </p:sp>
+      <p:pic>
+        <p:nvPicPr>
+          <p:cNvPr id="1027" name="Picture 3"/>
+          <p:cNvPicPr>
+            <a:picLocks noChangeAspect="1" noChangeArrowheads="1"/>
+          </p:cNvPicPr>
+          <p:nvPr/>
+        </p:nvPicPr>
+        <p:blipFill>
+          <a:blip r:embed="rId3">
+            <a:extLst>
+              <a:ext uri="{28A0092B-C50C-407E-A947-70E740481C1C}">
+                <a14:useLocalDpi xmlns:a14="http://schemas.microsoft.com/office/drawing/2010/main" val="0"/>
+              </a:ext>
+            </a:extLst>
+          </a:blip>
+          <a:srcRect/>
+          <a:stretch>
+            <a:fillRect/>
+          </a:stretch>
+        </p:blipFill>
+        <p:spPr bwMode="auto">
+          <a:xfrm>
+            <a:off x="683568" y="2420888"/>
+            <a:ext cx="7943850" cy="3933825"/>
+          </a:xfrm>
+          <a:prstGeom prst="rect">
+            <a:avLst/>
+          </a:prstGeom>
+          <a:noFill/>
+          <a:ln>
+            <a:noFill/>
+          </a:ln>
+          <a:effectLst/>
+          <a:extLst>
+            <a:ext uri="{909E8E84-426E-40DD-AFC4-6F175D3DCCD1}">
+              <a14:hiddenFill xmlns:a14="http://schemas.microsoft.com/office/drawing/2010/main">
+                <a:solidFill>
+                  <a:schemeClr val="accent1"/>
+                </a:solidFill>
+              </a14:hiddenFill>
+            </a:ext>
+            <a:ext uri="{91240B29-F687-4F45-9708-019B960494DF}">
+              <a14:hiddenLine xmlns:a14="http://schemas.microsoft.com/office/drawing/2010/main" w="9525">
+                <a:solidFill>
+                  <a:schemeClr val="tx1"/>
+                </a:solidFill>
+                <a:miter lim="800000"/>
+                <a:headEnd/>
+                <a:tailEnd/>
+              </a14:hiddenLine>
+            </a:ext>
+            <a:ext uri="{AF507438-7753-43E0-B8FC-AC1667EBCBE1}">
+              <a14:hiddenEffects xmlns:a14="http://schemas.microsoft.com/office/drawing/2010/main">
+                <a:effectLst>
+                  <a:outerShdw dist="35921" dir="2700000" algn="ctr" rotWithShape="0">
+                    <a:schemeClr val="bg2"/>
+                  </a:outerShdw>
+                </a:effectLst>
+              </a14:hiddenEffects>
+            </a:ext>
+          </a:extLst>
+        </p:spPr>
+      </p:pic>
     </p:spTree>
     <p:extLst>
       <p:ext uri="{BB962C8B-B14F-4D97-AF65-F5344CB8AC3E}">
-        <p14:creationId xmlns:p14="http://schemas.microsoft.com/office/powerpoint/2010/main" val="305602627"/>
+        <p14:creationId xmlns:p14="http://schemas.microsoft.com/office/powerpoint/2010/main" val="1397979065"/>
       </p:ext>
     </p:extLst>
   </p:cSld>
@@ -6951,14 +5289,16 @@
         </p:nvSpPr>
         <p:spPr/>
         <p:txBody>
-          <a:bodyPr/>
+          <a:bodyPr>
+            <a:normAutofit/>
+          </a:bodyPr>
           <a:lstStyle/>
           <a:p>
             <a:r>
-              <a:rPr lang="en-US" dirty="0" smtClean="0"/>
-              <a:t>Spring MVC</a:t>
-            </a:r>
-            <a:endParaRPr lang="en-IN" dirty="0"/>
+              <a:rPr lang="en-US" sz="2000" dirty="0" smtClean="0"/>
+              <a:t>@Controller/ @service @Repository /@Transactional</a:t>
+            </a:r>
+            <a:endParaRPr lang="en-IN" sz="2000" dirty="0"/>
           </a:p>
         </p:txBody>
       </p:sp>
@@ -6974,23 +5314,156 @@
         </p:nvSpPr>
         <p:spPr/>
         <p:txBody>
-          <a:bodyPr/>
+          <a:bodyPr>
+            <a:normAutofit/>
+          </a:bodyPr>
           <a:lstStyle/>
           <a:p>
-            <a:endParaRPr lang="en-IN" dirty="0"/>
+            <a:r>
+              <a:rPr lang="en-US" sz="1600" b="1" dirty="0"/>
+              <a:t>@controller</a:t>
+            </a:r>
+            <a:r>
+              <a:rPr lang="en-US" sz="1600" dirty="0"/>
+              <a:t>: handles </a:t>
+            </a:r>
+            <a:r>
+              <a:rPr lang="en-US" sz="1600" b="1" dirty="0"/>
+              <a:t>HTTP requests</a:t>
+            </a:r>
+            <a:r>
+              <a:rPr lang="en-US" sz="1600" dirty="0"/>
+              <a:t> and returns </a:t>
+            </a:r>
+            <a:r>
+              <a:rPr lang="en-US" sz="1600" dirty="0" smtClean="0"/>
+              <a:t>views</a:t>
+            </a:r>
+          </a:p>
+          <a:p>
+            <a:r>
+              <a:rPr lang="en-US" sz="1600" b="1" dirty="0" smtClean="0"/>
+              <a:t>@</a:t>
+            </a:r>
+            <a:r>
+              <a:rPr lang="en-US" sz="1600" b="1" dirty="0"/>
+              <a:t>Service</a:t>
+            </a:r>
+            <a:r>
+              <a:rPr lang="en-US" sz="1600" dirty="0"/>
+              <a:t>: </a:t>
+            </a:r>
+            <a:r>
+              <a:rPr lang="en-US" sz="1600" dirty="0" smtClean="0"/>
+              <a:t>it is </a:t>
+            </a:r>
+            <a:r>
+              <a:rPr lang="en-US" sz="1600" dirty="0"/>
+              <a:t>used to mark a class as a </a:t>
+            </a:r>
+            <a:r>
+              <a:rPr lang="en-US" sz="1600" b="1" dirty="0"/>
+              <a:t>service component</a:t>
+            </a:r>
+            <a:r>
+              <a:rPr lang="en-US" sz="1600" dirty="0"/>
+              <a:t>. It is a specialization of @Component and is typically used in the </a:t>
+            </a:r>
+            <a:r>
+              <a:rPr lang="en-US" sz="1600" b="1" dirty="0"/>
+              <a:t>service layer</a:t>
+            </a:r>
+            <a:r>
+              <a:rPr lang="en-US" sz="1600" dirty="0"/>
+              <a:t> to hold business logic</a:t>
+            </a:r>
+            <a:endParaRPr lang="en-US" sz="1600" dirty="0" smtClean="0"/>
+          </a:p>
+          <a:p>
+            <a:r>
+              <a:rPr lang="en-US" sz="1600" b="1" dirty="0" smtClean="0"/>
+              <a:t>@Repository</a:t>
+            </a:r>
+            <a:r>
+              <a:rPr lang="en-US" sz="1600" dirty="0"/>
+              <a:t>: </a:t>
+            </a:r>
+            <a:r>
+              <a:rPr lang="en-US" sz="1600" dirty="0" smtClean="0"/>
+              <a:t>it is </a:t>
+            </a:r>
+            <a:r>
+              <a:rPr lang="en-US" sz="1600" dirty="0"/>
+              <a:t>used to mark a class as a </a:t>
+            </a:r>
+            <a:r>
+              <a:rPr lang="en-US" sz="1600" b="1" dirty="0"/>
+              <a:t>data access layer (DAO) component</a:t>
+            </a:r>
+            <a:r>
+              <a:rPr lang="en-US" sz="1600" dirty="0"/>
+              <a:t>. It is a specialization of @Component, specifically for handling database interactions.</a:t>
+            </a:r>
+            <a:endParaRPr lang="en-US" sz="1600" dirty="0" smtClean="0"/>
+          </a:p>
+          <a:p>
+            <a:r>
+              <a:rPr lang="en-US" sz="1600" b="1" dirty="0" smtClean="0"/>
+              <a:t>@Transactional </a:t>
+            </a:r>
+            <a:r>
+              <a:rPr lang="en-US" sz="1600" dirty="0" smtClean="0"/>
+              <a:t>:It </a:t>
+            </a:r>
+            <a:r>
+              <a:rPr lang="en-US" sz="1600" dirty="0"/>
+              <a:t>is used to manage </a:t>
+            </a:r>
+            <a:r>
+              <a:rPr lang="en-US" sz="1600" b="1" dirty="0"/>
+              <a:t>database transactions</a:t>
+            </a:r>
+            <a:r>
+              <a:rPr lang="en-US" sz="1600" dirty="0"/>
+              <a:t> automatically. It ensures that a method or a class runs within a </a:t>
+            </a:r>
+            <a:r>
+              <a:rPr lang="en-US" sz="1600" b="1" dirty="0"/>
+              <a:t>transaction context</a:t>
+            </a:r>
+            <a:r>
+              <a:rPr lang="en-US" sz="1600" dirty="0"/>
+              <a:t>, handling </a:t>
+            </a:r>
+            <a:r>
+              <a:rPr lang="en-US" sz="1600" b="1" dirty="0"/>
+              <a:t>commit, rollback, and propagation</a:t>
+            </a:r>
+            <a:r>
+              <a:rPr lang="en-US" sz="1600" dirty="0"/>
+              <a:t> seamlessly</a:t>
+            </a:r>
+            <a:endParaRPr lang="en-IN" sz="1600" dirty="0"/>
           </a:p>
         </p:txBody>
       </p:sp>
     </p:spTree>
     <p:extLst>
       <p:ext uri="{BB962C8B-B14F-4D97-AF65-F5344CB8AC3E}">
-        <p14:creationId xmlns:p14="http://schemas.microsoft.com/office/powerpoint/2010/main" val="1397979065"/>
+        <p14:creationId xmlns:p14="http://schemas.microsoft.com/office/powerpoint/2010/main" val="368305962"/>
       </p:ext>
     </p:extLst>
   </p:cSld>
   <p:clrMapOvr>
     <a:masterClrMapping/>
   </p:clrMapOvr>
+  <p:timing>
+    <p:tnLst>
+      <p:par>
+        <p:cTn id="1" dur="indefinite" restart="never" nodeType="tmRoot"/>
+      </p:par>
+    </p:tnLst>
+  </p:timing>
 </p:sld>
 </file>
 
@@ -7023,16 +5496,14 @@
         </p:nvSpPr>
         <p:spPr/>
         <p:txBody>
-          <a:bodyPr>
-            <a:normAutofit/>
-          </a:bodyPr>
+          <a:bodyPr/>
           <a:lstStyle/>
           <a:p>
             <a:r>
-              <a:rPr lang="en-US" sz="2000" dirty="0" smtClean="0"/>
-              <a:t>@Controller/ @service @Repository /@Transactional</a:t>
-            </a:r>
-            <a:endParaRPr lang="en-IN" sz="2000" dirty="0"/>
+              <a:rPr lang="en-US" dirty="0" smtClean="0"/>
+              <a:t>***********END*********</a:t>
+            </a:r>
+            <a:endParaRPr lang="en-IN" dirty="0"/>
           </a:p>
         </p:txBody>
       </p:sp>
@@ -7048,408 +5519,26 @@
         </p:nvSpPr>
         <p:spPr/>
         <p:txBody>
-          <a:bodyPr>
-            <a:normAutofit/>
-          </a:bodyPr>
+          <a:bodyPr/>
           <a:lstStyle/>
           <a:p>
-            <a:r>
-              <a:rPr lang="en-US" sz="1600" b="1" dirty="0"/>
-              <a:t>@controller</a:t>
-            </a:r>
-            <a:r>
-              <a:rPr lang="en-US" sz="1600" dirty="0"/>
-              <a:t>: handles </a:t>
-            </a:r>
-            <a:r>
-              <a:rPr lang="en-US" sz="1600" b="1" dirty="0"/>
-              <a:t>HTTP requests</a:t>
-            </a:r>
-            <a:r>
-              <a:rPr lang="en-US" sz="1600" dirty="0"/>
-              <a:t> and returns </a:t>
-            </a:r>
-            <a:r>
-              <a:rPr lang="en-US" sz="1600" dirty="0" smtClean="0"/>
-              <a:t>views</a:t>
-            </a:r>
-          </a:p>
-          <a:p>
-            <a:r>
-              <a:rPr lang="en-US" sz="1600" b="1" dirty="0" smtClean="0"/>
-              <a:t>@</a:t>
-            </a:r>
-            <a:r>
-              <a:rPr lang="en-US" sz="1600" b="1" dirty="0"/>
-              <a:t>Service</a:t>
-            </a:r>
-            <a:r>
-              <a:rPr lang="en-US" sz="1600" dirty="0"/>
-              <a:t>: </a:t>
-            </a:r>
-            <a:r>
-              <a:rPr lang="en-US" sz="1600" dirty="0" smtClean="0"/>
-              <a:t>it is </a:t>
-            </a:r>
-            <a:r>
-              <a:rPr lang="en-US" sz="1600" dirty="0"/>
-              <a:t>used to mark a class as a </a:t>
-            </a:r>
-            <a:r>
-              <a:rPr lang="en-US" sz="1600" b="1" dirty="0"/>
-              <a:t>service component</a:t>
-            </a:r>
-            <a:r>
-              <a:rPr lang="en-US" sz="1600" dirty="0"/>
-              <a:t>. It is a specialization of @Component and is typically used in the </a:t>
-            </a:r>
-            <a:r>
-              <a:rPr lang="en-US" sz="1600" b="1" dirty="0"/>
-              <a:t>service layer</a:t>
-            </a:r>
-            <a:r>
-              <a:rPr lang="en-US" sz="1600" dirty="0"/>
-              <a:t> to hold business logic</a:t>
-            </a:r>
-            <a:endParaRPr lang="en-US" sz="1600" dirty="0" smtClean="0"/>
-          </a:p>
-          <a:p>
-            <a:r>
-              <a:rPr lang="en-US" sz="1600" b="1" dirty="0" smtClean="0"/>
-              <a:t>@Repository</a:t>
-            </a:r>
-            <a:r>
-              <a:rPr lang="en-US" sz="1600" dirty="0"/>
-              <a:t>: </a:t>
-            </a:r>
-            <a:r>
-              <a:rPr lang="en-US" sz="1600" dirty="0" smtClean="0"/>
-              <a:t>it is </a:t>
-            </a:r>
-            <a:r>
-              <a:rPr lang="en-US" sz="1600" dirty="0"/>
-              <a:t>used to mark a class as a </a:t>
-            </a:r>
-            <a:r>
-              <a:rPr lang="en-US" sz="1600" b="1" dirty="0"/>
-              <a:t>data access layer (DAO) component</a:t>
-            </a:r>
-            <a:r>
-              <a:rPr lang="en-US" sz="1600" dirty="0"/>
-              <a:t>. It is a specialization of @Component, specifically for handling database interactions.</a:t>
-            </a:r>
-            <a:endParaRPr lang="en-US" sz="1600" dirty="0" smtClean="0"/>
-          </a:p>
-          <a:p>
-            <a:r>
-              <a:rPr lang="en-US" sz="1600" b="1" dirty="0" smtClean="0"/>
-              <a:t>@Transactional </a:t>
-            </a:r>
-            <a:r>
-              <a:rPr lang="en-US" sz="1600" dirty="0" smtClean="0"/>
-              <a:t>:It </a:t>
-            </a:r>
-            <a:r>
-              <a:rPr lang="en-US" sz="1600" dirty="0"/>
-              <a:t>is used to manage </a:t>
-            </a:r>
-            <a:r>
-              <a:rPr lang="en-US" sz="1600" b="1" dirty="0"/>
-              <a:t>database transactions</a:t>
-            </a:r>
-            <a:r>
-              <a:rPr lang="en-US" sz="1600" dirty="0"/>
-              <a:t> automatically. It ensures that a method or a class runs within a </a:t>
-            </a:r>
-            <a:r>
-              <a:rPr lang="en-US" sz="1600" b="1" dirty="0"/>
-              <a:t>transaction context</a:t>
-            </a:r>
-            <a:r>
-              <a:rPr lang="en-US" sz="1600" dirty="0"/>
-              <a:t>, handling </a:t>
-            </a:r>
-            <a:r>
-              <a:rPr lang="en-US" sz="1600" b="1" dirty="0"/>
-              <a:t>commit, rollback, and propagation</a:t>
-            </a:r>
-            <a:r>
-              <a:rPr lang="en-US" sz="1600" dirty="0"/>
-              <a:t> seamlessly</a:t>
-            </a:r>
-            <a:endParaRPr lang="en-IN" sz="1600" dirty="0"/>
+            <a:pPr marL="64008" indent="0">
+              <a:buNone/>
+            </a:pPr>
+            <a:endParaRPr lang="en-IN" dirty="0"/>
           </a:p>
         </p:txBody>
       </p:sp>
     </p:spTree>
     <p:extLst>
       <p:ext uri="{BB962C8B-B14F-4D97-AF65-F5344CB8AC3E}">
-        <p14:creationId xmlns:p14="http://schemas.microsoft.com/office/powerpoint/2010/main" val="368305962"/>
+        <p14:creationId xmlns:p14="http://schemas.microsoft.com/office/powerpoint/2010/main" val="3348350733"/>
       </p:ext>
     </p:extLst>
   </p:cSld>
   <p:clrMapOvr>
     <a:masterClrMapping/>
   </p:clrMapOvr>
-  <p:timing>
-    <p:tnLst>
-      <p:par>
-        <p:cTn id="1" dur="indefinite" restart="never" nodeType="tmRoot"/>
-      </p:par>
-    </p:tnLst>
-  </p:timing>
-</p:sld>
-</file>
-
-<file path=ppt/slides/slide9.xml><?xml version="1.0" encoding="utf-8"?>
-<p:sld xmlns:a="http://schemas.openxmlformats.org/drawingml/2006/main" xmlns:r="http://schemas.openxmlformats.org/officeDocument/2006/relationships" xmlns:p="http://schemas.openxmlformats.org/presentationml/2006/main">
-  <p:cSld>
-    <p:spTree>
-      <p:nvGrpSpPr>
-        <p:cNvPr id="1" name=""/>
-        <p:cNvGrpSpPr/>
-        <p:nvPr/>
-      </p:nvGrpSpPr>
-      <p:grpSpPr>
-        <a:xfrm>
-          <a:off x="0" y="0"/>
-          <a:ext cx="0" cy="0"/>
-          <a:chOff x="0" y="0"/>
-          <a:chExt cx="0" cy="0"/>
-        </a:xfrm>
-      </p:grpSpPr>
-      <p:sp>
-        <p:nvSpPr>
-          <p:cNvPr id="2" name="Title 1"/>
-          <p:cNvSpPr>
-            <a:spLocks noGrp="1"/>
-          </p:cNvSpPr>
-          <p:nvPr>
-            <p:ph type="title"/>
-          </p:nvPr>
-        </p:nvSpPr>
-        <p:spPr/>
-        <p:txBody>
-          <a:bodyPr>
-            <a:normAutofit fontScale="90000"/>
-          </a:bodyPr>
-          <a:lstStyle/>
-          <a:p>
-            <a:r>
-              <a:rPr lang="en-US" b="1" dirty="0" smtClean="0">
-                <a:effectLst/>
-              </a:rPr>
-              <a:t/>
-            </a:r>
-            <a:br>
-              <a:rPr lang="en-US" b="1" dirty="0" smtClean="0">
-                <a:effectLst/>
-              </a:rPr>
-            </a:br>
-            <a:r>
-              <a:rPr lang="en-US" b="1" dirty="0" smtClean="0">
-                <a:effectLst/>
-              </a:rPr>
-              <a:t>What </a:t>
-            </a:r>
-            <a:r>
-              <a:rPr lang="en-US" b="1" dirty="0">
-                <a:effectLst/>
-              </a:rPr>
-              <a:t>is Spring Security and how does it work?</a:t>
-            </a:r>
-            <a:br>
-              <a:rPr lang="en-US" b="1" dirty="0">
-                <a:effectLst/>
-              </a:rPr>
-            </a:br>
-            <a:endParaRPr lang="en-IN" dirty="0"/>
-          </a:p>
-        </p:txBody>
-      </p:sp>
-      <p:sp>
-        <p:nvSpPr>
-          <p:cNvPr id="3" name="Content Placeholder 2"/>
-          <p:cNvSpPr>
-            <a:spLocks noGrp="1"/>
-          </p:cNvSpPr>
-          <p:nvPr>
-            <p:ph idx="1"/>
-          </p:nvPr>
-        </p:nvSpPr>
-        <p:spPr/>
-        <p:txBody>
-          <a:bodyPr>
-            <a:normAutofit/>
-          </a:bodyPr>
-          <a:lstStyle/>
-          <a:p>
-            <a:pPr marL="64008" indent="0">
-              <a:buNone/>
-            </a:pPr>
-            <a:r>
-              <a:rPr lang="en-US" sz="1600" dirty="0"/>
-              <a:t>At its core, Spring Security is really just a bunch of servlet filters that help you add authentication and </a:t>
-            </a:r>
-            <a:r>
-              <a:rPr lang="en-US" sz="1600" dirty="0" smtClean="0"/>
-              <a:t>authorization</a:t>
-            </a:r>
-            <a:r>
-              <a:rPr lang="en-US" sz="1600" dirty="0"/>
-              <a:t> </a:t>
-            </a:r>
-            <a:r>
-              <a:rPr lang="en-US" sz="1600" dirty="0" smtClean="0"/>
-              <a:t>to </a:t>
-            </a:r>
-            <a:r>
-              <a:rPr lang="en-US" sz="1600" dirty="0"/>
-              <a:t>your web application.</a:t>
-            </a:r>
-          </a:p>
-          <a:p>
-            <a:pPr marL="64008" indent="0">
-              <a:buNone/>
-            </a:pPr>
-            <a:r>
-              <a:rPr lang="en-US" sz="1600" dirty="0"/>
-              <a:t>It also integrates well with frameworks like Spring Web MVC (or Spring Boot), as well as with standards like OAuth2 or SAML. And it auto-generates login/logout pages </a:t>
-            </a:r>
-            <a:r>
-              <a:rPr lang="en-US" sz="1600" dirty="0" smtClean="0"/>
-              <a:t>and </a:t>
-            </a:r>
-            <a:r>
-              <a:rPr lang="en-US" sz="1600" dirty="0"/>
-              <a:t>protects against common exploits like </a:t>
-            </a:r>
-            <a:r>
-              <a:rPr lang="en-US" sz="1600" dirty="0" smtClean="0"/>
-              <a:t>CSRF</a:t>
-            </a:r>
-          </a:p>
-          <a:p>
-            <a:pPr marL="64008" indent="0">
-              <a:buNone/>
-            </a:pPr>
-            <a:endParaRPr lang="en-US" sz="1600" dirty="0"/>
-          </a:p>
-          <a:p>
-            <a:r>
-              <a:rPr lang="en-IN" sz="2000" dirty="0"/>
-              <a:t>Authentication</a:t>
-            </a:r>
-          </a:p>
-          <a:p>
-            <a:r>
-              <a:rPr lang="en-IN" sz="2000" dirty="0"/>
-              <a:t>Authorization</a:t>
-            </a:r>
-          </a:p>
-          <a:p>
-            <a:r>
-              <a:rPr lang="en-IN" sz="2000" dirty="0"/>
-              <a:t>Servlet Filters</a:t>
-            </a:r>
-          </a:p>
-          <a:p>
-            <a:pPr marL="64008" indent="0">
-              <a:buNone/>
-            </a:pPr>
-            <a:r>
-              <a:rPr lang="en-IN" sz="1600" b="1" dirty="0"/>
-              <a:t>Why use Servlet Filters?</a:t>
-            </a:r>
-          </a:p>
-          <a:p>
-            <a:pPr marL="64008" indent="0">
-              <a:buNone/>
-            </a:pPr>
-            <a:r>
-              <a:rPr lang="en-US" sz="1600" u="sng" dirty="0" err="1" smtClean="0"/>
-              <a:t>DispatcherServlet</a:t>
-            </a:r>
-            <a:r>
-              <a:rPr lang="en-US" sz="1600" u="sng" dirty="0" smtClean="0"/>
-              <a:t> is a servlet </a:t>
-            </a:r>
-            <a:r>
-              <a:rPr lang="en-US" sz="1600" dirty="0" smtClean="0"/>
-              <a:t>and it redirects </a:t>
-            </a:r>
-            <a:r>
-              <a:rPr lang="en-US" sz="1600" dirty="0"/>
-              <a:t>incoming HTTP </a:t>
-            </a:r>
-            <a:r>
-              <a:rPr lang="en-US" sz="1600" dirty="0" smtClean="0"/>
-              <a:t>requests to your Controller.</a:t>
-            </a:r>
-          </a:p>
-          <a:p>
-            <a:pPr marL="64008" indent="0">
-              <a:buNone/>
-            </a:pPr>
-            <a:r>
-              <a:rPr lang="en-US" sz="1600" dirty="0"/>
-              <a:t>There is no security hardcoded into that </a:t>
-            </a:r>
-            <a:r>
-              <a:rPr lang="en-US" sz="1600" dirty="0" err="1" smtClean="0"/>
-              <a:t>DispatcherServlet</a:t>
-            </a:r>
-            <a:r>
-              <a:rPr lang="en-US" sz="1600" dirty="0" smtClean="0"/>
-              <a:t> but there’s </a:t>
-            </a:r>
-            <a:r>
-              <a:rPr lang="en-US" sz="1600" dirty="0"/>
-              <a:t>a way to do exactly this in the Java web world: you can put </a:t>
-            </a:r>
-            <a:r>
-              <a:rPr lang="en-US" sz="1600" dirty="0" smtClean="0"/>
-              <a:t>filters </a:t>
-            </a:r>
-            <a:r>
-              <a:rPr lang="en-US" sz="1600" dirty="0"/>
-              <a:t> </a:t>
-            </a:r>
-            <a:r>
-              <a:rPr lang="en-US" sz="1600" i="1" dirty="0"/>
-              <a:t>in front</a:t>
-            </a:r>
-            <a:r>
-              <a:rPr lang="en-US" sz="1600" dirty="0"/>
-              <a:t> of servlets</a:t>
-            </a:r>
-            <a:endParaRPr lang="en-US" sz="1600" dirty="0" smtClean="0"/>
-          </a:p>
-          <a:p>
-            <a:pPr marL="64008" indent="0">
-              <a:buNone/>
-            </a:pPr>
-            <a:endParaRPr lang="en-US" sz="1600" dirty="0"/>
-          </a:p>
-        </p:txBody>
-      </p:sp>
-    </p:spTree>
-    <p:extLst>
-      <p:ext uri="{BB962C8B-B14F-4D97-AF65-F5344CB8AC3E}">
-        <p14:creationId xmlns:p14="http://schemas.microsoft.com/office/powerpoint/2010/main" val="458720127"/>
-      </p:ext>
-    </p:extLst>
-  </p:cSld>
-  <p:clrMapOvr>
-    <a:masterClrMapping/>
-  </p:clrMapOvr>
-  <p:timing>
-    <p:tnLst>
-      <p:par>
-        <p:cTn id="1" dur="indefinite" restart="never" nodeType="tmRoot"/>
-      </p:par>
-    </p:tnLst>
-  </p:timing>
 </p:sld>
 </file>
 

</xml_diff>

<commit_message>
RLB-main  Address schema added
</commit_message>
<xml_diff>
--- a/rlb.pptx
+++ b/rlb.pptx
@@ -12,7 +12,8 @@
     <p:sldId id="257" r:id="rId6"/>
     <p:sldId id="262" r:id="rId7"/>
     <p:sldId id="260" r:id="rId8"/>
-    <p:sldId id="270" r:id="rId9"/>
+    <p:sldId id="271" r:id="rId9"/>
+    <p:sldId id="270" r:id="rId10"/>
   </p:sldIdLst>
   <p:sldSz cx="9144000" cy="6858000" type="screen4x3"/>
   <p:notesSz cx="6858000" cy="9144000"/>
@@ -333,7 +334,7 @@
           <a:p>
             <a:fld id="{F7E8EBE4-5C21-4152-BE9D-D2B5A8E29458}" type="datetimeFigureOut">
               <a:rPr lang="en-IN" smtClean="0"/>
-              <a:t>07-02-2025</a:t>
+              <a:t>10-02-2025</a:t>
             </a:fld>
             <a:endParaRPr lang="en-IN"/>
           </a:p>
@@ -520,7 +521,7 @@
           <a:p>
             <a:fld id="{F7E8EBE4-5C21-4152-BE9D-D2B5A8E29458}" type="datetimeFigureOut">
               <a:rPr lang="en-IN" smtClean="0"/>
-              <a:t>07-02-2025</a:t>
+              <a:t>10-02-2025</a:t>
             </a:fld>
             <a:endParaRPr lang="en-IN"/>
           </a:p>
@@ -695,7 +696,7 @@
           <a:p>
             <a:fld id="{F7E8EBE4-5C21-4152-BE9D-D2B5A8E29458}" type="datetimeFigureOut">
               <a:rPr lang="en-IN" smtClean="0"/>
-              <a:t>07-02-2025</a:t>
+              <a:t>10-02-2025</a:t>
             </a:fld>
             <a:endParaRPr lang="en-IN"/>
           </a:p>
@@ -875,7 +876,7 @@
           <a:p>
             <a:fld id="{F7E8EBE4-5C21-4152-BE9D-D2B5A8E29458}" type="datetimeFigureOut">
               <a:rPr lang="en-IN" smtClean="0"/>
-              <a:t>07-02-2025</a:t>
+              <a:t>10-02-2025</a:t>
             </a:fld>
             <a:endParaRPr lang="en-IN"/>
           </a:p>
@@ -1122,7 +1123,7 @@
           <a:p>
             <a:fld id="{F7E8EBE4-5C21-4152-BE9D-D2B5A8E29458}" type="datetimeFigureOut">
               <a:rPr lang="en-IN" smtClean="0"/>
-              <a:t>07-02-2025</a:t>
+              <a:t>10-02-2025</a:t>
             </a:fld>
             <a:endParaRPr lang="en-IN"/>
           </a:p>
@@ -1596,7 +1597,7 @@
           <a:p>
             <a:fld id="{F7E8EBE4-5C21-4152-BE9D-D2B5A8E29458}" type="datetimeFigureOut">
               <a:rPr lang="en-IN" smtClean="0"/>
-              <a:t>07-02-2025</a:t>
+              <a:t>10-02-2025</a:t>
             </a:fld>
             <a:endParaRPr lang="en-IN"/>
           </a:p>
@@ -2011,7 +2012,7 @@
           <a:p>
             <a:fld id="{F7E8EBE4-5C21-4152-BE9D-D2B5A8E29458}" type="datetimeFigureOut">
               <a:rPr lang="en-IN" smtClean="0"/>
-              <a:t>07-02-2025</a:t>
+              <a:t>10-02-2025</a:t>
             </a:fld>
             <a:endParaRPr lang="en-IN"/>
           </a:p>
@@ -2142,7 +2143,7 @@
           <a:p>
             <a:fld id="{F7E8EBE4-5C21-4152-BE9D-D2B5A8E29458}" type="datetimeFigureOut">
               <a:rPr lang="en-IN" smtClean="0"/>
-              <a:t>07-02-2025</a:t>
+              <a:t>10-02-2025</a:t>
             </a:fld>
             <a:endParaRPr lang="en-IN"/>
           </a:p>
@@ -2237,7 +2238,7 @@
           <a:p>
             <a:fld id="{F7E8EBE4-5C21-4152-BE9D-D2B5A8E29458}" type="datetimeFigureOut">
               <a:rPr lang="en-IN" smtClean="0"/>
-              <a:t>07-02-2025</a:t>
+              <a:t>10-02-2025</a:t>
             </a:fld>
             <a:endParaRPr lang="en-IN"/>
           </a:p>
@@ -2515,7 +2516,7 @@
           <a:p>
             <a:fld id="{F7E8EBE4-5C21-4152-BE9D-D2B5A8E29458}" type="datetimeFigureOut">
               <a:rPr lang="en-IN" smtClean="0"/>
-              <a:t>07-02-2025</a:t>
+              <a:t>10-02-2025</a:t>
             </a:fld>
             <a:endParaRPr lang="en-IN"/>
           </a:p>
@@ -2767,7 +2768,7 @@
           <a:p>
             <a:fld id="{F7E8EBE4-5C21-4152-BE9D-D2B5A8E29458}" type="datetimeFigureOut">
               <a:rPr lang="en-IN" smtClean="0"/>
-              <a:t>07-02-2025</a:t>
+              <a:t>10-02-2025</a:t>
             </a:fld>
             <a:endParaRPr lang="en-IN"/>
           </a:p>
@@ -3139,7 +3140,7 @@
           <a:p>
             <a:fld id="{F7E8EBE4-5C21-4152-BE9D-D2B5A8E29458}" type="datetimeFigureOut">
               <a:rPr lang="en-IN" smtClean="0"/>
-              <a:t>07-02-2025</a:t>
+              <a:t>10-02-2025</a:t>
             </a:fld>
             <a:endParaRPr lang="en-IN"/>
           </a:p>
@@ -5142,11 +5143,7 @@
           <a:p>
             <a:r>
               <a:rPr lang="en-US" dirty="0" smtClean="0"/>
-              <a:t>Spring </a:t>
-            </a:r>
-            <a:r>
-              <a:rPr lang="en-US" dirty="0" smtClean="0"/>
-              <a:t>MVC Design Pattern</a:t>
+              <a:t>Spring MVC Design Pattern</a:t>
             </a:r>
             <a:endParaRPr lang="en-IN" dirty="0"/>
           </a:p>
@@ -5402,7 +5399,47 @@
             </a:r>
             <a:r>
               <a:rPr lang="en-US" sz="1600" dirty="0"/>
-              <a:t>. It is a specialization of @Component, specifically for handling database interactions.</a:t>
+              <a:t>. It is a specialization of @Component, specifically for handling database interactions</a:t>
+            </a:r>
+            <a:r>
+              <a:rPr lang="en-US" sz="1600" dirty="0" smtClean="0"/>
+              <a:t>.</a:t>
+            </a:r>
+          </a:p>
+          <a:p>
+            <a:r>
+              <a:rPr lang="en-US" sz="1600" dirty="0" smtClean="0"/>
+              <a:t>@</a:t>
+            </a:r>
+            <a:r>
+              <a:rPr lang="en-US" sz="1600" b="1" dirty="0" err="1" smtClean="0"/>
+              <a:t>RequestBody</a:t>
+            </a:r>
+            <a:r>
+              <a:rPr lang="en-US" sz="1600" b="1" dirty="0" smtClean="0"/>
+              <a:t>: </a:t>
+            </a:r>
+            <a:r>
+              <a:rPr lang="en-US" sz="1600" dirty="0" smtClean="0"/>
+              <a:t>Map JSON Object to JAVA Object</a:t>
+            </a:r>
+          </a:p>
+          <a:p>
+            <a:r>
+              <a:rPr lang="en-US" sz="1600" dirty="0" smtClean="0"/>
+              <a:t>@</a:t>
+            </a:r>
+            <a:r>
+              <a:rPr lang="en-US" sz="1600" dirty="0" err="1" smtClean="0"/>
+              <a:t>R</a:t>
+            </a:r>
+            <a:r>
+              <a:rPr lang="en-US" sz="1600" b="1" dirty="0" err="1" smtClean="0"/>
+              <a:t>esponseBody</a:t>
+            </a:r>
+            <a:r>
+              <a:rPr lang="en-US" sz="1600" dirty="0" smtClean="0"/>
+              <a:t>: Map java object to JSON Object</a:t>
             </a:r>
             <a:endParaRPr lang="en-US" sz="1600" dirty="0" smtClean="0"/>
           </a:p>
@@ -5441,8 +5478,14 @@
             </a:r>
             <a:r>
               <a:rPr lang="en-US" sz="1600" dirty="0"/>
-              <a:t> seamlessly</a:t>
-            </a:r>
+              <a:t> </a:t>
+            </a:r>
+            <a:r>
+              <a:rPr lang="en-US" sz="1600" dirty="0" smtClean="0"/>
+              <a:t>seamlessly</a:t>
+            </a:r>
+          </a:p>
+          <a:p>
             <a:endParaRPr lang="en-IN" sz="1600" dirty="0"/>
           </a:p>
         </p:txBody>
@@ -5468,6 +5511,78 @@
 </file>
 
 <file path=ppt/slides/slide8.xml><?xml version="1.0" encoding="utf-8"?>
+<p:sld xmlns:a="http://schemas.openxmlformats.org/drawingml/2006/main" xmlns:r="http://schemas.openxmlformats.org/officeDocument/2006/relationships" xmlns:p="http://schemas.openxmlformats.org/presentationml/2006/main">
+  <p:cSld>
+    <p:spTree>
+      <p:nvGrpSpPr>
+        <p:cNvPr id="1" name=""/>
+        <p:cNvGrpSpPr/>
+        <p:nvPr/>
+      </p:nvGrpSpPr>
+      <p:grpSpPr>
+        <a:xfrm>
+          <a:off x="0" y="0"/>
+          <a:ext cx="0" cy="0"/>
+          <a:chOff x="0" y="0"/>
+          <a:chExt cx="0" cy="0"/>
+        </a:xfrm>
+      </p:grpSpPr>
+      <p:sp>
+        <p:nvSpPr>
+          <p:cNvPr id="2" name="Title 1"/>
+          <p:cNvSpPr>
+            <a:spLocks noGrp="1"/>
+          </p:cNvSpPr>
+          <p:nvPr>
+            <p:ph type="title"/>
+          </p:nvPr>
+        </p:nvSpPr>
+        <p:spPr/>
+        <p:txBody>
+          <a:bodyPr/>
+          <a:lstStyle/>
+          <a:p>
+            <a:r>
+              <a:rPr lang="en-US" dirty="0" smtClean="0"/>
+              <a:t>How to get session </a:t>
+            </a:r>
+            <a:endParaRPr lang="en-IN" dirty="0"/>
+          </a:p>
+        </p:txBody>
+      </p:sp>
+      <p:sp>
+        <p:nvSpPr>
+          <p:cNvPr id="3" name="Content Placeholder 2"/>
+          <p:cNvSpPr>
+            <a:spLocks noGrp="1"/>
+          </p:cNvSpPr>
+          <p:nvPr>
+            <p:ph idx="1"/>
+          </p:nvPr>
+        </p:nvSpPr>
+        <p:spPr/>
+        <p:txBody>
+          <a:bodyPr/>
+          <a:lstStyle/>
+          <a:p>
+            <a:endParaRPr lang="en-IN" dirty="0"/>
+          </a:p>
+        </p:txBody>
+      </p:sp>
+    </p:spTree>
+    <p:extLst>
+      <p:ext uri="{BB962C8B-B14F-4D97-AF65-F5344CB8AC3E}">
+        <p14:creationId xmlns:p14="http://schemas.microsoft.com/office/powerpoint/2010/main" val="3701856934"/>
+      </p:ext>
+    </p:extLst>
+  </p:cSld>
+  <p:clrMapOvr>
+    <a:masterClrMapping/>
+  </p:clrMapOvr>
+</p:sld>
+</file>
+
+<file path=ppt/slides/slide9.xml><?xml version="1.0" encoding="utf-8"?>
 <p:sld xmlns:a="http://schemas.openxmlformats.org/drawingml/2006/main" xmlns:r="http://schemas.openxmlformats.org/officeDocument/2006/relationships" xmlns:p="http://schemas.openxmlformats.org/presentationml/2006/main">
   <p:cSld>
     <p:spTree>

</xml_diff>

<commit_message>
added session factory slide
</commit_message>
<xml_diff>
--- a/rlb.pptx
+++ b/rlb.pptx
@@ -8,12 +8,14 @@
     <p:sldId id="261" r:id="rId2"/>
     <p:sldId id="256" r:id="rId3"/>
     <p:sldId id="258" r:id="rId4"/>
-    <p:sldId id="259" r:id="rId5"/>
-    <p:sldId id="257" r:id="rId6"/>
-    <p:sldId id="262" r:id="rId7"/>
-    <p:sldId id="260" r:id="rId8"/>
-    <p:sldId id="271" r:id="rId9"/>
-    <p:sldId id="270" r:id="rId10"/>
+    <p:sldId id="273" r:id="rId5"/>
+    <p:sldId id="259" r:id="rId6"/>
+    <p:sldId id="257" r:id="rId7"/>
+    <p:sldId id="262" r:id="rId8"/>
+    <p:sldId id="260" r:id="rId9"/>
+    <p:sldId id="271" r:id="rId10"/>
+    <p:sldId id="272" r:id="rId11"/>
+    <p:sldId id="270" r:id="rId12"/>
   </p:sldIdLst>
   <p:sldSz cx="9144000" cy="6858000" type="screen4x3"/>
   <p:notesSz cx="6858000" cy="9144000"/>
@@ -334,7 +336,7 @@
           <a:p>
             <a:fld id="{F7E8EBE4-5C21-4152-BE9D-D2B5A8E29458}" type="datetimeFigureOut">
               <a:rPr lang="en-IN" smtClean="0"/>
-              <a:t>10-02-2025</a:t>
+              <a:t>16-02-2025</a:t>
             </a:fld>
             <a:endParaRPr lang="en-IN"/>
           </a:p>
@@ -521,7 +523,7 @@
           <a:p>
             <a:fld id="{F7E8EBE4-5C21-4152-BE9D-D2B5A8E29458}" type="datetimeFigureOut">
               <a:rPr lang="en-IN" smtClean="0"/>
-              <a:t>10-02-2025</a:t>
+              <a:t>16-02-2025</a:t>
             </a:fld>
             <a:endParaRPr lang="en-IN"/>
           </a:p>
@@ -696,7 +698,7 @@
           <a:p>
             <a:fld id="{F7E8EBE4-5C21-4152-BE9D-D2B5A8E29458}" type="datetimeFigureOut">
               <a:rPr lang="en-IN" smtClean="0"/>
-              <a:t>10-02-2025</a:t>
+              <a:t>16-02-2025</a:t>
             </a:fld>
             <a:endParaRPr lang="en-IN"/>
           </a:p>
@@ -876,7 +878,7 @@
           <a:p>
             <a:fld id="{F7E8EBE4-5C21-4152-BE9D-D2B5A8E29458}" type="datetimeFigureOut">
               <a:rPr lang="en-IN" smtClean="0"/>
-              <a:t>10-02-2025</a:t>
+              <a:t>16-02-2025</a:t>
             </a:fld>
             <a:endParaRPr lang="en-IN"/>
           </a:p>
@@ -1123,7 +1125,7 @@
           <a:p>
             <a:fld id="{F7E8EBE4-5C21-4152-BE9D-D2B5A8E29458}" type="datetimeFigureOut">
               <a:rPr lang="en-IN" smtClean="0"/>
-              <a:t>10-02-2025</a:t>
+              <a:t>16-02-2025</a:t>
             </a:fld>
             <a:endParaRPr lang="en-IN"/>
           </a:p>
@@ -1597,7 +1599,7 @@
           <a:p>
             <a:fld id="{F7E8EBE4-5C21-4152-BE9D-D2B5A8E29458}" type="datetimeFigureOut">
               <a:rPr lang="en-IN" smtClean="0"/>
-              <a:t>10-02-2025</a:t>
+              <a:t>16-02-2025</a:t>
             </a:fld>
             <a:endParaRPr lang="en-IN"/>
           </a:p>
@@ -2012,7 +2014,7 @@
           <a:p>
             <a:fld id="{F7E8EBE4-5C21-4152-BE9D-D2B5A8E29458}" type="datetimeFigureOut">
               <a:rPr lang="en-IN" smtClean="0"/>
-              <a:t>10-02-2025</a:t>
+              <a:t>16-02-2025</a:t>
             </a:fld>
             <a:endParaRPr lang="en-IN"/>
           </a:p>
@@ -2143,7 +2145,7 @@
           <a:p>
             <a:fld id="{F7E8EBE4-5C21-4152-BE9D-D2B5A8E29458}" type="datetimeFigureOut">
               <a:rPr lang="en-IN" smtClean="0"/>
-              <a:t>10-02-2025</a:t>
+              <a:t>16-02-2025</a:t>
             </a:fld>
             <a:endParaRPr lang="en-IN"/>
           </a:p>
@@ -2238,7 +2240,7 @@
           <a:p>
             <a:fld id="{F7E8EBE4-5C21-4152-BE9D-D2B5A8E29458}" type="datetimeFigureOut">
               <a:rPr lang="en-IN" smtClean="0"/>
-              <a:t>10-02-2025</a:t>
+              <a:t>16-02-2025</a:t>
             </a:fld>
             <a:endParaRPr lang="en-IN"/>
           </a:p>
@@ -2516,7 +2518,7 @@
           <a:p>
             <a:fld id="{F7E8EBE4-5C21-4152-BE9D-D2B5A8E29458}" type="datetimeFigureOut">
               <a:rPr lang="en-IN" smtClean="0"/>
-              <a:t>10-02-2025</a:t>
+              <a:t>16-02-2025</a:t>
             </a:fld>
             <a:endParaRPr lang="en-IN"/>
           </a:p>
@@ -2768,7 +2770,7 @@
           <a:p>
             <a:fld id="{F7E8EBE4-5C21-4152-BE9D-D2B5A8E29458}" type="datetimeFigureOut">
               <a:rPr lang="en-IN" smtClean="0"/>
-              <a:t>10-02-2025</a:t>
+              <a:t>16-02-2025</a:t>
             </a:fld>
             <a:endParaRPr lang="en-IN"/>
           </a:p>
@@ -3140,7 +3142,7 @@
           <a:p>
             <a:fld id="{F7E8EBE4-5C21-4152-BE9D-D2B5A8E29458}" type="datetimeFigureOut">
               <a:rPr lang="en-IN" smtClean="0"/>
-              <a:t>10-02-2025</a:t>
+              <a:t>16-02-2025</a:t>
             </a:fld>
             <a:endParaRPr lang="en-IN"/>
           </a:p>
@@ -3678,6 +3680,354 @@
 </p:sld>
 </file>
 
+<file path=ppt/slides/slide10.xml><?xml version="1.0" encoding="utf-8"?>
+<p:sld xmlns:a="http://schemas.openxmlformats.org/drawingml/2006/main" xmlns:r="http://schemas.openxmlformats.org/officeDocument/2006/relationships" xmlns:p="http://schemas.openxmlformats.org/presentationml/2006/main">
+  <p:cSld>
+    <p:spTree>
+      <p:nvGrpSpPr>
+        <p:cNvPr id="1" name=""/>
+        <p:cNvGrpSpPr/>
+        <p:nvPr/>
+      </p:nvGrpSpPr>
+      <p:grpSpPr>
+        <a:xfrm>
+          <a:off x="0" y="0"/>
+          <a:ext cx="0" cy="0"/>
+          <a:chOff x="0" y="0"/>
+          <a:chExt cx="0" cy="0"/>
+        </a:xfrm>
+      </p:grpSpPr>
+      <p:sp>
+        <p:nvSpPr>
+          <p:cNvPr id="2" name="Title 1"/>
+          <p:cNvSpPr>
+            <a:spLocks noGrp="1"/>
+          </p:cNvSpPr>
+          <p:nvPr>
+            <p:ph type="title"/>
+          </p:nvPr>
+        </p:nvSpPr>
+        <p:spPr/>
+        <p:txBody>
+          <a:bodyPr/>
+          <a:lstStyle/>
+          <a:p>
+            <a:r>
+              <a:rPr lang="en-US" dirty="0" smtClean="0"/>
+              <a:t>Integrate Bootstrap </a:t>
+            </a:r>
+            <a:endParaRPr lang="en-IN" dirty="0"/>
+          </a:p>
+        </p:txBody>
+      </p:sp>
+      <p:graphicFrame>
+        <p:nvGraphicFramePr>
+          <p:cNvPr id="4" name="Content Placeholder 3"/>
+          <p:cNvGraphicFramePr>
+            <a:graphicFrameLocks noGrp="1"/>
+          </p:cNvGraphicFramePr>
+          <p:nvPr>
+            <p:ph idx="1"/>
+            <p:extLst>
+              <p:ext uri="{D42A27DB-BD31-4B8C-83A1-F6EECF244321}">
+                <p14:modId xmlns:p14="http://schemas.microsoft.com/office/powerpoint/2010/main" val="2465321949"/>
+              </p:ext>
+            </p:extLst>
+          </p:nvPr>
+        </p:nvGraphicFramePr>
+        <p:xfrm>
+          <a:off x="0" y="1882775"/>
+          <a:ext cx="9144000" cy="1584960"/>
+        </p:xfrm>
+        <a:graphic>
+          <a:graphicData uri="http://schemas.openxmlformats.org/drawingml/2006/table">
+            <a:tbl>
+              <a:tblPr firstRow="1" bandRow="1">
+                <a:tableStyleId>{5C22544A-7EE6-4342-B048-85BDC9FD1C3A}</a:tableStyleId>
+              </a:tblPr>
+              <a:tblGrid>
+                <a:gridCol w="9144000"/>
+              </a:tblGrid>
+              <a:tr h="370840">
+                <a:tc>
+                  <a:txBody>
+                    <a:bodyPr/>
+                    <a:lstStyle/>
+                    <a:p>
+                      <a:r>
+                        <a:rPr lang="en-US" sz="1400" dirty="0" smtClean="0"/>
+                        <a:t>&lt;head&gt;</a:t>
+                      </a:r>
+                    </a:p>
+                    <a:p>
+                      <a:r>
+                        <a:rPr lang="en-US" sz="1400" baseline="0" dirty="0" smtClean="0"/>
+                        <a:t>      </a:t>
+                      </a:r>
+                      <a:r>
+                        <a:rPr lang="en-US" sz="1400" dirty="0" smtClean="0"/>
+                        <a:t>&lt;link </a:t>
+                      </a:r>
+                      <a:r>
+                        <a:rPr lang="en-US" sz="1400" dirty="0" err="1" smtClean="0"/>
+                        <a:t>href</a:t>
+                      </a:r>
+                      <a:r>
+                        <a:rPr lang="en-US" sz="1400" dirty="0" smtClean="0"/>
+                        <a:t>=</a:t>
+                      </a:r>
+                      <a:r>
+                        <a:rPr lang="en-US" sz="1400" dirty="0" smtClean="0">
+                          <a:hlinkClick r:id="rId2"/>
+                        </a:rPr>
+                        <a:t>https://cdn.jsdelivr.net/npm/bootstrap@5.3.3/dist/css/bootstrap.min.css</a:t>
+                      </a:r>
+                      <a:r>
+                        <a:rPr lang="en-US" sz="1400" baseline="0" dirty="0" smtClean="0"/>
+                        <a:t> </a:t>
+                      </a:r>
+                      <a:r>
+                        <a:rPr lang="en-US" sz="1400" dirty="0" err="1" smtClean="0"/>
+                        <a:t>rel</a:t>
+                      </a:r>
+                      <a:r>
+                        <a:rPr lang="en-US" sz="1400" dirty="0" smtClean="0"/>
+                        <a:t>="</a:t>
+                      </a:r>
+                      <a:r>
+                        <a:rPr lang="en-US" sz="1400" dirty="0" err="1" smtClean="0"/>
+                        <a:t>stylesheet</a:t>
+                      </a:r>
+                      <a:r>
+                        <a:rPr lang="en-US" sz="1400" dirty="0" smtClean="0"/>
+                        <a:t>"&gt;</a:t>
+                      </a:r>
+                    </a:p>
+                    <a:p>
+                      <a:r>
+                        <a:rPr lang="en-US" sz="1400" dirty="0" smtClean="0"/>
+                        <a:t>     &lt;script </a:t>
+                      </a:r>
+                      <a:r>
+                        <a:rPr lang="en-US" sz="1400" dirty="0" err="1" smtClean="0"/>
+                        <a:t>src</a:t>
+                      </a:r>
+                      <a:r>
+                        <a:rPr lang="en-US" sz="1400" dirty="0" smtClean="0"/>
+                        <a:t>="https://ajax.googleapis.com/</a:t>
+                      </a:r>
+                      <a:r>
+                        <a:rPr lang="en-US" sz="1400" dirty="0" err="1" smtClean="0"/>
+                        <a:t>ajax</a:t>
+                      </a:r>
+                      <a:r>
+                        <a:rPr lang="en-US" sz="1400" dirty="0" smtClean="0"/>
+                        <a:t>/libs/</a:t>
+                      </a:r>
+                      <a:r>
+                        <a:rPr lang="en-US" sz="1400" dirty="0" err="1" smtClean="0"/>
+                        <a:t>jquery</a:t>
+                      </a:r>
+                      <a:r>
+                        <a:rPr lang="en-US" sz="1400" dirty="0" smtClean="0"/>
+                        <a:t>/3.7.1/jquery.min.js"&gt;&lt;/script&gt;</a:t>
+                      </a:r>
+                    </a:p>
+                    <a:p>
+                      <a:r>
+                        <a:rPr lang="en-US" sz="1400" dirty="0" smtClean="0"/>
+                        <a:t>    &lt;script </a:t>
+                      </a:r>
+                      <a:r>
+                        <a:rPr lang="en-US" sz="1400" dirty="0" err="1" smtClean="0"/>
+                        <a:t>src</a:t>
+                      </a:r>
+                      <a:r>
+                        <a:rPr lang="en-US" sz="1400" dirty="0" smtClean="0"/>
+                        <a:t>="https://cdn.jsdelivr.net/</a:t>
+                      </a:r>
+                      <a:r>
+                        <a:rPr lang="en-US" sz="1400" dirty="0" err="1" smtClean="0"/>
+                        <a:t>npm</a:t>
+                      </a:r>
+                      <a:r>
+                        <a:rPr lang="en-US" sz="1400" dirty="0" smtClean="0"/>
+                        <a:t>/bootstrap@5.3.3/</a:t>
+                      </a:r>
+                      <a:r>
+                        <a:rPr lang="en-US" sz="1400" dirty="0" err="1" smtClean="0"/>
+                        <a:t>dist</a:t>
+                      </a:r>
+                      <a:r>
+                        <a:rPr lang="en-US" sz="1400" dirty="0" smtClean="0"/>
+                        <a:t>/</a:t>
+                      </a:r>
+                      <a:r>
+                        <a:rPr lang="en-US" sz="1400" dirty="0" err="1" smtClean="0"/>
+                        <a:t>js</a:t>
+                      </a:r>
+                      <a:r>
+                        <a:rPr lang="en-US" sz="1400" dirty="0" smtClean="0"/>
+                        <a:t>/bootstrap.bundle.min.js"&gt;&lt;/script&gt;</a:t>
+                      </a:r>
+                    </a:p>
+                    <a:p>
+                      <a:r>
+                        <a:rPr lang="en-US" sz="1400" dirty="0" smtClean="0"/>
+                        <a:t>    &lt;meta charset="UTF-8"&gt;</a:t>
+                      </a:r>
+                    </a:p>
+                    <a:p>
+                      <a:r>
+                        <a:rPr lang="en-US" sz="1400" baseline="0" dirty="0" smtClean="0"/>
+                        <a:t>   </a:t>
+                      </a:r>
+                      <a:r>
+                        <a:rPr lang="en-US" sz="1400" dirty="0" smtClean="0"/>
+                        <a:t>&lt;title&gt;Home&lt;/title&gt;</a:t>
+                      </a:r>
+                    </a:p>
+                    <a:p>
+                      <a:r>
+                        <a:rPr lang="en-US" sz="1400" dirty="0" smtClean="0"/>
+                        <a:t>&lt;/head&gt;</a:t>
+                      </a:r>
+                      <a:endParaRPr lang="en-IN" sz="1400" dirty="0"/>
+                    </a:p>
+                  </a:txBody>
+                  <a:tcPr>
+                    <a:lnL w="12700" cap="flat" cmpd="sng" algn="ctr">
+                      <a:solidFill>
+                        <a:schemeClr val="tx1"/>
+                      </a:solidFill>
+                      <a:prstDash val="solid"/>
+                      <a:round/>
+                      <a:headEnd type="none" w="med" len="med"/>
+                      <a:tailEnd type="none" w="med" len="med"/>
+                    </a:lnL>
+                    <a:lnR w="12700" cap="flat" cmpd="sng" algn="ctr">
+                      <a:solidFill>
+                        <a:schemeClr val="tx1"/>
+                      </a:solidFill>
+                      <a:prstDash val="solid"/>
+                      <a:round/>
+                      <a:headEnd type="none" w="med" len="med"/>
+                      <a:tailEnd type="none" w="med" len="med"/>
+                    </a:lnR>
+                    <a:lnT w="12700" cap="flat" cmpd="sng" algn="ctr">
+                      <a:solidFill>
+                        <a:schemeClr val="tx1"/>
+                      </a:solidFill>
+                      <a:prstDash val="solid"/>
+                      <a:round/>
+                      <a:headEnd type="none" w="med" len="med"/>
+                      <a:tailEnd type="none" w="med" len="med"/>
+                    </a:lnT>
+                    <a:lnB w="12700" cap="flat" cmpd="sng" algn="ctr">
+                      <a:solidFill>
+                        <a:schemeClr val="tx1"/>
+                      </a:solidFill>
+                      <a:prstDash val="solid"/>
+                      <a:round/>
+                      <a:headEnd type="none" w="med" len="med"/>
+                      <a:tailEnd type="none" w="med" len="med"/>
+                    </a:lnB>
+                    <a:noFill/>
+                  </a:tcPr>
+                </a:tc>
+              </a:tr>
+            </a:tbl>
+          </a:graphicData>
+        </a:graphic>
+      </p:graphicFrame>
+    </p:spTree>
+    <p:extLst>
+      <p:ext uri="{BB962C8B-B14F-4D97-AF65-F5344CB8AC3E}">
+        <p14:creationId xmlns:p14="http://schemas.microsoft.com/office/powerpoint/2010/main" val="2872489944"/>
+      </p:ext>
+    </p:extLst>
+  </p:cSld>
+  <p:clrMapOvr>
+    <a:masterClrMapping/>
+  </p:clrMapOvr>
+</p:sld>
+</file>
+
+<file path=ppt/slides/slide11.xml><?xml version="1.0" encoding="utf-8"?>
+<p:sld xmlns:a="http://schemas.openxmlformats.org/drawingml/2006/main" xmlns:r="http://schemas.openxmlformats.org/officeDocument/2006/relationships" xmlns:p="http://schemas.openxmlformats.org/presentationml/2006/main">
+  <p:cSld>
+    <p:spTree>
+      <p:nvGrpSpPr>
+        <p:cNvPr id="1" name=""/>
+        <p:cNvGrpSpPr/>
+        <p:nvPr/>
+      </p:nvGrpSpPr>
+      <p:grpSpPr>
+        <a:xfrm>
+          <a:off x="0" y="0"/>
+          <a:ext cx="0" cy="0"/>
+          <a:chOff x="0" y="0"/>
+          <a:chExt cx="0" cy="0"/>
+        </a:xfrm>
+      </p:grpSpPr>
+      <p:sp>
+        <p:nvSpPr>
+          <p:cNvPr id="2" name="Title 1"/>
+          <p:cNvSpPr>
+            <a:spLocks noGrp="1"/>
+          </p:cNvSpPr>
+          <p:nvPr>
+            <p:ph type="title"/>
+          </p:nvPr>
+        </p:nvSpPr>
+        <p:spPr/>
+        <p:txBody>
+          <a:bodyPr/>
+          <a:lstStyle/>
+          <a:p>
+            <a:r>
+              <a:rPr lang="en-US" dirty="0" smtClean="0"/>
+              <a:t>***********END*********</a:t>
+            </a:r>
+            <a:endParaRPr lang="en-IN" dirty="0"/>
+          </a:p>
+        </p:txBody>
+      </p:sp>
+      <p:sp>
+        <p:nvSpPr>
+          <p:cNvPr id="3" name="Content Placeholder 2"/>
+          <p:cNvSpPr>
+            <a:spLocks noGrp="1"/>
+          </p:cNvSpPr>
+          <p:nvPr>
+            <p:ph idx="1"/>
+          </p:nvPr>
+        </p:nvSpPr>
+        <p:spPr/>
+        <p:txBody>
+          <a:bodyPr/>
+          <a:lstStyle/>
+          <a:p>
+            <a:pPr marL="64008" indent="0">
+              <a:buNone/>
+            </a:pPr>
+            <a:endParaRPr lang="en-IN" dirty="0"/>
+          </a:p>
+        </p:txBody>
+      </p:sp>
+    </p:spTree>
+    <p:extLst>
+      <p:ext uri="{BB962C8B-B14F-4D97-AF65-F5344CB8AC3E}">
+        <p14:creationId xmlns:p14="http://schemas.microsoft.com/office/powerpoint/2010/main" val="3348350733"/>
+      </p:ext>
+    </p:extLst>
+  </p:cSld>
+  <p:clrMapOvr>
+    <a:masterClrMapping/>
+  </p:clrMapOvr>
+</p:sld>
+</file>
+
 <file path=ppt/slides/slide2.xml><?xml version="1.0" encoding="utf-8"?>
 <p:sld xmlns:a="http://schemas.openxmlformats.org/drawingml/2006/main" xmlns:r="http://schemas.openxmlformats.org/officeDocument/2006/relationships" xmlns:p="http://schemas.openxmlformats.org/presentationml/2006/main">
   <p:cSld>
@@ -4409,6 +4759,129 @@
             <p:ph type="title"/>
           </p:nvPr>
         </p:nvSpPr>
+        <p:spPr/>
+        <p:txBody>
+          <a:bodyPr/>
+          <a:lstStyle/>
+          <a:p>
+            <a:r>
+              <a:rPr lang="en-US" dirty="0" smtClean="0"/>
+              <a:t>How to get Session In </a:t>
+            </a:r>
+            <a:r>
+              <a:rPr lang="en-US" dirty="0" err="1" smtClean="0"/>
+              <a:t>Applocation</a:t>
+            </a:r>
+            <a:endParaRPr lang="en-IN" dirty="0"/>
+          </a:p>
+        </p:txBody>
+      </p:sp>
+      <p:pic>
+        <p:nvPicPr>
+          <p:cNvPr id="1026" name="Picture 2"/>
+          <p:cNvPicPr>
+            <a:picLocks noGrp="1" noChangeAspect="1" noChangeArrowheads="1"/>
+          </p:cNvPicPr>
+          <p:nvPr>
+            <p:ph idx="1"/>
+          </p:nvPr>
+        </p:nvPicPr>
+        <p:blipFill>
+          <a:blip r:embed="rId2">
+            <a:extLst>
+              <a:ext uri="{28A0092B-C50C-407E-A947-70E740481C1C}">
+                <a14:useLocalDpi xmlns:a14="http://schemas.microsoft.com/office/drawing/2010/main" val="0"/>
+              </a:ext>
+            </a:extLst>
+          </a:blip>
+          <a:srcRect/>
+          <a:stretch>
+            <a:fillRect/>
+          </a:stretch>
+        </p:blipFill>
+        <p:spPr bwMode="auto">
+          <a:xfrm>
+            <a:off x="429953" y="2276872"/>
+            <a:ext cx="8256847" cy="3960440"/>
+          </a:xfrm>
+          <a:prstGeom prst="rect">
+            <a:avLst/>
+          </a:prstGeom>
+          <a:noFill/>
+          <a:ln>
+            <a:noFill/>
+          </a:ln>
+          <a:effectLst/>
+          <a:extLst>
+            <a:ext uri="{909E8E84-426E-40DD-AFC4-6F175D3DCCD1}">
+              <a14:hiddenFill xmlns:a14="http://schemas.microsoft.com/office/drawing/2010/main">
+                <a:solidFill>
+                  <a:schemeClr val="accent1"/>
+                </a:solidFill>
+              </a14:hiddenFill>
+            </a:ext>
+            <a:ext uri="{91240B29-F687-4F45-9708-019B960494DF}">
+              <a14:hiddenLine xmlns:a14="http://schemas.microsoft.com/office/drawing/2010/main" w="9525">
+                <a:solidFill>
+                  <a:schemeClr val="tx1"/>
+                </a:solidFill>
+                <a:miter lim="800000"/>
+                <a:headEnd/>
+                <a:tailEnd/>
+              </a14:hiddenLine>
+            </a:ext>
+            <a:ext uri="{AF507438-7753-43E0-B8FC-AC1667EBCBE1}">
+              <a14:hiddenEffects xmlns:a14="http://schemas.microsoft.com/office/drawing/2010/main">
+                <a:effectLst>
+                  <a:outerShdw dist="35921" dir="2700000" algn="ctr" rotWithShape="0">
+                    <a:schemeClr val="bg2"/>
+                  </a:outerShdw>
+                </a:effectLst>
+              </a14:hiddenEffects>
+            </a:ext>
+          </a:extLst>
+        </p:spPr>
+      </p:pic>
+    </p:spTree>
+    <p:extLst>
+      <p:ext uri="{BB962C8B-B14F-4D97-AF65-F5344CB8AC3E}">
+        <p14:creationId xmlns:p14="http://schemas.microsoft.com/office/powerpoint/2010/main" val="103232559"/>
+      </p:ext>
+    </p:extLst>
+  </p:cSld>
+  <p:clrMapOvr>
+    <a:masterClrMapping/>
+  </p:clrMapOvr>
+</p:sld>
+</file>
+
+<file path=ppt/slides/slide5.xml><?xml version="1.0" encoding="utf-8"?>
+<p:sld xmlns:a="http://schemas.openxmlformats.org/drawingml/2006/main" xmlns:r="http://schemas.openxmlformats.org/officeDocument/2006/relationships" xmlns:p="http://schemas.openxmlformats.org/presentationml/2006/main">
+  <p:cSld>
+    <p:spTree>
+      <p:nvGrpSpPr>
+        <p:cNvPr id="1" name=""/>
+        <p:cNvGrpSpPr/>
+        <p:nvPr/>
+      </p:nvGrpSpPr>
+      <p:grpSpPr>
+        <a:xfrm>
+          <a:off x="0" y="0"/>
+          <a:ext cx="0" cy="0"/>
+          <a:chOff x="0" y="0"/>
+          <a:chExt cx="0" cy="0"/>
+        </a:xfrm>
+      </p:grpSpPr>
+      <p:sp>
+        <p:nvSpPr>
+          <p:cNvPr id="2" name="Title 1"/>
+          <p:cNvSpPr>
+            <a:spLocks noGrp="1"/>
+          </p:cNvSpPr>
+          <p:nvPr>
+            <p:ph type="title"/>
+          </p:nvPr>
+        </p:nvSpPr>
         <p:spPr>
           <a:xfrm>
             <a:off x="539552" y="188640"/>
@@ -4829,7 +5302,7 @@
 </p:sld>
 </file>
 
-<file path=ppt/slides/slide5.xml><?xml version="1.0" encoding="utf-8"?>
+<file path=ppt/slides/slide6.xml><?xml version="1.0" encoding="utf-8"?>
 <p:sld xmlns:a="http://schemas.openxmlformats.org/drawingml/2006/main" xmlns:r="http://schemas.openxmlformats.org/officeDocument/2006/relationships" xmlns:p="http://schemas.openxmlformats.org/presentationml/2006/main">
   <p:cSld>
     <p:spTree>
@@ -5109,7 +5582,7 @@
 </p:sld>
 </file>
 
-<file path=ppt/slides/slide6.xml><?xml version="1.0" encoding="utf-8"?>
+<file path=ppt/slides/slide7.xml><?xml version="1.0" encoding="utf-8"?>
 <p:sld xmlns:a="http://schemas.openxmlformats.org/drawingml/2006/main" xmlns:r="http://schemas.openxmlformats.org/officeDocument/2006/relationships" xmlns:p="http://schemas.openxmlformats.org/presentationml/2006/main">
   <p:cSld>
     <p:spTree>
@@ -5257,7 +5730,7 @@
 </p:sld>
 </file>
 
-<file path=ppt/slides/slide7.xml><?xml version="1.0" encoding="utf-8"?>
+<file path=ppt/slides/slide8.xml><?xml version="1.0" encoding="utf-8"?>
 <p:sld xmlns:a="http://schemas.openxmlformats.org/drawingml/2006/main" xmlns:r="http://schemas.openxmlformats.org/officeDocument/2006/relationships" xmlns:p="http://schemas.openxmlformats.org/presentationml/2006/main">
   <p:cSld>
     <p:spTree>
@@ -5441,7 +5914,6 @@
               <a:rPr lang="en-US" sz="1600" dirty="0" smtClean="0"/>
               <a:t>: Map java object to JSON Object</a:t>
             </a:r>
-            <a:endParaRPr lang="en-US" sz="1600" dirty="0" smtClean="0"/>
           </a:p>
           <a:p>
             <a:r>
@@ -5510,78 +5982,6 @@
 </p:sld>
 </file>
 
-<file path=ppt/slides/slide8.xml><?xml version="1.0" encoding="utf-8"?>
-<p:sld xmlns:a="http://schemas.openxmlformats.org/drawingml/2006/main" xmlns:r="http://schemas.openxmlformats.org/officeDocument/2006/relationships" xmlns:p="http://schemas.openxmlformats.org/presentationml/2006/main">
-  <p:cSld>
-    <p:spTree>
-      <p:nvGrpSpPr>
-        <p:cNvPr id="1" name=""/>
-        <p:cNvGrpSpPr/>
-        <p:nvPr/>
-      </p:nvGrpSpPr>
-      <p:grpSpPr>
-        <a:xfrm>
-          <a:off x="0" y="0"/>
-          <a:ext cx="0" cy="0"/>
-          <a:chOff x="0" y="0"/>
-          <a:chExt cx="0" cy="0"/>
-        </a:xfrm>
-      </p:grpSpPr>
-      <p:sp>
-        <p:nvSpPr>
-          <p:cNvPr id="2" name="Title 1"/>
-          <p:cNvSpPr>
-            <a:spLocks noGrp="1"/>
-          </p:cNvSpPr>
-          <p:nvPr>
-            <p:ph type="title"/>
-          </p:nvPr>
-        </p:nvSpPr>
-        <p:spPr/>
-        <p:txBody>
-          <a:bodyPr/>
-          <a:lstStyle/>
-          <a:p>
-            <a:r>
-              <a:rPr lang="en-US" dirty="0" smtClean="0"/>
-              <a:t>How to get session </a:t>
-            </a:r>
-            <a:endParaRPr lang="en-IN" dirty="0"/>
-          </a:p>
-        </p:txBody>
-      </p:sp>
-      <p:sp>
-        <p:nvSpPr>
-          <p:cNvPr id="3" name="Content Placeholder 2"/>
-          <p:cNvSpPr>
-            <a:spLocks noGrp="1"/>
-          </p:cNvSpPr>
-          <p:nvPr>
-            <p:ph idx="1"/>
-          </p:nvPr>
-        </p:nvSpPr>
-        <p:spPr/>
-        <p:txBody>
-          <a:bodyPr/>
-          <a:lstStyle/>
-          <a:p>
-            <a:endParaRPr lang="en-IN" dirty="0"/>
-          </a:p>
-        </p:txBody>
-      </p:sp>
-    </p:spTree>
-    <p:extLst>
-      <p:ext uri="{BB962C8B-B14F-4D97-AF65-F5344CB8AC3E}">
-        <p14:creationId xmlns:p14="http://schemas.microsoft.com/office/powerpoint/2010/main" val="3701856934"/>
-      </p:ext>
-    </p:extLst>
-  </p:cSld>
-  <p:clrMapOvr>
-    <a:masterClrMapping/>
-  </p:clrMapOvr>
-</p:sld>
-</file>
-
 <file path=ppt/slides/slide9.xml><?xml version="1.0" encoding="utf-8"?>
 <p:sld xmlns:a="http://schemas.openxmlformats.org/drawingml/2006/main" xmlns:r="http://schemas.openxmlformats.org/officeDocument/2006/relationships" xmlns:p="http://schemas.openxmlformats.org/presentationml/2006/main">
   <p:cSld>
@@ -5616,38 +6016,316 @@
           <a:p>
             <a:r>
               <a:rPr lang="en-US" dirty="0" smtClean="0"/>
-              <a:t>***********END*********</a:t>
+              <a:t>How to get session </a:t>
             </a:r>
             <a:endParaRPr lang="en-IN" dirty="0"/>
           </a:p>
         </p:txBody>
       </p:sp>
-      <p:sp>
-        <p:nvSpPr>
-          <p:cNvPr id="3" name="Content Placeholder 2"/>
-          <p:cNvSpPr>
-            <a:spLocks noGrp="1"/>
-          </p:cNvSpPr>
+      <p:graphicFrame>
+        <p:nvGraphicFramePr>
+          <p:cNvPr id="6" name="Content Placeholder 5"/>
+          <p:cNvGraphicFramePr>
+            <a:graphicFrameLocks noGrp="1"/>
+          </p:cNvGraphicFramePr>
           <p:nvPr>
             <p:ph idx="1"/>
-          </p:nvPr>
-        </p:nvSpPr>
-        <p:spPr/>
-        <p:txBody>
-          <a:bodyPr/>
-          <a:lstStyle/>
-          <a:p>
-            <a:pPr marL="64008" indent="0">
-              <a:buNone/>
-            </a:pPr>
-            <a:endParaRPr lang="en-IN" dirty="0"/>
-          </a:p>
-        </p:txBody>
-      </p:sp>
+            <p:extLst>
+              <p:ext uri="{D42A27DB-BD31-4B8C-83A1-F6EECF244321}">
+                <p14:modId xmlns:p14="http://schemas.microsoft.com/office/powerpoint/2010/main" val="2777090205"/>
+              </p:ext>
+            </p:extLst>
+          </p:nvPr>
+        </p:nvGraphicFramePr>
+        <p:xfrm>
+          <a:off x="395536" y="2348880"/>
+          <a:ext cx="8229600" cy="3657600"/>
+        </p:xfrm>
+        <a:graphic>
+          <a:graphicData uri="http://schemas.openxmlformats.org/drawingml/2006/table">
+            <a:tbl>
+              <a:tblPr firstRow="1" bandRow="1">
+                <a:tableStyleId>{5C22544A-7EE6-4342-B048-85BDC9FD1C3A}</a:tableStyleId>
+              </a:tblPr>
+              <a:tblGrid>
+                <a:gridCol w="8229600"/>
+              </a:tblGrid>
+              <a:tr h="370840">
+                <a:tc>
+                  <a:txBody>
+                    <a:bodyPr/>
+                    <a:lstStyle/>
+                    <a:p>
+                      <a:r>
+                        <a:rPr lang="en-IN" i="1" dirty="0" smtClean="0">
+                          <a:latin typeface="+mj-lt"/>
+                        </a:rPr>
+                        <a:t>@Repository</a:t>
+                      </a:r>
+                    </a:p>
+                    <a:p>
+                      <a:r>
+                        <a:rPr lang="en-IN" i="1" dirty="0" smtClean="0">
+                          <a:latin typeface="+mj-lt"/>
+                        </a:rPr>
+                        <a:t>public class </a:t>
+                      </a:r>
+                      <a:r>
+                        <a:rPr lang="en-IN" i="1" dirty="0" err="1" smtClean="0">
+                          <a:latin typeface="+mj-lt"/>
+                        </a:rPr>
+                        <a:t>TehsilDaoImpl</a:t>
+                      </a:r>
+                      <a:r>
+                        <a:rPr lang="en-IN" i="1" dirty="0" smtClean="0">
+                          <a:latin typeface="+mj-lt"/>
+                        </a:rPr>
+                        <a:t> implements </a:t>
+                      </a:r>
+                      <a:r>
+                        <a:rPr lang="en-IN" i="1" dirty="0" err="1" smtClean="0">
+                          <a:latin typeface="+mj-lt"/>
+                        </a:rPr>
+                        <a:t>ITehsilDao</a:t>
+                      </a:r>
+                      <a:r>
+                        <a:rPr lang="en-IN" i="1" dirty="0" smtClean="0">
+                          <a:latin typeface="+mj-lt"/>
+                        </a:rPr>
+                        <a:t> {</a:t>
+                      </a:r>
+                    </a:p>
+                    <a:p>
+                      <a:r>
+                        <a:rPr lang="en-IN" i="1" dirty="0" smtClean="0">
+                          <a:latin typeface="+mj-lt"/>
+                        </a:rPr>
+                        <a:t>    @</a:t>
+                      </a:r>
+                      <a:r>
+                        <a:rPr lang="en-IN" i="1" dirty="0" err="1" smtClean="0">
+                          <a:latin typeface="+mj-lt"/>
+                        </a:rPr>
+                        <a:t>Autowired</a:t>
+                      </a:r>
+                      <a:endParaRPr lang="en-IN" i="1" dirty="0" smtClean="0">
+                        <a:latin typeface="+mj-lt"/>
+                      </a:endParaRPr>
+                    </a:p>
+                    <a:p>
+                      <a:r>
+                        <a:rPr lang="en-IN" i="1" dirty="0" smtClean="0">
+                          <a:latin typeface="+mj-lt"/>
+                        </a:rPr>
+                        <a:t>    private </a:t>
+                      </a:r>
+                      <a:r>
+                        <a:rPr lang="en-IN" i="1" dirty="0" err="1" smtClean="0">
+                          <a:latin typeface="+mj-lt"/>
+                        </a:rPr>
+                        <a:t>SessionFactory</a:t>
+                      </a:r>
+                      <a:r>
+                        <a:rPr lang="en-IN" i="1" dirty="0" smtClean="0">
+                          <a:latin typeface="+mj-lt"/>
+                        </a:rPr>
+                        <a:t> </a:t>
+                      </a:r>
+                      <a:r>
+                        <a:rPr lang="en-IN" i="1" dirty="0" err="1" smtClean="0">
+                          <a:latin typeface="+mj-lt"/>
+                        </a:rPr>
+                        <a:t>sessionFactory</a:t>
+                      </a:r>
+                      <a:r>
+                        <a:rPr lang="en-IN" i="1" dirty="0" smtClean="0">
+                          <a:latin typeface="+mj-lt"/>
+                        </a:rPr>
+                        <a:t>;</a:t>
+                      </a:r>
+                    </a:p>
+                    <a:p>
+                      <a:endParaRPr lang="en-IN" i="1" dirty="0" smtClean="0">
+                        <a:latin typeface="+mj-lt"/>
+                      </a:endParaRPr>
+                    </a:p>
+                    <a:p>
+                      <a:r>
+                        <a:rPr lang="en-IN" i="1" dirty="0" smtClean="0">
+                          <a:latin typeface="+mj-lt"/>
+                        </a:rPr>
+                        <a:t>    @Override</a:t>
+                      </a:r>
+                    </a:p>
+                    <a:p>
+                      <a:r>
+                        <a:rPr lang="en-IN" i="1" dirty="0" smtClean="0">
+                          <a:latin typeface="+mj-lt"/>
+                        </a:rPr>
+                        <a:t>    public Tehsil create(Tehsil tehsil) {</a:t>
+                      </a:r>
+                    </a:p>
+                    <a:p>
+                      <a:r>
+                        <a:rPr lang="en-IN" i="1" dirty="0" smtClean="0">
+                          <a:latin typeface="+mj-lt"/>
+                        </a:rPr>
+                        <a:t>        </a:t>
+                      </a:r>
+                      <a:r>
+                        <a:rPr lang="en-IN" i="1" dirty="0" err="1" smtClean="0">
+                          <a:latin typeface="+mj-lt"/>
+                        </a:rPr>
+                        <a:t>System.out.println</a:t>
+                      </a:r>
+                      <a:r>
+                        <a:rPr lang="en-IN" i="1" dirty="0" smtClean="0">
+                          <a:latin typeface="+mj-lt"/>
+                        </a:rPr>
+                        <a:t>("</a:t>
+                      </a:r>
+                      <a:r>
+                        <a:rPr lang="en-IN" i="1" dirty="0" err="1" smtClean="0">
+                          <a:latin typeface="+mj-lt"/>
+                        </a:rPr>
+                        <a:t>im</a:t>
+                      </a:r>
+                      <a:r>
+                        <a:rPr lang="en-IN" i="1" dirty="0" smtClean="0">
+                          <a:latin typeface="+mj-lt"/>
+                        </a:rPr>
+                        <a:t> in </a:t>
+                      </a:r>
+                      <a:r>
+                        <a:rPr lang="en-IN" i="1" dirty="0" err="1" smtClean="0">
+                          <a:latin typeface="+mj-lt"/>
+                        </a:rPr>
+                        <a:t>dao</a:t>
+                      </a:r>
+                      <a:r>
+                        <a:rPr lang="en-IN" i="1" dirty="0" smtClean="0">
+                          <a:latin typeface="+mj-lt"/>
+                        </a:rPr>
+                        <a:t>");</a:t>
+                      </a:r>
+                    </a:p>
+                    <a:p>
+                      <a:r>
+                        <a:rPr lang="en-IN" i="1" dirty="0" smtClean="0">
+                          <a:latin typeface="+mj-lt"/>
+                        </a:rPr>
+                        <a:t>        Session session=</a:t>
+                      </a:r>
+                      <a:r>
+                        <a:rPr lang="en-IN" i="1" dirty="0" err="1" smtClean="0">
+                          <a:latin typeface="+mj-lt"/>
+                        </a:rPr>
+                        <a:t>sessionFactory.getCurrentSession</a:t>
+                      </a:r>
+                      <a:r>
+                        <a:rPr lang="en-IN" i="1" dirty="0" smtClean="0">
+                          <a:latin typeface="+mj-lt"/>
+                        </a:rPr>
+                        <a:t>();</a:t>
+                      </a:r>
+                    </a:p>
+                    <a:p>
+                      <a:r>
+                        <a:rPr lang="en-IN" i="1" dirty="0" smtClean="0">
+                          <a:latin typeface="+mj-lt"/>
+                        </a:rPr>
+                        <a:t>        </a:t>
+                      </a:r>
+                      <a:r>
+                        <a:rPr lang="en-IN" i="1" dirty="0" err="1" smtClean="0">
+                          <a:latin typeface="+mj-lt"/>
+                        </a:rPr>
+                        <a:t>session.save</a:t>
+                      </a:r>
+                      <a:r>
+                        <a:rPr lang="en-IN" i="1" dirty="0" smtClean="0">
+                          <a:latin typeface="+mj-lt"/>
+                        </a:rPr>
+                        <a:t>(tehsil);</a:t>
+                      </a:r>
+                    </a:p>
+                    <a:p>
+                      <a:r>
+                        <a:rPr lang="en-IN" i="1" dirty="0" smtClean="0">
+                          <a:latin typeface="+mj-lt"/>
+                        </a:rPr>
+                        <a:t>        return null;</a:t>
+                      </a:r>
+                    </a:p>
+                    <a:p>
+                      <a:r>
+                        <a:rPr lang="en-IN" i="1" dirty="0" smtClean="0">
+                          <a:latin typeface="+mj-lt"/>
+                        </a:rPr>
+                        <a:t>	}</a:t>
+                      </a:r>
+                    </a:p>
+                    <a:p>
+                      <a:r>
+                        <a:rPr lang="en-IN" i="1" dirty="0" smtClean="0">
+                          <a:latin typeface="+mj-lt"/>
+                        </a:rPr>
+                        <a:t>}</a:t>
+                      </a:r>
+                      <a:endParaRPr lang="en-IN" i="1" dirty="0">
+                        <a:latin typeface="+mj-lt"/>
+                      </a:endParaRPr>
+                    </a:p>
+                  </a:txBody>
+                  <a:tcPr>
+                    <a:lnL w="12700" cap="flat" cmpd="sng" algn="ctr">
+                      <a:solidFill>
+                        <a:schemeClr val="tx1"/>
+                      </a:solidFill>
+                      <a:prstDash val="solid"/>
+                      <a:round/>
+                      <a:headEnd type="none" w="med" len="med"/>
+                      <a:tailEnd type="none" w="med" len="med"/>
+                    </a:lnL>
+                    <a:lnR w="12700" cap="flat" cmpd="sng" algn="ctr">
+                      <a:solidFill>
+                        <a:schemeClr val="tx1"/>
+                      </a:solidFill>
+                      <a:prstDash val="solid"/>
+                      <a:round/>
+                      <a:headEnd type="none" w="med" len="med"/>
+                      <a:tailEnd type="none" w="med" len="med"/>
+                    </a:lnR>
+                    <a:lnT w="12700" cap="flat" cmpd="sng" algn="ctr">
+                      <a:solidFill>
+                        <a:schemeClr val="tx1"/>
+                      </a:solidFill>
+                      <a:prstDash val="solid"/>
+                      <a:round/>
+                      <a:headEnd type="none" w="med" len="med"/>
+                      <a:tailEnd type="none" w="med" len="med"/>
+                    </a:lnT>
+                    <a:lnB w="12700" cap="flat" cmpd="sng" algn="ctr">
+                      <a:solidFill>
+                        <a:schemeClr val="tx1"/>
+                      </a:solidFill>
+                      <a:prstDash val="solid"/>
+                      <a:round/>
+                      <a:headEnd type="none" w="med" len="med"/>
+                      <a:tailEnd type="none" w="med" len="med"/>
+                    </a:lnB>
+                    <a:noFill/>
+                  </a:tcPr>
+                </a:tc>
+              </a:tr>
+            </a:tbl>
+          </a:graphicData>
+        </a:graphic>
+      </p:graphicFrame>
     </p:spTree>
     <p:extLst>
       <p:ext uri="{BB962C8B-B14F-4D97-AF65-F5344CB8AC3E}">
-        <p14:creationId xmlns:p14="http://schemas.microsoft.com/office/powerpoint/2010/main" val="3348350733"/>
+        <p14:creationId xmlns:p14="http://schemas.microsoft.com/office/powerpoint/2010/main" val="3701856934"/>
       </p:ext>
     </p:extLst>
   </p:cSld>

</xml_diff>

<commit_message>
RLB-main datatable added for district
</commit_message>
<xml_diff>
--- a/rlb.pptx
+++ b/rlb.pptx
@@ -15,7 +15,10 @@
     <p:sldId id="260" r:id="rId9"/>
     <p:sldId id="271" r:id="rId10"/>
     <p:sldId id="272" r:id="rId11"/>
-    <p:sldId id="270" r:id="rId12"/>
+    <p:sldId id="274" r:id="rId12"/>
+    <p:sldId id="276" r:id="rId13"/>
+    <p:sldId id="275" r:id="rId14"/>
+    <p:sldId id="270" r:id="rId15"/>
   </p:sldIdLst>
   <p:sldSz cx="9144000" cy="6858000" type="screen4x3"/>
   <p:notesSz cx="6858000" cy="9144000"/>
@@ -336,7 +339,7 @@
           <a:p>
             <a:fld id="{F7E8EBE4-5C21-4152-BE9D-D2B5A8E29458}" type="datetimeFigureOut">
               <a:rPr lang="en-IN" smtClean="0"/>
-              <a:t>16-02-2025</a:t>
+              <a:t>01-03-2025</a:t>
             </a:fld>
             <a:endParaRPr lang="en-IN"/>
           </a:p>
@@ -523,7 +526,7 @@
           <a:p>
             <a:fld id="{F7E8EBE4-5C21-4152-BE9D-D2B5A8E29458}" type="datetimeFigureOut">
               <a:rPr lang="en-IN" smtClean="0"/>
-              <a:t>16-02-2025</a:t>
+              <a:t>01-03-2025</a:t>
             </a:fld>
             <a:endParaRPr lang="en-IN"/>
           </a:p>
@@ -698,7 +701,7 @@
           <a:p>
             <a:fld id="{F7E8EBE4-5C21-4152-BE9D-D2B5A8E29458}" type="datetimeFigureOut">
               <a:rPr lang="en-IN" smtClean="0"/>
-              <a:t>16-02-2025</a:t>
+              <a:t>01-03-2025</a:t>
             </a:fld>
             <a:endParaRPr lang="en-IN"/>
           </a:p>
@@ -878,7 +881,7 @@
           <a:p>
             <a:fld id="{F7E8EBE4-5C21-4152-BE9D-D2B5A8E29458}" type="datetimeFigureOut">
               <a:rPr lang="en-IN" smtClean="0"/>
-              <a:t>16-02-2025</a:t>
+              <a:t>01-03-2025</a:t>
             </a:fld>
             <a:endParaRPr lang="en-IN"/>
           </a:p>
@@ -1125,7 +1128,7 @@
           <a:p>
             <a:fld id="{F7E8EBE4-5C21-4152-BE9D-D2B5A8E29458}" type="datetimeFigureOut">
               <a:rPr lang="en-IN" smtClean="0"/>
-              <a:t>16-02-2025</a:t>
+              <a:t>01-03-2025</a:t>
             </a:fld>
             <a:endParaRPr lang="en-IN"/>
           </a:p>
@@ -1599,7 +1602,7 @@
           <a:p>
             <a:fld id="{F7E8EBE4-5C21-4152-BE9D-D2B5A8E29458}" type="datetimeFigureOut">
               <a:rPr lang="en-IN" smtClean="0"/>
-              <a:t>16-02-2025</a:t>
+              <a:t>01-03-2025</a:t>
             </a:fld>
             <a:endParaRPr lang="en-IN"/>
           </a:p>
@@ -2014,7 +2017,7 @@
           <a:p>
             <a:fld id="{F7E8EBE4-5C21-4152-BE9D-D2B5A8E29458}" type="datetimeFigureOut">
               <a:rPr lang="en-IN" smtClean="0"/>
-              <a:t>16-02-2025</a:t>
+              <a:t>01-03-2025</a:t>
             </a:fld>
             <a:endParaRPr lang="en-IN"/>
           </a:p>
@@ -2145,7 +2148,7 @@
           <a:p>
             <a:fld id="{F7E8EBE4-5C21-4152-BE9D-D2B5A8E29458}" type="datetimeFigureOut">
               <a:rPr lang="en-IN" smtClean="0"/>
-              <a:t>16-02-2025</a:t>
+              <a:t>01-03-2025</a:t>
             </a:fld>
             <a:endParaRPr lang="en-IN"/>
           </a:p>
@@ -2240,7 +2243,7 @@
           <a:p>
             <a:fld id="{F7E8EBE4-5C21-4152-BE9D-D2B5A8E29458}" type="datetimeFigureOut">
               <a:rPr lang="en-IN" smtClean="0"/>
-              <a:t>16-02-2025</a:t>
+              <a:t>01-03-2025</a:t>
             </a:fld>
             <a:endParaRPr lang="en-IN"/>
           </a:p>
@@ -2518,7 +2521,7 @@
           <a:p>
             <a:fld id="{F7E8EBE4-5C21-4152-BE9D-D2B5A8E29458}" type="datetimeFigureOut">
               <a:rPr lang="en-IN" smtClean="0"/>
-              <a:t>16-02-2025</a:t>
+              <a:t>01-03-2025</a:t>
             </a:fld>
             <a:endParaRPr lang="en-IN"/>
           </a:p>
@@ -2770,7 +2773,7 @@
           <a:p>
             <a:fld id="{F7E8EBE4-5C21-4152-BE9D-D2B5A8E29458}" type="datetimeFigureOut">
               <a:rPr lang="en-IN" smtClean="0"/>
-              <a:t>16-02-2025</a:t>
+              <a:t>01-03-2025</a:t>
             </a:fld>
             <a:endParaRPr lang="en-IN"/>
           </a:p>
@@ -3142,7 +3145,7 @@
           <a:p>
             <a:fld id="{F7E8EBE4-5C21-4152-BE9D-D2B5A8E29458}" type="datetimeFigureOut">
               <a:rPr lang="en-IN" smtClean="0"/>
-              <a:t>16-02-2025</a:t>
+              <a:t>01-03-2025</a:t>
             </a:fld>
             <a:endParaRPr lang="en-IN"/>
           </a:p>
@@ -3956,6 +3959,748 @@
 <file path=ppt/slides/slide11.xml><?xml version="1.0" encoding="utf-8"?>
 <p:sld xmlns:a="http://schemas.openxmlformats.org/drawingml/2006/main" xmlns:r="http://schemas.openxmlformats.org/officeDocument/2006/relationships" xmlns:p="http://schemas.openxmlformats.org/presentationml/2006/main">
   <p:cSld>
+    <p:bg>
+      <p:bgRef idx="1002">
+        <a:schemeClr val="bg2"/>
+      </p:bgRef>
+    </p:bg>
+    <p:spTree>
+      <p:nvGrpSpPr>
+        <p:cNvPr id="1" name=""/>
+        <p:cNvGrpSpPr/>
+        <p:nvPr/>
+      </p:nvGrpSpPr>
+      <p:grpSpPr>
+        <a:xfrm>
+          <a:off x="0" y="0"/>
+          <a:ext cx="0" cy="0"/>
+          <a:chOff x="0" y="0"/>
+          <a:chExt cx="0" cy="0"/>
+        </a:xfrm>
+      </p:grpSpPr>
+      <p:sp>
+        <p:nvSpPr>
+          <p:cNvPr id="2" name="Title 1"/>
+          <p:cNvSpPr>
+            <a:spLocks noGrp="1"/>
+          </p:cNvSpPr>
+          <p:nvPr>
+            <p:ph type="title"/>
+          </p:nvPr>
+        </p:nvSpPr>
+        <p:spPr>
+          <a:xfrm>
+            <a:off x="395536" y="116632"/>
+            <a:ext cx="8229600" cy="1224136"/>
+          </a:xfrm>
+        </p:spPr>
+        <p:txBody>
+          <a:bodyPr/>
+          <a:lstStyle/>
+          <a:p>
+            <a:r>
+              <a:rPr lang="en-US" dirty="0" err="1" smtClean="0"/>
+              <a:t>DataTable</a:t>
+            </a:r>
+            <a:endParaRPr lang="en-IN" dirty="0"/>
+          </a:p>
+        </p:txBody>
+      </p:sp>
+      <p:sp>
+        <p:nvSpPr>
+          <p:cNvPr id="3" name="Content Placeholder 2"/>
+          <p:cNvSpPr>
+            <a:spLocks noGrp="1"/>
+          </p:cNvSpPr>
+          <p:nvPr>
+            <p:ph idx="1"/>
+          </p:nvPr>
+        </p:nvSpPr>
+        <p:spPr>
+          <a:xfrm>
+            <a:off x="0" y="1340768"/>
+            <a:ext cx="9144000" cy="4572000"/>
+          </a:xfrm>
+        </p:spPr>
+        <p:txBody>
+          <a:bodyPr>
+            <a:normAutofit/>
+          </a:bodyPr>
+          <a:lstStyle/>
+          <a:p>
+            <a:r>
+              <a:rPr lang="en-US" sz="1600" dirty="0" smtClean="0"/>
+              <a:t>Add .</a:t>
+            </a:r>
+            <a:r>
+              <a:rPr lang="en-US" sz="1600" dirty="0" err="1" smtClean="0"/>
+              <a:t>js</a:t>
+            </a:r>
+            <a:r>
+              <a:rPr lang="en-US" sz="1600" dirty="0" smtClean="0"/>
+              <a:t> </a:t>
+            </a:r>
+            <a:r>
+              <a:rPr lang="en-US" sz="1600" dirty="0"/>
+              <a:t>file </a:t>
+            </a:r>
+          </a:p>
+          <a:p>
+            <a:pPr marL="64008" indent="0">
+              <a:buNone/>
+            </a:pPr>
+            <a:r>
+              <a:rPr lang="en-IN" sz="1600" dirty="0">
+                <a:hlinkClick r:id="rId3"/>
+              </a:rPr>
+              <a:t>https://code.jquery.com/jquery-3.7.1.js</a:t>
+            </a:r>
+            <a:endParaRPr lang="en-IN" sz="1600" dirty="0"/>
+          </a:p>
+          <a:p>
+            <a:pPr marL="64008" indent="0">
+              <a:buNone/>
+            </a:pPr>
+            <a:r>
+              <a:rPr lang="en-IN" sz="1600" dirty="0">
+                <a:hlinkClick r:id="rId4"/>
+              </a:rPr>
+              <a:t>https://cdnjs.cloudflare.com/ajax/libs/twitter-bootstrap/5.3.0/js/bootstrap.bundle.min.js</a:t>
+            </a:r>
+            <a:endParaRPr lang="en-IN" sz="1600" dirty="0"/>
+          </a:p>
+          <a:p>
+            <a:pPr marL="64008" indent="0">
+              <a:buNone/>
+            </a:pPr>
+            <a:r>
+              <a:rPr lang="en-IN" sz="1600" dirty="0">
+                <a:hlinkClick r:id="rId5"/>
+              </a:rPr>
+              <a:t>https://cdn.datatables.net/2.2.2/js/dataTables.js</a:t>
+            </a:r>
+            <a:endParaRPr lang="en-IN" sz="1600" dirty="0"/>
+          </a:p>
+          <a:p>
+            <a:pPr marL="64008" indent="0">
+              <a:buNone/>
+            </a:pPr>
+            <a:r>
+              <a:rPr lang="en-IN" sz="1600" dirty="0">
+                <a:hlinkClick r:id="rId6"/>
+              </a:rPr>
+              <a:t>https://</a:t>
+            </a:r>
+            <a:r>
+              <a:rPr lang="en-IN" sz="1600" dirty="0" smtClean="0">
+                <a:hlinkClick r:id="rId6"/>
+              </a:rPr>
+              <a:t>cdn.datatables.net/2.2.2/js/dataTables.bootstrap5.js</a:t>
+            </a:r>
+            <a:endParaRPr lang="en-IN" sz="1600" dirty="0" smtClean="0"/>
+          </a:p>
+          <a:p>
+            <a:r>
+              <a:rPr lang="en-US" sz="1600" dirty="0" smtClean="0"/>
+              <a:t>Add .</a:t>
+            </a:r>
+            <a:r>
+              <a:rPr lang="en-US" sz="1600" dirty="0" err="1" smtClean="0"/>
+              <a:t>css</a:t>
+            </a:r>
+            <a:r>
+              <a:rPr lang="en-US" sz="1600" dirty="0" smtClean="0"/>
+              <a:t> file</a:t>
+            </a:r>
+          </a:p>
+          <a:p>
+            <a:pPr marL="64008" indent="0">
+              <a:buNone/>
+            </a:pPr>
+            <a:r>
+              <a:rPr lang="en-IN" sz="1600" dirty="0">
+                <a:hlinkClick r:id="rId7"/>
+              </a:rPr>
+              <a:t>https://cdnjs.cloudflare.com/ajax/libs/twitter-bootstrap/5.3.0/css/bootstrap.min.css</a:t>
+            </a:r>
+            <a:endParaRPr lang="en-IN" sz="1600" dirty="0"/>
+          </a:p>
+          <a:p>
+            <a:pPr marL="64008" indent="0">
+              <a:buNone/>
+            </a:pPr>
+            <a:r>
+              <a:rPr lang="en-IN" sz="1600" dirty="0">
+                <a:hlinkClick r:id="rId8"/>
+              </a:rPr>
+              <a:t>https://</a:t>
+            </a:r>
+            <a:r>
+              <a:rPr lang="en-IN" sz="1600" dirty="0" smtClean="0">
+                <a:hlinkClick r:id="rId8"/>
+              </a:rPr>
+              <a:t>cdn.datatables.net/2.2.2/css/dataTables.bootstrap5.css</a:t>
+            </a:r>
+            <a:endParaRPr lang="en-IN" sz="1600" dirty="0" smtClean="0"/>
+          </a:p>
+          <a:p>
+            <a:pPr marL="64008" indent="0">
+              <a:buNone/>
+            </a:pPr>
+            <a:endParaRPr lang="en-US" sz="1600" dirty="0"/>
+          </a:p>
+          <a:p>
+            <a:pPr marL="64008" indent="0">
+              <a:buNone/>
+            </a:pPr>
+            <a:endParaRPr lang="en-IN" sz="1600" dirty="0"/>
+          </a:p>
+          <a:p>
+            <a:r>
+              <a:rPr lang="en-US" sz="1600" dirty="0" err="1" smtClean="0"/>
+              <a:t>Referance</a:t>
+            </a:r>
+            <a:r>
+              <a:rPr lang="en-US" sz="1600" dirty="0" smtClean="0"/>
+              <a:t> </a:t>
+            </a:r>
+            <a:r>
+              <a:rPr lang="en-US" sz="1600" dirty="0"/>
+              <a:t>: </a:t>
+            </a:r>
+            <a:r>
+              <a:rPr lang="en-US" sz="1600" dirty="0">
+                <a:hlinkClick r:id="rId9"/>
+              </a:rPr>
+              <a:t>https://</a:t>
+            </a:r>
+            <a:r>
+              <a:rPr lang="en-US" sz="1600" dirty="0" smtClean="0">
+                <a:hlinkClick r:id="rId9"/>
+              </a:rPr>
+              <a:t>datatables.net/examples/styling/bootstrap5</a:t>
+            </a:r>
+            <a:endParaRPr lang="en-US" sz="1600" dirty="0" smtClean="0"/>
+          </a:p>
+          <a:p>
+            <a:endParaRPr lang="en-IN" sz="1600" dirty="0"/>
+          </a:p>
+        </p:txBody>
+      </p:sp>
+    </p:spTree>
+    <p:extLst>
+      <p:ext uri="{BB962C8B-B14F-4D97-AF65-F5344CB8AC3E}">
+        <p14:creationId xmlns:p14="http://schemas.microsoft.com/office/powerpoint/2010/main" val="1876263576"/>
+      </p:ext>
+    </p:extLst>
+  </p:cSld>
+  <p:clrMapOvr>
+    <a:overrideClrMapping bg1="dk1" tx1="lt1" bg2="dk2" tx2="lt2" accent1="accent1" accent2="accent2" accent3="accent3" accent4="accent4" accent5="accent5" accent6="accent6" hlink="hlink" folHlink="folHlink"/>
+  </p:clrMapOvr>
+</p:sld>
+</file>
+
+<file path=ppt/slides/slide12.xml><?xml version="1.0" encoding="utf-8"?>
+<p:sld xmlns:a="http://schemas.openxmlformats.org/drawingml/2006/main" xmlns:r="http://schemas.openxmlformats.org/officeDocument/2006/relationships" xmlns:p="http://schemas.openxmlformats.org/presentationml/2006/main">
+  <p:cSld>
+    <p:spTree>
+      <p:nvGrpSpPr>
+        <p:cNvPr id="1" name=""/>
+        <p:cNvGrpSpPr/>
+        <p:nvPr/>
+      </p:nvGrpSpPr>
+      <p:grpSpPr>
+        <a:xfrm>
+          <a:off x="0" y="0"/>
+          <a:ext cx="0" cy="0"/>
+          <a:chOff x="0" y="0"/>
+          <a:chExt cx="0" cy="0"/>
+        </a:xfrm>
+      </p:grpSpPr>
+      <p:sp>
+        <p:nvSpPr>
+          <p:cNvPr id="4" name="Title 1"/>
+          <p:cNvSpPr>
+            <a:spLocks noGrp="1"/>
+          </p:cNvSpPr>
+          <p:nvPr>
+            <p:ph idx="1"/>
+          </p:nvPr>
+        </p:nvSpPr>
+        <p:spPr>
+          <a:xfrm>
+            <a:off x="0" y="115888"/>
+            <a:ext cx="9144000" cy="6338887"/>
+          </a:xfrm>
+        </p:spPr>
+        <p:txBody>
+          <a:bodyPr>
+            <a:normAutofit fontScale="62500" lnSpcReduction="20000"/>
+          </a:bodyPr>
+          <a:lstStyle/>
+          <a:p>
+            <a:pPr marL="64008" indent="0">
+              <a:buNone/>
+            </a:pPr>
+            <a:r>
+              <a:rPr lang="en-IN" dirty="0"/>
+              <a:t>&lt;div </a:t>
+            </a:r>
+            <a:r>
+              <a:rPr lang="en-IN" dirty="0" err="1"/>
+              <a:t>th:fragment</a:t>
+            </a:r>
+            <a:r>
+              <a:rPr lang="en-IN" dirty="0"/>
+              <a:t>="</a:t>
+            </a:r>
+            <a:r>
+              <a:rPr lang="en-IN" b="1" dirty="0" err="1"/>
+              <a:t>listDistrictTbl</a:t>
+            </a:r>
+            <a:r>
+              <a:rPr lang="en-IN" dirty="0"/>
+              <a:t>"&gt;</a:t>
+            </a:r>
+            <a:br>
+              <a:rPr lang="en-IN" dirty="0"/>
+            </a:br>
+            <a:r>
+              <a:rPr lang="en-IN" dirty="0"/>
+              <a:t>    &lt;table class="table table-striped" id="</a:t>
+            </a:r>
+            <a:r>
+              <a:rPr lang="en-IN" b="1" dirty="0" err="1">
+                <a:solidFill>
+                  <a:schemeClr val="accent1"/>
+                </a:solidFill>
+              </a:rPr>
+              <a:t>districtTbl</a:t>
+            </a:r>
+            <a:r>
+              <a:rPr lang="en-IN" dirty="0"/>
+              <a:t>" style="width:100%"&gt;</a:t>
+            </a:r>
+            <a:br>
+              <a:rPr lang="en-IN" dirty="0"/>
+            </a:br>
+            <a:r>
+              <a:rPr lang="en-IN" dirty="0"/>
+              <a:t>        &lt;caption&gt;List of District&lt;/caption&gt;</a:t>
+            </a:r>
+            <a:br>
+              <a:rPr lang="en-IN" dirty="0"/>
+            </a:br>
+            <a:r>
+              <a:rPr lang="en-IN" dirty="0"/>
+              <a:t>        &lt;</a:t>
+            </a:r>
+            <a:r>
+              <a:rPr lang="en-IN" dirty="0" err="1"/>
+              <a:t>thead</a:t>
+            </a:r>
+            <a:r>
+              <a:rPr lang="en-IN" dirty="0"/>
+              <a:t>&gt;</a:t>
+            </a:r>
+            <a:br>
+              <a:rPr lang="en-IN" dirty="0"/>
+            </a:br>
+            <a:r>
+              <a:rPr lang="en-IN" dirty="0"/>
+              <a:t>        &lt;</a:t>
+            </a:r>
+            <a:r>
+              <a:rPr lang="en-IN" dirty="0" err="1"/>
+              <a:t>tr</a:t>
+            </a:r>
+            <a:r>
+              <a:rPr lang="en-IN" dirty="0"/>
+              <a:t>&gt;</a:t>
+            </a:r>
+            <a:br>
+              <a:rPr lang="en-IN" dirty="0"/>
+            </a:br>
+            <a:r>
+              <a:rPr lang="en-IN" dirty="0"/>
+              <a:t>            &lt;</a:t>
+            </a:r>
+            <a:r>
+              <a:rPr lang="en-IN" dirty="0" err="1"/>
+              <a:t>th</a:t>
+            </a:r>
+            <a:r>
+              <a:rPr lang="en-IN" dirty="0"/>
+              <a:t> scope="col"&gt;Index&lt;/</a:t>
+            </a:r>
+            <a:r>
+              <a:rPr lang="en-IN" dirty="0" err="1"/>
+              <a:t>th</a:t>
+            </a:r>
+            <a:r>
+              <a:rPr lang="en-IN" dirty="0"/>
+              <a:t>&gt;</a:t>
+            </a:r>
+            <a:br>
+              <a:rPr lang="en-IN" dirty="0"/>
+            </a:br>
+            <a:r>
+              <a:rPr lang="en-IN" dirty="0"/>
+              <a:t>            &lt;</a:t>
+            </a:r>
+            <a:r>
+              <a:rPr lang="en-IN" dirty="0" err="1"/>
+              <a:t>th</a:t>
+            </a:r>
+            <a:r>
+              <a:rPr lang="en-IN" dirty="0"/>
+              <a:t> scope="col"&gt;Name&lt;/</a:t>
+            </a:r>
+            <a:r>
+              <a:rPr lang="en-IN" dirty="0" err="1"/>
+              <a:t>th</a:t>
+            </a:r>
+            <a:r>
+              <a:rPr lang="en-IN" dirty="0"/>
+              <a:t>&gt;</a:t>
+            </a:r>
+            <a:br>
+              <a:rPr lang="en-IN" dirty="0"/>
+            </a:br>
+            <a:r>
+              <a:rPr lang="en-IN" dirty="0"/>
+              <a:t>        &lt;/</a:t>
+            </a:r>
+            <a:r>
+              <a:rPr lang="en-IN" dirty="0" err="1"/>
+              <a:t>tr</a:t>
+            </a:r>
+            <a:r>
+              <a:rPr lang="en-IN" dirty="0"/>
+              <a:t>&gt;</a:t>
+            </a:r>
+            <a:br>
+              <a:rPr lang="en-IN" dirty="0"/>
+            </a:br>
+            <a:r>
+              <a:rPr lang="en-IN" dirty="0"/>
+              <a:t>        &lt;/</a:t>
+            </a:r>
+            <a:r>
+              <a:rPr lang="en-IN" dirty="0" err="1"/>
+              <a:t>thead</a:t>
+            </a:r>
+            <a:r>
+              <a:rPr lang="en-IN" dirty="0"/>
+              <a:t>&gt;</a:t>
+            </a:r>
+            <a:br>
+              <a:rPr lang="en-IN" dirty="0"/>
+            </a:br>
+            <a:r>
+              <a:rPr lang="en-IN" dirty="0"/>
+              <a:t>        &lt;</a:t>
+            </a:r>
+            <a:r>
+              <a:rPr lang="en-IN" dirty="0" err="1"/>
+              <a:t>tbody</a:t>
+            </a:r>
+            <a:r>
+              <a:rPr lang="en-IN" dirty="0"/>
+              <a:t>&gt;</a:t>
+            </a:r>
+            <a:br>
+              <a:rPr lang="en-IN" dirty="0"/>
+            </a:br>
+            <a:r>
+              <a:rPr lang="en-IN" dirty="0"/>
+              <a:t>        &lt;</a:t>
+            </a:r>
+            <a:r>
+              <a:rPr lang="en-IN" dirty="0" err="1"/>
+              <a:t>tr</a:t>
+            </a:r>
+            <a:r>
+              <a:rPr lang="en-IN" dirty="0"/>
+              <a:t> </a:t>
+            </a:r>
+            <a:r>
+              <a:rPr lang="en-IN" dirty="0" err="1"/>
+              <a:t>th:each</a:t>
+            </a:r>
+            <a:r>
+              <a:rPr lang="en-IN" dirty="0"/>
+              <a:t>="</a:t>
+            </a:r>
+            <a:r>
+              <a:rPr lang="en-IN" dirty="0" err="1"/>
+              <a:t>district,count</a:t>
+            </a:r>
+            <a:r>
+              <a:rPr lang="en-IN" dirty="0"/>
+              <a:t> : ${list}"&gt;</a:t>
+            </a:r>
+            <a:br>
+              <a:rPr lang="en-IN" dirty="0"/>
+            </a:br>
+            <a:r>
+              <a:rPr lang="en-IN" dirty="0"/>
+              <a:t>            &lt;td </a:t>
+            </a:r>
+            <a:r>
+              <a:rPr lang="en-IN" dirty="0" err="1"/>
+              <a:t>th:text</a:t>
+            </a:r>
+            <a:r>
+              <a:rPr lang="en-IN" dirty="0"/>
+              <a:t>="${count.index+1}"&gt;&lt;/td&gt;</a:t>
+            </a:r>
+            <a:br>
+              <a:rPr lang="en-IN" dirty="0"/>
+            </a:br>
+            <a:r>
+              <a:rPr lang="en-IN" dirty="0"/>
+              <a:t>            &lt;td </a:t>
+            </a:r>
+            <a:r>
+              <a:rPr lang="en-IN" dirty="0" err="1"/>
+              <a:t>th:text</a:t>
+            </a:r>
+            <a:r>
+              <a:rPr lang="en-IN" dirty="0"/>
+              <a:t>="${district.name}"&gt;&lt;/td&gt;</a:t>
+            </a:r>
+            <a:br>
+              <a:rPr lang="en-IN" dirty="0"/>
+            </a:br>
+            <a:r>
+              <a:rPr lang="en-IN" dirty="0"/>
+              <a:t>        &lt;/</a:t>
+            </a:r>
+            <a:r>
+              <a:rPr lang="en-IN" dirty="0" err="1"/>
+              <a:t>tr</a:t>
+            </a:r>
+            <a:r>
+              <a:rPr lang="en-IN" dirty="0"/>
+              <a:t>&gt;</a:t>
+            </a:r>
+            <a:br>
+              <a:rPr lang="en-IN" dirty="0"/>
+            </a:br>
+            <a:r>
+              <a:rPr lang="en-IN" dirty="0"/>
+              <a:t>        &lt;/</a:t>
+            </a:r>
+            <a:r>
+              <a:rPr lang="en-IN" dirty="0" err="1"/>
+              <a:t>tbody</a:t>
+            </a:r>
+            <a:r>
+              <a:rPr lang="en-IN" dirty="0"/>
+              <a:t>&gt;</a:t>
+            </a:r>
+            <a:br>
+              <a:rPr lang="en-IN" dirty="0"/>
+            </a:br>
+            <a:r>
+              <a:rPr lang="en-IN" dirty="0"/>
+              <a:t>    &lt;/table&gt;</a:t>
+            </a:r>
+            <a:br>
+              <a:rPr lang="en-IN" dirty="0"/>
+            </a:br>
+            <a:r>
+              <a:rPr lang="en-IN" dirty="0"/>
+              <a:t>    &lt;script type="text/</a:t>
+            </a:r>
+            <a:r>
+              <a:rPr lang="en-IN" dirty="0" err="1"/>
+              <a:t>javascript</a:t>
+            </a:r>
+            <a:r>
+              <a:rPr lang="en-IN" dirty="0"/>
+              <a:t>"&gt;</a:t>
+            </a:r>
+            <a:br>
+              <a:rPr lang="en-IN" dirty="0"/>
+            </a:br>
+            <a:r>
+              <a:rPr lang="en-IN" dirty="0"/>
+              <a:t>        $(document).ready(function() </a:t>
+            </a:r>
+            <a:r>
+              <a:rPr lang="en-IN" dirty="0" smtClean="0"/>
+              <a:t>{</a:t>
+            </a:r>
+            <a:r>
+              <a:rPr lang="en-IN" dirty="0"/>
+              <a:t/>
+            </a:r>
+            <a:br>
+              <a:rPr lang="en-IN" dirty="0"/>
+            </a:br>
+            <a:r>
+              <a:rPr lang="en-IN" dirty="0"/>
+              <a:t>            // Initialize </a:t>
+            </a:r>
+            <a:r>
+              <a:rPr lang="en-IN" dirty="0" err="1"/>
+              <a:t>DataTable</a:t>
+            </a:r>
+            <a:r>
+              <a:rPr lang="en-IN" dirty="0"/>
+              <a:t/>
+            </a:r>
+            <a:br>
+              <a:rPr lang="en-IN" dirty="0"/>
+            </a:br>
+            <a:r>
+              <a:rPr lang="en-IN" dirty="0"/>
+              <a:t>            $('#</a:t>
+            </a:r>
+            <a:r>
+              <a:rPr lang="en-IN" b="1" dirty="0" err="1">
+                <a:solidFill>
+                  <a:schemeClr val="accent1"/>
+                </a:solidFill>
+              </a:rPr>
+              <a:t>districtTbl</a:t>
+            </a:r>
+            <a:r>
+              <a:rPr lang="en-IN" dirty="0"/>
+              <a:t>').</a:t>
+            </a:r>
+            <a:r>
+              <a:rPr lang="en-IN" dirty="0" err="1"/>
+              <a:t>DataTable</a:t>
+            </a:r>
+            <a:r>
+              <a:rPr lang="en-IN" dirty="0"/>
+              <a:t>();</a:t>
+            </a:r>
+            <a:br>
+              <a:rPr lang="en-IN" dirty="0"/>
+            </a:br>
+            <a:r>
+              <a:rPr lang="en-IN" dirty="0"/>
+              <a:t>        });</a:t>
+            </a:r>
+            <a:br>
+              <a:rPr lang="en-IN" dirty="0"/>
+            </a:br>
+            <a:r>
+              <a:rPr lang="en-IN" dirty="0"/>
+              <a:t>    &lt;/script&gt;</a:t>
+            </a:r>
+            <a:br>
+              <a:rPr lang="en-IN" dirty="0"/>
+            </a:br>
+            <a:r>
+              <a:rPr lang="en-IN" dirty="0"/>
+              <a:t>&lt;/div&gt;</a:t>
+            </a:r>
+            <a:br>
+              <a:rPr lang="en-IN" dirty="0"/>
+            </a:br>
+            <a:endParaRPr lang="en-IN" dirty="0"/>
+          </a:p>
+          <a:p>
+            <a:pPr marL="64008" indent="0">
+              <a:buNone/>
+            </a:pPr>
+            <a:endParaRPr lang="en-IN" dirty="0"/>
+          </a:p>
+        </p:txBody>
+      </p:sp>
+    </p:spTree>
+    <p:extLst>
+      <p:ext uri="{BB962C8B-B14F-4D97-AF65-F5344CB8AC3E}">
+        <p14:creationId xmlns:p14="http://schemas.microsoft.com/office/powerpoint/2010/main" val="4031161168"/>
+      </p:ext>
+    </p:extLst>
+  </p:cSld>
+  <p:clrMapOvr>
+    <a:masterClrMapping/>
+  </p:clrMapOvr>
+</p:sld>
+</file>
+
+<file path=ppt/slides/slide13.xml><?xml version="1.0" encoding="utf-8"?>
+<p:sld xmlns:a="http://schemas.openxmlformats.org/drawingml/2006/main" xmlns:r="http://schemas.openxmlformats.org/officeDocument/2006/relationships" xmlns:p="http://schemas.openxmlformats.org/presentationml/2006/main">
+  <p:cSld>
+    <p:spTree>
+      <p:nvGrpSpPr>
+        <p:cNvPr id="1" name=""/>
+        <p:cNvGrpSpPr/>
+        <p:nvPr/>
+      </p:nvGrpSpPr>
+      <p:grpSpPr>
+        <a:xfrm>
+          <a:off x="0" y="0"/>
+          <a:ext cx="0" cy="0"/>
+          <a:chOff x="0" y="0"/>
+          <a:chExt cx="0" cy="0"/>
+        </a:xfrm>
+      </p:grpSpPr>
+      <p:sp>
+        <p:nvSpPr>
+          <p:cNvPr id="2" name="Title 1"/>
+          <p:cNvSpPr>
+            <a:spLocks noGrp="1"/>
+          </p:cNvSpPr>
+          <p:nvPr>
+            <p:ph type="title"/>
+          </p:nvPr>
+        </p:nvSpPr>
+        <p:spPr/>
+        <p:txBody>
+          <a:bodyPr/>
+          <a:lstStyle/>
+          <a:p>
+            <a:r>
+              <a:rPr lang="en-US" smtClean="0"/>
+              <a:t>Form Validation</a:t>
+            </a:r>
+            <a:endParaRPr lang="en-IN" dirty="0"/>
+          </a:p>
+        </p:txBody>
+      </p:sp>
+      <p:sp>
+        <p:nvSpPr>
+          <p:cNvPr id="3" name="Content Placeholder 2"/>
+          <p:cNvSpPr>
+            <a:spLocks noGrp="1"/>
+          </p:cNvSpPr>
+          <p:nvPr>
+            <p:ph idx="1"/>
+          </p:nvPr>
+        </p:nvSpPr>
+        <p:spPr/>
+        <p:txBody>
+          <a:bodyPr/>
+          <a:lstStyle/>
+          <a:p>
+            <a:endParaRPr lang="en-IN" dirty="0"/>
+          </a:p>
+        </p:txBody>
+      </p:sp>
+    </p:spTree>
+    <p:extLst>
+      <p:ext uri="{BB962C8B-B14F-4D97-AF65-F5344CB8AC3E}">
+        <p14:creationId xmlns:p14="http://schemas.microsoft.com/office/powerpoint/2010/main" val="3710567941"/>
+      </p:ext>
+    </p:extLst>
+  </p:cSld>
+  <p:clrMapOvr>
+    <a:masterClrMapping/>
+  </p:clrMapOvr>
+</p:sld>
+</file>
+
+<file path=ppt/slides/slide14.xml><?xml version="1.0" encoding="utf-8"?>
+<p:sld xmlns:a="http://schemas.openxmlformats.org/drawingml/2006/main" xmlns:r="http://schemas.openxmlformats.org/officeDocument/2006/relationships" xmlns:p="http://schemas.openxmlformats.org/presentationml/2006/main">
+  <p:cSld>
     <p:spTree>
       <p:nvGrpSpPr>
         <p:cNvPr id="1" name=""/>
@@ -4858,6 +5603,11 @@
 <file path=ppt/slides/slide5.xml><?xml version="1.0" encoding="utf-8"?>
 <p:sld xmlns:a="http://schemas.openxmlformats.org/drawingml/2006/main" xmlns:r="http://schemas.openxmlformats.org/officeDocument/2006/relationships" xmlns:p="http://schemas.openxmlformats.org/presentationml/2006/main">
   <p:cSld>
+    <p:bg>
+      <p:bgRef idx="1002">
+        <a:schemeClr val="bg2"/>
+      </p:bgRef>
+    </p:bg>
     <p:spTree>
       <p:nvGrpSpPr>
         <p:cNvPr id="1" name=""/>
@@ -5290,7 +6040,7 @@
     </p:extLst>
   </p:cSld>
   <p:clrMapOvr>
-    <a:masterClrMapping/>
+    <a:overrideClrMapping bg1="dk1" tx1="lt1" bg2="dk2" tx2="lt2" accent1="accent1" accent2="accent2" accent3="accent3" accent4="accent4" accent5="accent5" accent6="accent6" hlink="hlink" folHlink="folHlink"/>
   </p:clrMapOvr>
   <p:timing>
     <p:tnLst>
@@ -6617,4 +7367,90 @@
   <a:objectDefaults/>
   <a:extraClrSchemeLst/>
 </a:theme>
+</file>
+
+<file path=ppt/theme/themeOverride1.xml><?xml version="1.0" encoding="utf-8"?>
+<a:themeOverride xmlns:a="http://schemas.openxmlformats.org/drawingml/2006/main">
+  <a:clrScheme name="Verve">
+    <a:dk1>
+      <a:sysClr val="windowText" lastClr="000000"/>
+    </a:dk1>
+    <a:lt1>
+      <a:sysClr val="window" lastClr="FFFFFF"/>
+    </a:lt1>
+    <a:dk2>
+      <a:srgbClr val="666666"/>
+    </a:dk2>
+    <a:lt2>
+      <a:srgbClr val="D2D2D2"/>
+    </a:lt2>
+    <a:accent1>
+      <a:srgbClr val="FF388C"/>
+    </a:accent1>
+    <a:accent2>
+      <a:srgbClr val="E40059"/>
+    </a:accent2>
+    <a:accent3>
+      <a:srgbClr val="9C007F"/>
+    </a:accent3>
+    <a:accent4>
+      <a:srgbClr val="68007F"/>
+    </a:accent4>
+    <a:accent5>
+      <a:srgbClr val="005BD3"/>
+    </a:accent5>
+    <a:accent6>
+      <a:srgbClr val="00349E"/>
+    </a:accent6>
+    <a:hlink>
+      <a:srgbClr val="17BBFD"/>
+    </a:hlink>
+    <a:folHlink>
+      <a:srgbClr val="FF79C2"/>
+    </a:folHlink>
+  </a:clrScheme>
+</a:themeOverride>
+</file>
+
+<file path=ppt/theme/themeOverride2.xml><?xml version="1.0" encoding="utf-8"?>
+<a:themeOverride xmlns:a="http://schemas.openxmlformats.org/drawingml/2006/main">
+  <a:clrScheme name="Verve">
+    <a:dk1>
+      <a:sysClr val="windowText" lastClr="000000"/>
+    </a:dk1>
+    <a:lt1>
+      <a:sysClr val="window" lastClr="FFFFFF"/>
+    </a:lt1>
+    <a:dk2>
+      <a:srgbClr val="666666"/>
+    </a:dk2>
+    <a:lt2>
+      <a:srgbClr val="D2D2D2"/>
+    </a:lt2>
+    <a:accent1>
+      <a:srgbClr val="FF388C"/>
+    </a:accent1>
+    <a:accent2>
+      <a:srgbClr val="E40059"/>
+    </a:accent2>
+    <a:accent3>
+      <a:srgbClr val="9C007F"/>
+    </a:accent3>
+    <a:accent4>
+      <a:srgbClr val="68007F"/>
+    </a:accent4>
+    <a:accent5>
+      <a:srgbClr val="005BD3"/>
+    </a:accent5>
+    <a:accent6>
+      <a:srgbClr val="00349E"/>
+    </a:accent6>
+    <a:hlink>
+      <a:srgbClr val="17BBFD"/>
+    </a:hlink>
+    <a:folHlink>
+      <a:srgbClr val="FF79C2"/>
+    </a:folHlink>
+  </a:clrScheme>
+</a:themeOverride>
 </file>
</xml_diff>

<commit_message>
RLB-main form validation added for district
</commit_message>
<xml_diff>
--- a/rlb.pptx
+++ b/rlb.pptx
@@ -4659,7 +4659,7 @@
           <a:lstStyle/>
           <a:p>
             <a:r>
-              <a:rPr lang="en-US" smtClean="0"/>
+              <a:rPr lang="en-US" dirty="0" smtClean="0"/>
               <a:t>Form Validation</a:t>
             </a:r>
             <a:endParaRPr lang="en-IN" dirty="0"/>
@@ -4676,15 +4676,405 @@
             <p:ph idx="1"/>
           </p:nvPr>
         </p:nvSpPr>
-        <p:spPr/>
-        <p:txBody>
-          <a:bodyPr/>
+        <p:spPr>
+          <a:xfrm>
+            <a:off x="0" y="1268760"/>
+            <a:ext cx="8963472" cy="4572000"/>
+          </a:xfrm>
+        </p:spPr>
+        <p:txBody>
+          <a:bodyPr>
+            <a:normAutofit fontScale="70000" lnSpcReduction="20000"/>
+          </a:bodyPr>
           <a:lstStyle/>
           <a:p>
-            <a:endParaRPr lang="en-IN" dirty="0"/>
-          </a:p>
-        </p:txBody>
-      </p:sp>
+            <a:r>
+              <a:rPr lang="en-IN" sz="1900" dirty="0" err="1" smtClean="0"/>
+              <a:t>Novalidate</a:t>
+            </a:r>
+            <a:r>
+              <a:rPr lang="en-IN" sz="1900" dirty="0" smtClean="0"/>
+              <a:t>: disable browser tooltips</a:t>
+            </a:r>
+            <a:endParaRPr lang="en-IN" sz="1900" dirty="0"/>
+          </a:p>
+          <a:p>
+            <a:r>
+              <a:rPr lang="en-US" sz="1900" dirty="0"/>
+              <a:t>.was-validated or .needs-validation to the &lt;form&gt; element, depending on whether you want to provide validation feedback before or after submitting the </a:t>
+            </a:r>
+            <a:r>
+              <a:rPr lang="en-US" sz="1900" dirty="0"/>
+              <a:t>form</a:t>
+            </a:r>
+          </a:p>
+          <a:p>
+            <a:r>
+              <a:rPr lang="en-US" sz="2000" dirty="0" smtClean="0"/>
+              <a:t>Add bellow function in creaetDistrict.html</a:t>
+            </a:r>
+            <a:endParaRPr lang="en-IN" sz="2000" dirty="0" smtClean="0"/>
+          </a:p>
+          <a:p>
+            <a:endParaRPr lang="en-US" sz="1900" dirty="0" smtClean="0"/>
+          </a:p>
+          <a:p>
+            <a:endParaRPr lang="en-US" sz="1900" dirty="0"/>
+          </a:p>
+          <a:p>
+            <a:endParaRPr lang="en-US" sz="1900" dirty="0" smtClean="0"/>
+          </a:p>
+          <a:p>
+            <a:endParaRPr lang="en-US" sz="1900" dirty="0"/>
+          </a:p>
+          <a:p>
+            <a:endParaRPr lang="en-US" sz="1900" dirty="0" smtClean="0"/>
+          </a:p>
+          <a:p>
+            <a:endParaRPr lang="en-US" sz="1900" dirty="0"/>
+          </a:p>
+          <a:p>
+            <a:endParaRPr lang="en-US" sz="1900" dirty="0" smtClean="0"/>
+          </a:p>
+          <a:p>
+            <a:endParaRPr lang="en-US" sz="1900" dirty="0"/>
+          </a:p>
+          <a:p>
+            <a:endParaRPr lang="en-US" sz="1900" dirty="0" smtClean="0"/>
+          </a:p>
+          <a:p>
+            <a:endParaRPr lang="en-US" sz="1900" dirty="0" smtClean="0"/>
+          </a:p>
+          <a:p>
+            <a:endParaRPr lang="en-US" sz="1900" dirty="0"/>
+          </a:p>
+          <a:p>
+            <a:endParaRPr lang="en-US" sz="1900" dirty="0" smtClean="0"/>
+          </a:p>
+          <a:p>
+            <a:endParaRPr lang="en-US" sz="1900" dirty="0"/>
+          </a:p>
+          <a:p>
+            <a:pPr marL="64008" indent="0">
+              <a:buNone/>
+            </a:pPr>
+            <a:endParaRPr lang="en-US" sz="1900" dirty="0" smtClean="0"/>
+          </a:p>
+          <a:p>
+            <a:endParaRPr lang="en-US" sz="1900" dirty="0"/>
+          </a:p>
+          <a:p>
+            <a:r>
+              <a:rPr lang="en-IN" sz="1900" dirty="0" err="1" smtClean="0"/>
+              <a:t>Referance</a:t>
+            </a:r>
+            <a:r>
+              <a:rPr lang="en-IN" sz="1900" dirty="0" smtClean="0"/>
+              <a:t>: https</a:t>
+            </a:r>
+            <a:r>
+              <a:rPr lang="en-IN" sz="1900" dirty="0"/>
+              <a:t>://getbootstrap.com/docs/5.0/forms/validation/</a:t>
+            </a:r>
+          </a:p>
+        </p:txBody>
+      </p:sp>
+      <p:graphicFrame>
+        <p:nvGraphicFramePr>
+          <p:cNvPr id="4" name="Table 3"/>
+          <p:cNvGraphicFramePr>
+            <a:graphicFrameLocks noGrp="1"/>
+          </p:cNvGraphicFramePr>
+          <p:nvPr>
+            <p:extLst>
+              <p:ext uri="{D42A27DB-BD31-4B8C-83A1-F6EECF244321}">
+                <p14:modId xmlns:p14="http://schemas.microsoft.com/office/powerpoint/2010/main" val="1207443076"/>
+              </p:ext>
+            </p:extLst>
+          </p:nvPr>
+        </p:nvGraphicFramePr>
+        <p:xfrm>
+          <a:off x="539552" y="2204864"/>
+          <a:ext cx="6096000" cy="2407920"/>
+        </p:xfrm>
+        <a:graphic>
+          <a:graphicData uri="http://schemas.openxmlformats.org/drawingml/2006/table">
+            <a:tbl>
+              <a:tblPr firstRow="1" bandRow="1">
+                <a:tableStyleId>{5C22544A-7EE6-4342-B048-85BDC9FD1C3A}</a:tableStyleId>
+              </a:tblPr>
+              <a:tblGrid>
+                <a:gridCol w="6096000"/>
+              </a:tblGrid>
+              <a:tr h="370840">
+                <a:tc>
+                  <a:txBody>
+                    <a:bodyPr/>
+                    <a:lstStyle/>
+                    <a:p>
+                      <a:pPr marL="0" marR="0" indent="0" algn="l" defTabSz="914400" rtl="0" eaLnBrk="1" fontAlgn="auto" latinLnBrk="0" hangingPunct="1">
+                        <a:lnSpc>
+                          <a:spcPct val="100000"/>
+                        </a:lnSpc>
+                        <a:spcBef>
+                          <a:spcPts val="0"/>
+                        </a:spcBef>
+                        <a:spcAft>
+                          <a:spcPts val="0"/>
+                        </a:spcAft>
+                        <a:buClrTx/>
+                        <a:buSzTx/>
+                        <a:buFontTx/>
+                        <a:buNone/>
+                        <a:tabLst/>
+                        <a:defRPr/>
+                      </a:pPr>
+                      <a:r>
+                        <a:rPr lang="en-IN" sz="800" dirty="0" smtClean="0"/>
+                        <a:t>&lt;script&gt;</a:t>
+                      </a:r>
+                      <a:br>
+                        <a:rPr lang="en-IN" sz="800" dirty="0" smtClean="0"/>
+                      </a:br>
+                      <a:r>
+                        <a:rPr lang="en-IN" sz="800" dirty="0" smtClean="0"/>
+                        <a:t>    $(document).ready(function(){</a:t>
+                      </a:r>
+                      <a:br>
+                        <a:rPr lang="en-IN" sz="800" dirty="0" smtClean="0"/>
+                      </a:br>
+                      <a:r>
+                        <a:rPr lang="en-IN" sz="800" dirty="0" smtClean="0"/>
+                        <a:t>        'use strict'</a:t>
+                      </a:r>
+                      <a:br>
+                        <a:rPr lang="en-IN" sz="800" dirty="0" smtClean="0"/>
+                      </a:br>
+                      <a:r>
+                        <a:rPr lang="en-IN" sz="800" dirty="0" smtClean="0"/>
+                        <a:t>        // Fetch all the forms we want to apply custom Bootstrap validation styles to</a:t>
+                      </a:r>
+                      <a:br>
+                        <a:rPr lang="en-IN" sz="800" dirty="0" smtClean="0"/>
+                      </a:br>
+                      <a:r>
+                        <a:rPr lang="en-IN" sz="800" dirty="0" smtClean="0"/>
+                        <a:t>        </a:t>
+                      </a:r>
+                      <a:r>
+                        <a:rPr lang="en-IN" sz="800" dirty="0" err="1" smtClean="0"/>
+                        <a:t>var</a:t>
+                      </a:r>
+                      <a:r>
+                        <a:rPr lang="en-IN" sz="800" dirty="0" smtClean="0"/>
+                        <a:t> forms = </a:t>
+                      </a:r>
+                      <a:r>
+                        <a:rPr lang="en-IN" sz="800" dirty="0" err="1" smtClean="0"/>
+                        <a:t>document.querySelectorAll</a:t>
+                      </a:r>
+                      <a:r>
+                        <a:rPr lang="en-IN" sz="800" dirty="0" smtClean="0"/>
+                        <a:t>('.needs-validation')</a:t>
+                      </a:r>
+                      <a:br>
+                        <a:rPr lang="en-IN" sz="800" dirty="0" smtClean="0"/>
+                      </a:br>
+                      <a:r>
+                        <a:rPr lang="en-IN" sz="800" dirty="0" smtClean="0"/>
+                        <a:t>        // Loop over them and prevent submission</a:t>
+                      </a:r>
+                      <a:br>
+                        <a:rPr lang="en-IN" sz="800" dirty="0" smtClean="0"/>
+                      </a:br>
+                      <a:r>
+                        <a:rPr lang="en-IN" sz="800" dirty="0" smtClean="0"/>
+                        <a:t>        </a:t>
+                      </a:r>
+                      <a:r>
+                        <a:rPr lang="en-IN" sz="800" dirty="0" err="1" smtClean="0"/>
+                        <a:t>Array.prototype.slice.call</a:t>
+                      </a:r>
+                      <a:r>
+                        <a:rPr lang="en-IN" sz="800" dirty="0" smtClean="0"/>
+                        <a:t>(forms)</a:t>
+                      </a:r>
+                      <a:br>
+                        <a:rPr lang="en-IN" sz="800" dirty="0" smtClean="0"/>
+                      </a:br>
+                      <a:r>
+                        <a:rPr lang="en-IN" sz="800" dirty="0" smtClean="0"/>
+                        <a:t>        .</a:t>
+                      </a:r>
+                      <a:r>
+                        <a:rPr lang="en-IN" sz="800" dirty="0" err="1" smtClean="0"/>
+                        <a:t>forEach</a:t>
+                      </a:r>
+                      <a:r>
+                        <a:rPr lang="en-IN" sz="800" dirty="0" smtClean="0"/>
+                        <a:t>(function (form) {</a:t>
+                      </a:r>
+                      <a:br>
+                        <a:rPr lang="en-IN" sz="800" dirty="0" smtClean="0"/>
+                      </a:br>
+                      <a:r>
+                        <a:rPr lang="en-IN" sz="800" dirty="0" smtClean="0"/>
+                        <a:t>        </a:t>
+                      </a:r>
+                      <a:r>
+                        <a:rPr lang="en-IN" sz="800" dirty="0" err="1" smtClean="0"/>
+                        <a:t>form.addEventListener</a:t>
+                      </a:r>
+                      <a:r>
+                        <a:rPr lang="en-IN" sz="800" dirty="0" smtClean="0"/>
+                        <a:t>('submit', function (event) {</a:t>
+                      </a:r>
+                      <a:br>
+                        <a:rPr lang="en-IN" sz="800" dirty="0" smtClean="0"/>
+                      </a:br>
+                      <a:r>
+                        <a:rPr lang="en-IN" sz="800" dirty="0" smtClean="0"/>
+                        <a:t>            if (!</a:t>
+                      </a:r>
+                      <a:r>
+                        <a:rPr lang="en-IN" sz="800" dirty="0" err="1" smtClean="0"/>
+                        <a:t>form.checkValidity</a:t>
+                      </a:r>
+                      <a:r>
+                        <a:rPr lang="en-IN" sz="800" dirty="0" smtClean="0"/>
+                        <a:t>()) {</a:t>
+                      </a:r>
+                      <a:br>
+                        <a:rPr lang="en-IN" sz="800" dirty="0" smtClean="0"/>
+                      </a:br>
+                      <a:r>
+                        <a:rPr lang="en-IN" sz="800" dirty="0" smtClean="0"/>
+                        <a:t>            </a:t>
+                      </a:r>
+                      <a:r>
+                        <a:rPr lang="en-IN" sz="800" dirty="0" err="1" smtClean="0"/>
+                        <a:t>event.preventDefault</a:t>
+                      </a:r>
+                      <a:r>
+                        <a:rPr lang="en-IN" sz="800" dirty="0" smtClean="0"/>
+                        <a:t>()</a:t>
+                      </a:r>
+                      <a:br>
+                        <a:rPr lang="en-IN" sz="800" dirty="0" smtClean="0"/>
+                      </a:br>
+                      <a:r>
+                        <a:rPr lang="en-IN" sz="800" dirty="0" smtClean="0"/>
+                        <a:t>            </a:t>
+                      </a:r>
+                      <a:r>
+                        <a:rPr lang="en-IN" sz="800" dirty="0" err="1" smtClean="0"/>
+                        <a:t>event.stopPropagation</a:t>
+                      </a:r>
+                      <a:r>
+                        <a:rPr lang="en-IN" sz="800" dirty="0" smtClean="0"/>
+                        <a:t>()</a:t>
+                      </a:r>
+                      <a:br>
+                        <a:rPr lang="en-IN" sz="800" dirty="0" smtClean="0"/>
+                      </a:br>
+                      <a:r>
+                        <a:rPr lang="en-IN" sz="800" dirty="0" smtClean="0"/>
+                        <a:t>            }</a:t>
+                      </a:r>
+                      <a:br>
+                        <a:rPr lang="en-IN" sz="800" dirty="0" smtClean="0"/>
+                      </a:br>
+                      <a:r>
+                        <a:rPr lang="en-IN" sz="800" dirty="0" smtClean="0"/>
+                        <a:t>        </a:t>
+                      </a:r>
+                      <a:r>
+                        <a:rPr lang="en-IN" sz="800" dirty="0" err="1" smtClean="0"/>
+                        <a:t>form.classList.add</a:t>
+                      </a:r>
+                      <a:r>
+                        <a:rPr lang="en-IN" sz="800" dirty="0" smtClean="0"/>
+                        <a:t>('was-validated')</a:t>
+                      </a:r>
+                      <a:br>
+                        <a:rPr lang="en-IN" sz="800" dirty="0" smtClean="0"/>
+                      </a:br>
+                      <a:r>
+                        <a:rPr lang="en-IN" sz="800" dirty="0" smtClean="0"/>
+                        <a:t>        }, false)</a:t>
+                      </a:r>
+                      <a:br>
+                        <a:rPr lang="en-IN" sz="800" dirty="0" smtClean="0"/>
+                      </a:br>
+                      <a:r>
+                        <a:rPr lang="en-IN" sz="800" dirty="0" smtClean="0"/>
+                        <a:t>        })</a:t>
+                      </a:r>
+                      <a:br>
+                        <a:rPr lang="en-IN" sz="800" dirty="0" smtClean="0"/>
+                      </a:br>
+                      <a:r>
+                        <a:rPr lang="en-IN" sz="800" dirty="0" smtClean="0"/>
+                        <a:t>    });</a:t>
+                      </a:r>
+                      <a:br>
+                        <a:rPr lang="en-IN" sz="800" dirty="0" smtClean="0"/>
+                      </a:br>
+                      <a:r>
+                        <a:rPr lang="en-IN" sz="800" dirty="0" smtClean="0"/>
+                        <a:t>&lt;/script&gt;</a:t>
+                      </a:r>
+                      <a:endParaRPr lang="en-US" sz="800" dirty="0" smtClean="0"/>
+                    </a:p>
+                    <a:p>
+                      <a:endParaRPr lang="en-IN" sz="800" dirty="0"/>
+                    </a:p>
+                  </a:txBody>
+                  <a:tcPr>
+                    <a:lnL w="12700" cap="flat" cmpd="sng" algn="ctr">
+                      <a:solidFill>
+                        <a:schemeClr val="tx1"/>
+                      </a:solidFill>
+                      <a:prstDash val="solid"/>
+                      <a:round/>
+                      <a:headEnd type="none" w="med" len="med"/>
+                      <a:tailEnd type="none" w="med" len="med"/>
+                    </a:lnL>
+                    <a:lnR w="12700" cap="flat" cmpd="sng" algn="ctr">
+                      <a:solidFill>
+                        <a:schemeClr val="tx1"/>
+                      </a:solidFill>
+                      <a:prstDash val="solid"/>
+                      <a:round/>
+                      <a:headEnd type="none" w="med" len="med"/>
+                      <a:tailEnd type="none" w="med" len="med"/>
+                    </a:lnR>
+                    <a:lnT w="12700" cap="flat" cmpd="sng" algn="ctr">
+                      <a:solidFill>
+                        <a:schemeClr val="tx1"/>
+                      </a:solidFill>
+                      <a:prstDash val="solid"/>
+                      <a:round/>
+                      <a:headEnd type="none" w="med" len="med"/>
+                      <a:tailEnd type="none" w="med" len="med"/>
+                    </a:lnT>
+                    <a:lnB w="12700" cap="flat" cmpd="sng" algn="ctr">
+                      <a:solidFill>
+                        <a:schemeClr val="tx1"/>
+                      </a:solidFill>
+                      <a:prstDash val="solid"/>
+                      <a:round/>
+                      <a:headEnd type="none" w="med" len="med"/>
+                      <a:tailEnd type="none" w="med" len="med"/>
+                    </a:lnB>
+                    <a:noFill/>
+                  </a:tcPr>
+                </a:tc>
+              </a:tr>
+            </a:tbl>
+          </a:graphicData>
+        </a:graphic>
+      </p:graphicFrame>
     </p:spTree>
     <p:extLst>
       <p:ext uri="{BB962C8B-B14F-4D97-AF65-F5344CB8AC3E}">

</xml_diff>